<commit_message>
update slides with results
</commit_message>
<xml_diff>
--- a/Relazione/Slide.pptx
+++ b/Relazione/Slide.pptx
@@ -5,10 +5,10 @@
     <p:sldMasterId id="2147483756" r:id="rId4"/>
   </p:sldMasterIdLst>
   <p:notesMasterIdLst>
-    <p:notesMasterId r:id="rId26"/>
+    <p:notesMasterId r:id="rId28"/>
   </p:notesMasterIdLst>
   <p:handoutMasterIdLst>
-    <p:handoutMasterId r:id="rId27"/>
+    <p:handoutMasterId r:id="rId29"/>
   </p:handoutMasterIdLst>
   <p:sldIdLst>
     <p:sldId id="267" r:id="rId5"/>
@@ -30,8 +30,10 @@
     <p:sldId id="294" r:id="rId21"/>
     <p:sldId id="296" r:id="rId22"/>
     <p:sldId id="297" r:id="rId23"/>
-    <p:sldId id="298" r:id="rId24"/>
-    <p:sldId id="299" r:id="rId25"/>
+    <p:sldId id="302" r:id="rId24"/>
+    <p:sldId id="298" r:id="rId25"/>
+    <p:sldId id="303" r:id="rId26"/>
+    <p:sldId id="299" r:id="rId27"/>
   </p:sldIdLst>
   <p:sldSz cx="12188825" cy="6858000"/>
   <p:notesSz cx="6858000" cy="9144000"/>
@@ -1728,6 +1730,788 @@
 </file>
 
 <file path=ppt/diagrams/colors3.xml><?xml version="1.0" encoding="utf-8"?>
+<dgm:colorsDef xmlns:dgm="http://schemas.openxmlformats.org/drawingml/2006/diagram" xmlns:a="http://schemas.openxmlformats.org/drawingml/2006/main" uniqueId="urn:microsoft.com/office/officeart/2005/8/colors/colorful3">
+  <dgm:title val=""/>
+  <dgm:desc val=""/>
+  <dgm:catLst>
+    <dgm:cat type="colorful" pri="10300"/>
+  </dgm:catLst>
+  <dgm:styleLbl name="node0">
+    <dgm:fillClrLst meth="repeat">
+      <a:schemeClr val="accent2"/>
+    </dgm:fillClrLst>
+    <dgm:linClrLst meth="repeat">
+      <a:schemeClr val="lt1"/>
+    </dgm:linClrLst>
+    <dgm:effectClrLst/>
+    <dgm:txLinClrLst/>
+    <dgm:txFillClrLst/>
+    <dgm:txEffectClrLst/>
+  </dgm:styleLbl>
+  <dgm:styleLbl name="node1">
+    <dgm:fillClrLst>
+      <a:schemeClr val="accent3"/>
+      <a:schemeClr val="accent4"/>
+    </dgm:fillClrLst>
+    <dgm:linClrLst meth="repeat">
+      <a:schemeClr val="lt1"/>
+    </dgm:linClrLst>
+    <dgm:effectClrLst/>
+    <dgm:txLinClrLst/>
+    <dgm:txFillClrLst/>
+    <dgm:txEffectClrLst/>
+  </dgm:styleLbl>
+  <dgm:styleLbl name="alignNode1">
+    <dgm:fillClrLst>
+      <a:schemeClr val="accent3"/>
+      <a:schemeClr val="accent4"/>
+    </dgm:fillClrLst>
+    <dgm:linClrLst>
+      <a:schemeClr val="accent3"/>
+      <a:schemeClr val="accent4"/>
+    </dgm:linClrLst>
+    <dgm:effectClrLst/>
+    <dgm:txLinClrLst/>
+    <dgm:txFillClrLst/>
+    <dgm:txEffectClrLst/>
+  </dgm:styleLbl>
+  <dgm:styleLbl name="lnNode1">
+    <dgm:fillClrLst>
+      <a:schemeClr val="accent3"/>
+      <a:schemeClr val="accent4"/>
+    </dgm:fillClrLst>
+    <dgm:linClrLst meth="repeat">
+      <a:schemeClr val="lt1"/>
+    </dgm:linClrLst>
+    <dgm:effectClrLst/>
+    <dgm:txLinClrLst/>
+    <dgm:txFillClrLst/>
+    <dgm:txEffectClrLst/>
+  </dgm:styleLbl>
+  <dgm:styleLbl name="vennNode1">
+    <dgm:fillClrLst>
+      <a:schemeClr val="accent3">
+        <a:alpha val="50000"/>
+      </a:schemeClr>
+      <a:schemeClr val="accent4">
+        <a:alpha val="50000"/>
+      </a:schemeClr>
+    </dgm:fillClrLst>
+    <dgm:linClrLst meth="repeat">
+      <a:schemeClr val="lt1"/>
+    </dgm:linClrLst>
+    <dgm:effectClrLst/>
+    <dgm:txLinClrLst/>
+    <dgm:txFillClrLst/>
+    <dgm:txEffectClrLst/>
+  </dgm:styleLbl>
+  <dgm:styleLbl name="node2">
+    <dgm:fillClrLst>
+      <a:schemeClr val="accent4"/>
+    </dgm:fillClrLst>
+    <dgm:linClrLst meth="repeat">
+      <a:schemeClr val="lt1"/>
+    </dgm:linClrLst>
+    <dgm:effectClrLst/>
+    <dgm:txLinClrLst/>
+    <dgm:txFillClrLst/>
+    <dgm:txEffectClrLst/>
+  </dgm:styleLbl>
+  <dgm:styleLbl name="node3">
+    <dgm:fillClrLst>
+      <a:schemeClr val="accent5"/>
+    </dgm:fillClrLst>
+    <dgm:linClrLst meth="repeat">
+      <a:schemeClr val="lt1"/>
+    </dgm:linClrLst>
+    <dgm:effectClrLst/>
+    <dgm:txLinClrLst/>
+    <dgm:txFillClrLst/>
+    <dgm:txEffectClrLst/>
+  </dgm:styleLbl>
+  <dgm:styleLbl name="node4">
+    <dgm:fillClrLst>
+      <a:schemeClr val="accent6"/>
+    </dgm:fillClrLst>
+    <dgm:linClrLst meth="repeat">
+      <a:schemeClr val="lt1"/>
+    </dgm:linClrLst>
+    <dgm:effectClrLst/>
+    <dgm:txLinClrLst/>
+    <dgm:txFillClrLst/>
+    <dgm:txEffectClrLst/>
+  </dgm:styleLbl>
+  <dgm:styleLbl name="fgImgPlace1">
+    <dgm:fillClrLst>
+      <a:schemeClr val="accent3">
+        <a:tint val="50000"/>
+      </a:schemeClr>
+      <a:schemeClr val="accent4">
+        <a:tint val="50000"/>
+      </a:schemeClr>
+    </dgm:fillClrLst>
+    <dgm:linClrLst meth="repeat">
+      <a:schemeClr val="lt1"/>
+    </dgm:linClrLst>
+    <dgm:effectClrLst/>
+    <dgm:txLinClrLst/>
+    <dgm:txFillClrLst meth="repeat">
+      <a:schemeClr val="lt1"/>
+    </dgm:txFillClrLst>
+    <dgm:txEffectClrLst/>
+  </dgm:styleLbl>
+  <dgm:styleLbl name="alignImgPlace1">
+    <dgm:fillClrLst>
+      <a:schemeClr val="accent3">
+        <a:tint val="50000"/>
+      </a:schemeClr>
+      <a:schemeClr val="accent4">
+        <a:tint val="20000"/>
+      </a:schemeClr>
+    </dgm:fillClrLst>
+    <dgm:linClrLst meth="repeat">
+      <a:schemeClr val="lt1"/>
+    </dgm:linClrLst>
+    <dgm:effectClrLst/>
+    <dgm:txLinClrLst/>
+    <dgm:txFillClrLst meth="repeat">
+      <a:schemeClr val="lt1"/>
+    </dgm:txFillClrLst>
+    <dgm:txEffectClrLst/>
+  </dgm:styleLbl>
+  <dgm:styleLbl name="bgImgPlace1">
+    <dgm:fillClrLst>
+      <a:schemeClr val="accent3">
+        <a:tint val="50000"/>
+      </a:schemeClr>
+      <a:schemeClr val="accent4">
+        <a:tint val="20000"/>
+      </a:schemeClr>
+    </dgm:fillClrLst>
+    <dgm:linClrLst meth="repeat">
+      <a:schemeClr val="lt1"/>
+    </dgm:linClrLst>
+    <dgm:effectClrLst/>
+    <dgm:txLinClrLst/>
+    <dgm:txFillClrLst meth="repeat">
+      <a:schemeClr val="lt1"/>
+    </dgm:txFillClrLst>
+    <dgm:txEffectClrLst/>
+  </dgm:styleLbl>
+  <dgm:styleLbl name="sibTrans2D1">
+    <dgm:fillClrLst>
+      <a:schemeClr val="accent3"/>
+      <a:schemeClr val="accent4"/>
+    </dgm:fillClrLst>
+    <dgm:linClrLst meth="repeat">
+      <a:schemeClr val="lt1"/>
+    </dgm:linClrLst>
+    <dgm:effectClrLst/>
+    <dgm:txLinClrLst/>
+    <dgm:txFillClrLst/>
+    <dgm:txEffectClrLst/>
+  </dgm:styleLbl>
+  <dgm:styleLbl name="fgSibTrans2D1">
+    <dgm:fillClrLst>
+      <a:schemeClr val="accent3"/>
+      <a:schemeClr val="accent4"/>
+    </dgm:fillClrLst>
+    <dgm:linClrLst meth="repeat">
+      <a:schemeClr val="lt1"/>
+    </dgm:linClrLst>
+    <dgm:effectClrLst/>
+    <dgm:txLinClrLst/>
+    <dgm:txFillClrLst meth="repeat">
+      <a:schemeClr val="lt1"/>
+    </dgm:txFillClrLst>
+    <dgm:txEffectClrLst/>
+  </dgm:styleLbl>
+  <dgm:styleLbl name="bgSibTrans2D1">
+    <dgm:fillClrLst>
+      <a:schemeClr val="accent3"/>
+      <a:schemeClr val="accent4"/>
+    </dgm:fillClrLst>
+    <dgm:linClrLst meth="repeat">
+      <a:schemeClr val="lt1"/>
+    </dgm:linClrLst>
+    <dgm:effectClrLst/>
+    <dgm:txLinClrLst/>
+    <dgm:txFillClrLst meth="repeat">
+      <a:schemeClr val="lt1"/>
+    </dgm:txFillClrLst>
+    <dgm:txEffectClrLst/>
+  </dgm:styleLbl>
+  <dgm:styleLbl name="sibTrans1D1">
+    <dgm:fillClrLst/>
+    <dgm:linClrLst>
+      <a:schemeClr val="accent3"/>
+      <a:schemeClr val="accent4"/>
+    </dgm:linClrLst>
+    <dgm:effectClrLst/>
+    <dgm:txLinClrLst/>
+    <dgm:txFillClrLst meth="repeat">
+      <a:schemeClr val="tx1"/>
+    </dgm:txFillClrLst>
+    <dgm:txEffectClrLst/>
+  </dgm:styleLbl>
+  <dgm:styleLbl name="callout">
+    <dgm:fillClrLst meth="repeat">
+      <a:schemeClr val="accent3"/>
+    </dgm:fillClrLst>
+    <dgm:linClrLst meth="repeat">
+      <a:schemeClr val="accent3">
+        <a:tint val="50000"/>
+      </a:schemeClr>
+    </dgm:linClrLst>
+    <dgm:effectClrLst/>
+    <dgm:txLinClrLst/>
+    <dgm:txFillClrLst meth="repeat">
+      <a:schemeClr val="tx1"/>
+    </dgm:txFillClrLst>
+    <dgm:txEffectClrLst/>
+  </dgm:styleLbl>
+  <dgm:styleLbl name="asst0">
+    <dgm:fillClrLst meth="repeat">
+      <a:schemeClr val="accent3"/>
+    </dgm:fillClrLst>
+    <dgm:linClrLst meth="repeat">
+      <a:schemeClr val="lt1">
+        <a:shade val="80000"/>
+      </a:schemeClr>
+    </dgm:linClrLst>
+    <dgm:effectClrLst/>
+    <dgm:txLinClrLst/>
+    <dgm:txFillClrLst/>
+    <dgm:txEffectClrLst/>
+  </dgm:styleLbl>
+  <dgm:styleLbl name="asst1">
+    <dgm:fillClrLst meth="repeat">
+      <a:schemeClr val="accent4"/>
+    </dgm:fillClrLst>
+    <dgm:linClrLst meth="repeat">
+      <a:schemeClr val="lt1">
+        <a:shade val="80000"/>
+      </a:schemeClr>
+    </dgm:linClrLst>
+    <dgm:effectClrLst/>
+    <dgm:txLinClrLst/>
+    <dgm:txFillClrLst/>
+    <dgm:txEffectClrLst/>
+  </dgm:styleLbl>
+  <dgm:styleLbl name="asst2">
+    <dgm:fillClrLst>
+      <a:schemeClr val="accent5"/>
+    </dgm:fillClrLst>
+    <dgm:linClrLst meth="repeat">
+      <a:schemeClr val="lt1"/>
+    </dgm:linClrLst>
+    <dgm:effectClrLst/>
+    <dgm:txLinClrLst/>
+    <dgm:txFillClrLst/>
+    <dgm:txEffectClrLst/>
+  </dgm:styleLbl>
+  <dgm:styleLbl name="asst3">
+    <dgm:fillClrLst>
+      <a:schemeClr val="accent6"/>
+    </dgm:fillClrLst>
+    <dgm:linClrLst meth="repeat">
+      <a:schemeClr val="lt1"/>
+    </dgm:linClrLst>
+    <dgm:effectClrLst/>
+    <dgm:txLinClrLst/>
+    <dgm:txFillClrLst/>
+    <dgm:txEffectClrLst/>
+  </dgm:styleLbl>
+  <dgm:styleLbl name="asst4">
+    <dgm:fillClrLst>
+      <a:schemeClr val="accent1"/>
+    </dgm:fillClrLst>
+    <dgm:linClrLst meth="repeat">
+      <a:schemeClr val="lt1"/>
+    </dgm:linClrLst>
+    <dgm:effectClrLst/>
+    <dgm:txLinClrLst/>
+    <dgm:txFillClrLst/>
+    <dgm:txEffectClrLst/>
+  </dgm:styleLbl>
+  <dgm:styleLbl name="parChTrans2D1">
+    <dgm:fillClrLst meth="repeat">
+      <a:schemeClr val="accent2"/>
+    </dgm:fillClrLst>
+    <dgm:linClrLst meth="repeat">
+      <a:schemeClr val="lt1"/>
+    </dgm:linClrLst>
+    <dgm:effectClrLst/>
+    <dgm:txLinClrLst/>
+    <dgm:txFillClrLst meth="repeat">
+      <a:schemeClr val="lt1"/>
+    </dgm:txFillClrLst>
+    <dgm:txEffectClrLst/>
+  </dgm:styleLbl>
+  <dgm:styleLbl name="parChTrans2D2">
+    <dgm:fillClrLst meth="repeat">
+      <a:schemeClr val="accent3"/>
+    </dgm:fillClrLst>
+    <dgm:linClrLst meth="repeat">
+      <a:schemeClr val="lt1"/>
+    </dgm:linClrLst>
+    <dgm:effectClrLst/>
+    <dgm:txLinClrLst/>
+    <dgm:txFillClrLst/>
+    <dgm:txEffectClrLst/>
+  </dgm:styleLbl>
+  <dgm:styleLbl name="parChTrans2D3">
+    <dgm:fillClrLst meth="repeat">
+      <a:schemeClr val="accent4"/>
+    </dgm:fillClrLst>
+    <dgm:linClrLst meth="repeat">
+      <a:schemeClr val="lt1"/>
+    </dgm:linClrLst>
+    <dgm:effectClrLst/>
+    <dgm:txLinClrLst/>
+    <dgm:txFillClrLst/>
+    <dgm:txEffectClrLst/>
+  </dgm:styleLbl>
+  <dgm:styleLbl name="parChTrans2D4">
+    <dgm:fillClrLst meth="repeat">
+      <a:schemeClr val="accent5"/>
+    </dgm:fillClrLst>
+    <dgm:linClrLst meth="repeat">
+      <a:schemeClr val="lt1"/>
+    </dgm:linClrLst>
+    <dgm:effectClrLst/>
+    <dgm:txLinClrLst/>
+    <dgm:txFillClrLst meth="repeat">
+      <a:schemeClr val="lt1"/>
+    </dgm:txFillClrLst>
+    <dgm:txEffectClrLst/>
+  </dgm:styleLbl>
+  <dgm:styleLbl name="parChTrans1D1">
+    <dgm:fillClrLst meth="repeat">
+      <a:schemeClr val="accent3"/>
+    </dgm:fillClrLst>
+    <dgm:linClrLst meth="repeat">
+      <a:schemeClr val="accent3"/>
+    </dgm:linClrLst>
+    <dgm:effectClrLst/>
+    <dgm:txLinClrLst/>
+    <dgm:txFillClrLst meth="repeat">
+      <a:schemeClr val="tx1"/>
+    </dgm:txFillClrLst>
+    <dgm:txEffectClrLst/>
+  </dgm:styleLbl>
+  <dgm:styleLbl name="parChTrans1D2">
+    <dgm:fillClrLst meth="repeat">
+      <a:schemeClr val="accent2">
+        <a:tint val="90000"/>
+      </a:schemeClr>
+    </dgm:fillClrLst>
+    <dgm:linClrLst meth="repeat">
+      <a:schemeClr val="accent4"/>
+    </dgm:linClrLst>
+    <dgm:effectClrLst/>
+    <dgm:txLinClrLst/>
+    <dgm:txFillClrLst meth="repeat">
+      <a:schemeClr val="tx1"/>
+    </dgm:txFillClrLst>
+    <dgm:txEffectClrLst/>
+  </dgm:styleLbl>
+  <dgm:styleLbl name="parChTrans1D3">
+    <dgm:fillClrLst meth="repeat">
+      <a:schemeClr val="accent2">
+        <a:tint val="70000"/>
+      </a:schemeClr>
+    </dgm:fillClrLst>
+    <dgm:linClrLst meth="repeat">
+      <a:schemeClr val="accent5"/>
+    </dgm:linClrLst>
+    <dgm:effectClrLst/>
+    <dgm:txLinClrLst/>
+    <dgm:txFillClrLst meth="repeat">
+      <a:schemeClr val="tx1"/>
+    </dgm:txFillClrLst>
+    <dgm:txEffectClrLst/>
+  </dgm:styleLbl>
+  <dgm:styleLbl name="parChTrans1D4">
+    <dgm:fillClrLst meth="repeat">
+      <a:schemeClr val="accent6">
+        <a:tint val="50000"/>
+      </a:schemeClr>
+    </dgm:fillClrLst>
+    <dgm:linClrLst meth="repeat">
+      <a:schemeClr val="accent6"/>
+    </dgm:linClrLst>
+    <dgm:effectClrLst/>
+    <dgm:txLinClrLst/>
+    <dgm:txFillClrLst meth="repeat">
+      <a:schemeClr val="tx1"/>
+    </dgm:txFillClrLst>
+    <dgm:txEffectClrLst/>
+  </dgm:styleLbl>
+  <dgm:styleLbl name="fgAcc1">
+    <dgm:fillClrLst meth="repeat">
+      <a:schemeClr val="lt1">
+        <a:alpha val="90000"/>
+      </a:schemeClr>
+    </dgm:fillClrLst>
+    <dgm:linClrLst>
+      <a:schemeClr val="accent3"/>
+      <a:schemeClr val="accent4"/>
+    </dgm:linClrLst>
+    <dgm:effectClrLst/>
+    <dgm:txLinClrLst/>
+    <dgm:txFillClrLst meth="repeat">
+      <a:schemeClr val="dk1"/>
+    </dgm:txFillClrLst>
+    <dgm:txEffectClrLst/>
+  </dgm:styleLbl>
+  <dgm:styleLbl name="conFgAcc1">
+    <dgm:fillClrLst meth="repeat">
+      <a:schemeClr val="lt1">
+        <a:alpha val="90000"/>
+      </a:schemeClr>
+    </dgm:fillClrLst>
+    <dgm:linClrLst>
+      <a:schemeClr val="accent3"/>
+      <a:schemeClr val="accent4"/>
+    </dgm:linClrLst>
+    <dgm:effectClrLst/>
+    <dgm:txLinClrLst/>
+    <dgm:txFillClrLst meth="repeat">
+      <a:schemeClr val="dk1"/>
+    </dgm:txFillClrLst>
+    <dgm:txEffectClrLst/>
+  </dgm:styleLbl>
+  <dgm:styleLbl name="alignAcc1">
+    <dgm:fillClrLst meth="repeat">
+      <a:schemeClr val="lt1">
+        <a:alpha val="90000"/>
+      </a:schemeClr>
+    </dgm:fillClrLst>
+    <dgm:linClrLst>
+      <a:schemeClr val="accent3"/>
+      <a:schemeClr val="accent4"/>
+    </dgm:linClrLst>
+    <dgm:effectClrLst/>
+    <dgm:txLinClrLst/>
+    <dgm:txFillClrLst meth="repeat">
+      <a:schemeClr val="dk1"/>
+    </dgm:txFillClrLst>
+    <dgm:txEffectClrLst/>
+  </dgm:styleLbl>
+  <dgm:styleLbl name="trAlignAcc1">
+    <dgm:fillClrLst meth="repeat">
+      <a:schemeClr val="lt1">
+        <a:alpha val="40000"/>
+      </a:schemeClr>
+    </dgm:fillClrLst>
+    <dgm:linClrLst meth="repeat">
+      <a:schemeClr val="accent2"/>
+    </dgm:linClrLst>
+    <dgm:effectClrLst/>
+    <dgm:txLinClrLst/>
+    <dgm:txFillClrLst meth="repeat">
+      <a:schemeClr val="dk1"/>
+    </dgm:txFillClrLst>
+    <dgm:txEffectClrLst/>
+  </dgm:styleLbl>
+  <dgm:styleLbl name="bgAcc1">
+    <dgm:fillClrLst meth="repeat">
+      <a:schemeClr val="lt1">
+        <a:alpha val="90000"/>
+      </a:schemeClr>
+    </dgm:fillClrLst>
+    <dgm:linClrLst>
+      <a:schemeClr val="accent3"/>
+      <a:schemeClr val="accent4"/>
+    </dgm:linClrLst>
+    <dgm:effectClrLst/>
+    <dgm:txLinClrLst/>
+    <dgm:txFillClrLst meth="repeat">
+      <a:schemeClr val="dk1"/>
+    </dgm:txFillClrLst>
+    <dgm:txEffectClrLst/>
+  </dgm:styleLbl>
+  <dgm:styleLbl name="solidFgAcc1">
+    <dgm:fillClrLst meth="repeat">
+      <a:schemeClr val="lt1"/>
+    </dgm:fillClrLst>
+    <dgm:linClrLst>
+      <a:schemeClr val="accent3"/>
+      <a:schemeClr val="accent4"/>
+    </dgm:linClrLst>
+    <dgm:effectClrLst/>
+    <dgm:txLinClrLst/>
+    <dgm:txFillClrLst meth="repeat">
+      <a:schemeClr val="dk1"/>
+    </dgm:txFillClrLst>
+    <dgm:txEffectClrLst/>
+  </dgm:styleLbl>
+  <dgm:styleLbl name="solidAlignAcc1">
+    <dgm:fillClrLst meth="repeat">
+      <a:schemeClr val="lt1"/>
+    </dgm:fillClrLst>
+    <dgm:linClrLst>
+      <a:schemeClr val="accent3"/>
+      <a:schemeClr val="accent4"/>
+    </dgm:linClrLst>
+    <dgm:effectClrLst/>
+    <dgm:txLinClrLst/>
+    <dgm:txFillClrLst meth="repeat">
+      <a:schemeClr val="dk1"/>
+    </dgm:txFillClrLst>
+    <dgm:txEffectClrLst/>
+  </dgm:styleLbl>
+  <dgm:styleLbl name="solidBgAcc1">
+    <dgm:fillClrLst meth="repeat">
+      <a:schemeClr val="lt1"/>
+    </dgm:fillClrLst>
+    <dgm:linClrLst>
+      <a:schemeClr val="accent3"/>
+      <a:schemeClr val="accent4"/>
+    </dgm:linClrLst>
+    <dgm:effectClrLst/>
+    <dgm:txLinClrLst/>
+    <dgm:txFillClrLst meth="repeat">
+      <a:schemeClr val="dk1"/>
+    </dgm:txFillClrLst>
+    <dgm:txEffectClrLst/>
+  </dgm:styleLbl>
+  <dgm:styleLbl name="fgAccFollowNode1">
+    <dgm:fillClrLst>
+      <a:schemeClr val="accent3">
+        <a:tint val="40000"/>
+        <a:alpha val="90000"/>
+      </a:schemeClr>
+      <a:schemeClr val="accent4">
+        <a:tint val="40000"/>
+        <a:alpha val="90000"/>
+      </a:schemeClr>
+    </dgm:fillClrLst>
+    <dgm:linClrLst>
+      <a:schemeClr val="accent3">
+        <a:tint val="40000"/>
+        <a:alpha val="90000"/>
+      </a:schemeClr>
+      <a:schemeClr val="accent4">
+        <a:tint val="40000"/>
+        <a:alpha val="90000"/>
+      </a:schemeClr>
+    </dgm:linClrLst>
+    <dgm:effectClrLst/>
+    <dgm:txLinClrLst/>
+    <dgm:txFillClrLst meth="repeat">
+      <a:schemeClr val="dk1"/>
+    </dgm:txFillClrLst>
+    <dgm:txEffectClrLst/>
+  </dgm:styleLbl>
+  <dgm:styleLbl name="alignAccFollowNode1">
+    <dgm:fillClrLst>
+      <a:schemeClr val="accent3">
+        <a:tint val="40000"/>
+        <a:alpha val="90000"/>
+      </a:schemeClr>
+      <a:schemeClr val="accent4">
+        <a:tint val="40000"/>
+        <a:alpha val="90000"/>
+      </a:schemeClr>
+    </dgm:fillClrLst>
+    <dgm:linClrLst>
+      <a:schemeClr val="accent3">
+        <a:tint val="40000"/>
+        <a:alpha val="90000"/>
+      </a:schemeClr>
+      <a:schemeClr val="accent4">
+        <a:tint val="40000"/>
+        <a:alpha val="90000"/>
+      </a:schemeClr>
+    </dgm:linClrLst>
+    <dgm:effectClrLst/>
+    <dgm:txLinClrLst/>
+    <dgm:txFillClrLst meth="repeat">
+      <a:schemeClr val="dk1"/>
+    </dgm:txFillClrLst>
+    <dgm:txEffectClrLst/>
+  </dgm:styleLbl>
+  <dgm:styleLbl name="bgAccFollowNode1">
+    <dgm:fillClrLst>
+      <a:schemeClr val="accent3">
+        <a:tint val="40000"/>
+        <a:alpha val="90000"/>
+      </a:schemeClr>
+      <a:schemeClr val="accent4">
+        <a:tint val="40000"/>
+        <a:alpha val="90000"/>
+      </a:schemeClr>
+    </dgm:fillClrLst>
+    <dgm:linClrLst>
+      <a:schemeClr val="accent3">
+        <a:tint val="40000"/>
+        <a:alpha val="90000"/>
+      </a:schemeClr>
+      <a:schemeClr val="accent4">
+        <a:tint val="40000"/>
+        <a:alpha val="90000"/>
+      </a:schemeClr>
+    </dgm:linClrLst>
+    <dgm:effectClrLst/>
+    <dgm:txLinClrLst/>
+    <dgm:txFillClrLst meth="repeat">
+      <a:schemeClr val="dk1"/>
+    </dgm:txFillClrLst>
+    <dgm:txEffectClrLst/>
+  </dgm:styleLbl>
+  <dgm:styleLbl name="fgAcc0">
+    <dgm:fillClrLst meth="repeat">
+      <a:schemeClr val="lt1">
+        <a:alpha val="90000"/>
+      </a:schemeClr>
+    </dgm:fillClrLst>
+    <dgm:linClrLst>
+      <a:schemeClr val="accent2"/>
+    </dgm:linClrLst>
+    <dgm:effectClrLst/>
+    <dgm:txLinClrLst/>
+    <dgm:txFillClrLst meth="repeat">
+      <a:schemeClr val="dk1"/>
+    </dgm:txFillClrLst>
+    <dgm:txEffectClrLst/>
+  </dgm:styleLbl>
+  <dgm:styleLbl name="fgAcc2">
+    <dgm:fillClrLst meth="repeat">
+      <a:schemeClr val="lt1">
+        <a:alpha val="90000"/>
+      </a:schemeClr>
+    </dgm:fillClrLst>
+    <dgm:linClrLst>
+      <a:schemeClr val="accent4"/>
+    </dgm:linClrLst>
+    <dgm:effectClrLst/>
+    <dgm:txLinClrLst/>
+    <dgm:txFillClrLst meth="repeat">
+      <a:schemeClr val="dk1"/>
+    </dgm:txFillClrLst>
+    <dgm:txEffectClrLst/>
+  </dgm:styleLbl>
+  <dgm:styleLbl name="fgAcc3">
+    <dgm:fillClrLst meth="repeat">
+      <a:schemeClr val="lt1">
+        <a:alpha val="90000"/>
+      </a:schemeClr>
+    </dgm:fillClrLst>
+    <dgm:linClrLst>
+      <a:schemeClr val="accent5"/>
+    </dgm:linClrLst>
+    <dgm:effectClrLst/>
+    <dgm:txLinClrLst/>
+    <dgm:txFillClrLst meth="repeat">
+      <a:schemeClr val="dk1"/>
+    </dgm:txFillClrLst>
+    <dgm:txEffectClrLst/>
+  </dgm:styleLbl>
+  <dgm:styleLbl name="fgAcc4">
+    <dgm:fillClrLst meth="repeat">
+      <a:schemeClr val="lt1">
+        <a:alpha val="90000"/>
+      </a:schemeClr>
+    </dgm:fillClrLst>
+    <dgm:linClrLst>
+      <a:schemeClr val="accent6"/>
+    </dgm:linClrLst>
+    <dgm:effectClrLst/>
+    <dgm:txLinClrLst/>
+    <dgm:txFillClrLst meth="repeat">
+      <a:schemeClr val="dk1"/>
+    </dgm:txFillClrLst>
+    <dgm:txEffectClrLst/>
+  </dgm:styleLbl>
+  <dgm:styleLbl name="bgShp">
+    <dgm:fillClrLst meth="repeat">
+      <a:schemeClr val="accent3">
+        <a:tint val="40000"/>
+      </a:schemeClr>
+    </dgm:fillClrLst>
+    <dgm:linClrLst meth="repeat">
+      <a:schemeClr val="dk1"/>
+    </dgm:linClrLst>
+    <dgm:effectClrLst/>
+    <dgm:txLinClrLst/>
+    <dgm:txFillClrLst meth="repeat">
+      <a:schemeClr val="dk1"/>
+    </dgm:txFillClrLst>
+    <dgm:txEffectClrLst/>
+  </dgm:styleLbl>
+  <dgm:styleLbl name="dkBgShp">
+    <dgm:fillClrLst meth="repeat">
+      <a:schemeClr val="accent3">
+        <a:shade val="90000"/>
+      </a:schemeClr>
+    </dgm:fillClrLst>
+    <dgm:linClrLst meth="repeat">
+      <a:schemeClr val="dk1"/>
+    </dgm:linClrLst>
+    <dgm:effectClrLst/>
+    <dgm:txLinClrLst/>
+    <dgm:txFillClrLst meth="repeat">
+      <a:schemeClr val="lt1"/>
+    </dgm:txFillClrLst>
+    <dgm:txEffectClrLst/>
+  </dgm:styleLbl>
+  <dgm:styleLbl name="trBgShp">
+    <dgm:fillClrLst meth="repeat">
+      <a:schemeClr val="accent2">
+        <a:tint val="50000"/>
+        <a:alpha val="40000"/>
+      </a:schemeClr>
+    </dgm:fillClrLst>
+    <dgm:linClrLst meth="repeat">
+      <a:schemeClr val="accent3"/>
+    </dgm:linClrLst>
+    <dgm:effectClrLst/>
+    <dgm:txLinClrLst/>
+    <dgm:txFillClrLst meth="repeat">
+      <a:schemeClr val="lt1"/>
+    </dgm:txFillClrLst>
+    <dgm:txEffectClrLst/>
+  </dgm:styleLbl>
+  <dgm:styleLbl name="fgShp">
+    <dgm:fillClrLst meth="repeat">
+      <a:schemeClr val="accent3">
+        <a:tint val="40000"/>
+      </a:schemeClr>
+    </dgm:fillClrLst>
+    <dgm:linClrLst meth="repeat">
+      <a:schemeClr val="lt1"/>
+    </dgm:linClrLst>
+    <dgm:effectClrLst/>
+    <dgm:txLinClrLst/>
+    <dgm:txFillClrLst meth="repeat">
+      <a:schemeClr val="dk1"/>
+    </dgm:txFillClrLst>
+    <dgm:txEffectClrLst/>
+  </dgm:styleLbl>
+  <dgm:styleLbl name="revTx">
+    <dgm:fillClrLst meth="repeat">
+      <a:schemeClr val="lt1">
+        <a:alpha val="0"/>
+      </a:schemeClr>
+    </dgm:fillClrLst>
+    <dgm:linClrLst meth="repeat">
+      <a:schemeClr val="dk1">
+        <a:alpha val="0"/>
+      </a:schemeClr>
+    </dgm:linClrLst>
+    <dgm:effectClrLst/>
+    <dgm:txLinClrLst/>
+    <dgm:txFillClrLst meth="repeat">
+      <a:schemeClr val="tx1"/>
+    </dgm:txFillClrLst>
+    <dgm:txEffectClrLst/>
+  </dgm:styleLbl>
+</dgm:colorsDef>
+</file>
+
+<file path=ppt/diagrams/colors4.xml><?xml version="1.0" encoding="utf-8"?>
 <dgm:colorsDef xmlns:dgm="http://schemas.openxmlformats.org/drawingml/2006/diagram" xmlns:a="http://schemas.openxmlformats.org/drawingml/2006/main" uniqueId="urn:microsoft.com/office/officeart/2005/8/colors/colorful3">
   <dgm:title val=""/>
   <dgm:desc val=""/>
@@ -3087,32 +3871,32 @@
   </dgm:ptLst>
   <dgm:cxnLst>
     <dgm:cxn modelId="{8FDA287C-F522-4798-84DD-FAE7202E2218}" srcId="{811C00EC-AF2A-41BC-B4D9-02AB7BF66167}" destId="{642344CB-74C8-44A2-9463-BFA935A3A62B}" srcOrd="0" destOrd="0" parTransId="{D88B29CC-9C89-46D1-9E57-A5161404AFCD}" sibTransId="{2BEF3B21-EA46-458C-9F13-3A6249480696}"/>
+    <dgm:cxn modelId="{706ABD05-1530-4082-93F2-868BABBF7119}" type="presOf" srcId="{811C00EC-AF2A-41BC-B4D9-02AB7BF66167}" destId="{DCECB3F3-48FE-4150-B216-DF6D00C412A6}" srcOrd="0" destOrd="0" presId="urn:microsoft.com/office/officeart/2005/8/layout/list1"/>
+    <dgm:cxn modelId="{3A76F5FD-AC51-43D5-A60D-6EA2DBBDF0F6}" type="presOf" srcId="{4DF9FE7B-F642-4898-A360-D4E3814E1A3D}" destId="{674922F1-7266-4681-AD4F-1C618A5FFF23}" srcOrd="1" destOrd="0" presId="urn:microsoft.com/office/officeart/2005/8/layout/list1"/>
+    <dgm:cxn modelId="{3F41141F-3FE3-4E69-BA1B-B1022C76134F}" type="presOf" srcId="{0791135C-9DAB-47F6-BE9C-A3E56A2DDA50}" destId="{5282638F-EFF2-4770-BB1A-21455422E45D}" srcOrd="0" destOrd="1" presId="urn:microsoft.com/office/officeart/2005/8/layout/list1"/>
+    <dgm:cxn modelId="{B3B26E9A-58E5-497B-BD59-F5567958C609}" srcId="{3929B1E1-4BC4-4C73-ABE8-27CEF96A3652}" destId="{0791135C-9DAB-47F6-BE9C-A3E56A2DDA50}" srcOrd="1" destOrd="0" parTransId="{D6057E63-9793-4991-97C1-30FC405E95A5}" sibTransId="{B670C2A7-83CB-4F4C-BC19-A3A7C066A822}"/>
     <dgm:cxn modelId="{133AB3BA-08EC-432D-814B-0243B8AEAE27}" type="presOf" srcId="{3F442EA2-39BA-4C9A-AD59-755D4917D532}" destId="{E6A445EE-D086-4B01-B491-D67950A5A065}" srcOrd="0" destOrd="0" presId="urn:microsoft.com/office/officeart/2005/8/layout/list1"/>
+    <dgm:cxn modelId="{1E2AF7A7-4249-461B-83BB-16ACFF1DA743}" type="presOf" srcId="{7546B606-AE19-4DA1-836A-6DC3B1656F3B}" destId="{964E6811-5072-4466-B721-689C35A65029}" srcOrd="0" destOrd="1" presId="urn:microsoft.com/office/officeart/2005/8/layout/list1"/>
+    <dgm:cxn modelId="{FE866214-6E53-4F61-A3B3-3359C0859B89}" srcId="{60CDF8D0-D4FC-4467-A51E-79C5A58B0B2C}" destId="{7546B606-AE19-4DA1-836A-6DC3B1656F3B}" srcOrd="1" destOrd="0" parTransId="{2B344FFA-B952-4470-BB79-994EACF91B19}" sibTransId="{B629EC96-B0EC-4783-9EA2-7ACAEF35DFEF}"/>
+    <dgm:cxn modelId="{EF39DC10-C489-4F29-BCDA-31D69D3CEE27}" type="presOf" srcId="{60CDF8D0-D4FC-4467-A51E-79C5A58B0B2C}" destId="{5B203A22-00AF-46E7-9415-C6DAFD7E01CC}" srcOrd="1" destOrd="0" presId="urn:microsoft.com/office/officeart/2005/8/layout/list1"/>
+    <dgm:cxn modelId="{3E379D5E-3519-4604-8C91-9AEBC1B5DA6A}" type="presOf" srcId="{60CDF8D0-D4FC-4467-A51E-79C5A58B0B2C}" destId="{864CB39B-29F9-473D-90E5-0686D86E278F}" srcOrd="0" destOrd="0" presId="urn:microsoft.com/office/officeart/2005/8/layout/list1"/>
+    <dgm:cxn modelId="{2BA65DEC-E719-4ED3-8135-48349D42DD04}" srcId="{3F442EA2-39BA-4C9A-AD59-755D4917D532}" destId="{60CDF8D0-D4FC-4467-A51E-79C5A58B0B2C}" srcOrd="2" destOrd="0" parTransId="{E12A269F-AB82-486A-9077-80F2BBBE48C2}" sibTransId="{3F7FD59D-A716-4310-A89A-AB6F740D9FFF}"/>
+    <dgm:cxn modelId="{E12E128A-D14B-4DAD-B3C2-4C2D815371A8}" type="presOf" srcId="{3929B1E1-4BC4-4C73-ABE8-27CEF96A3652}" destId="{D0037F0D-DB9A-4BA4-97B4-D939B26E14DA}" srcOrd="0" destOrd="0" presId="urn:microsoft.com/office/officeart/2005/8/layout/list1"/>
+    <dgm:cxn modelId="{1339090C-9A95-4C05-841C-FA3AF987601B}" srcId="{3F442EA2-39BA-4C9A-AD59-755D4917D532}" destId="{3929B1E1-4BC4-4C73-ABE8-27CEF96A3652}" srcOrd="1" destOrd="0" parTransId="{F356CC76-9117-4B79-A270-BBBAFD3E9C79}" sibTransId="{19BA0C22-38BB-4E9F-89D5-0FF5FF9F12CE}"/>
+    <dgm:cxn modelId="{50B238DE-3A9C-48F6-8EA6-E05A25BDB667}" type="presOf" srcId="{811C00EC-AF2A-41BC-B4D9-02AB7BF66167}" destId="{017C7AB9-C6C8-4BAC-ADBB-9FD707BE0F60}" srcOrd="1" destOrd="0" presId="urn:microsoft.com/office/officeart/2005/8/layout/list1"/>
+    <dgm:cxn modelId="{1D32FCC9-657C-4348-9C0D-52115D559FEB}" srcId="{60CDF8D0-D4FC-4467-A51E-79C5A58B0B2C}" destId="{50629C12-7464-4473-ADEF-1A284F8A9957}" srcOrd="0" destOrd="0" parTransId="{9D1CB46C-0CFA-4B27-9224-267431FBD094}" sibTransId="{4576BCC5-0598-4332-A2E7-87AC3ADD4EB8}"/>
+    <dgm:cxn modelId="{88737A90-08F9-41C4-84D7-F5D26E840A5F}" srcId="{811C00EC-AF2A-41BC-B4D9-02AB7BF66167}" destId="{4ECFD363-85F6-4806-9CE7-A1A1FCEFBEC8}" srcOrd="1" destOrd="0" parTransId="{1EA1C62E-7087-486E-8BB4-15B04AB1553D}" sibTransId="{963EB80F-78DD-485D-93DF-672EF4A6C93E}"/>
+    <dgm:cxn modelId="{F7E95423-786D-404D-8158-68B1C89303BF}" type="presOf" srcId="{4DF9FE7B-F642-4898-A360-D4E3814E1A3D}" destId="{7E290D25-335D-4339-A8E8-B036E46B5EB5}" srcOrd="0" destOrd="0" presId="urn:microsoft.com/office/officeart/2005/8/layout/list1"/>
+    <dgm:cxn modelId="{E5CEC4D5-8628-455D-AB22-455033237B52}" type="presOf" srcId="{4ECFD363-85F6-4806-9CE7-A1A1FCEFBEC8}" destId="{432FD8AD-628D-4FE4-9A5D-06069E9A39D1}" srcOrd="0" destOrd="1" presId="urn:microsoft.com/office/officeart/2005/8/layout/list1"/>
+    <dgm:cxn modelId="{D777451D-9818-431F-B600-33C7C8A40A98}" type="presOf" srcId="{3929B1E1-4BC4-4C73-ABE8-27CEF96A3652}" destId="{21EEBBE2-729F-4D85-8CAE-C2B30FF126D2}" srcOrd="1" destOrd="0" presId="urn:microsoft.com/office/officeart/2005/8/layout/list1"/>
     <dgm:cxn modelId="{9F679DC2-6B0E-43AA-A414-29A0BEBDE7EB}" type="presOf" srcId="{50629C12-7464-4473-ADEF-1A284F8A9957}" destId="{964E6811-5072-4466-B721-689C35A65029}" srcOrd="0" destOrd="0" presId="urn:microsoft.com/office/officeart/2005/8/layout/list1"/>
-    <dgm:cxn modelId="{EF39DC10-C489-4F29-BCDA-31D69D3CEE27}" type="presOf" srcId="{60CDF8D0-D4FC-4467-A51E-79C5A58B0B2C}" destId="{5B203A22-00AF-46E7-9415-C6DAFD7E01CC}" srcOrd="1" destOrd="0" presId="urn:microsoft.com/office/officeart/2005/8/layout/list1"/>
+    <dgm:cxn modelId="{841BB473-ABE9-4F34-ADA3-6CC21D9F755C}" type="presOf" srcId="{642344CB-74C8-44A2-9463-BFA935A3A62B}" destId="{432FD8AD-628D-4FE4-9A5D-06069E9A39D1}" srcOrd="0" destOrd="0" presId="urn:microsoft.com/office/officeart/2005/8/layout/list1"/>
+    <dgm:cxn modelId="{09FCCB9D-A30A-4326-970E-26252D39327F}" srcId="{3929B1E1-4BC4-4C73-ABE8-27CEF96A3652}" destId="{99E0600D-9954-43F4-8926-13B8777FAAA1}" srcOrd="0" destOrd="0" parTransId="{BE23F476-2C5C-42ED-BF2B-CD5FC7ADDDF6}" sibTransId="{C44937DC-4907-4769-AA8B-1B3E7391D7B0}"/>
     <dgm:cxn modelId="{EBD8BE8D-6018-43E2-B081-034BB5656EB6}" srcId="{3F442EA2-39BA-4C9A-AD59-755D4917D532}" destId="{4DF9FE7B-F642-4898-A360-D4E3814E1A3D}" srcOrd="0" destOrd="0" parTransId="{1C10F06D-860A-4604-A7AD-02E614FE3976}" sibTransId="{43C18EFF-81FC-4D70-8C6B-E95FF3730413}"/>
-    <dgm:cxn modelId="{09FCCB9D-A30A-4326-970E-26252D39327F}" srcId="{3929B1E1-4BC4-4C73-ABE8-27CEF96A3652}" destId="{99E0600D-9954-43F4-8926-13B8777FAAA1}" srcOrd="0" destOrd="0" parTransId="{BE23F476-2C5C-42ED-BF2B-CD5FC7ADDDF6}" sibTransId="{C44937DC-4907-4769-AA8B-1B3E7391D7B0}"/>
-    <dgm:cxn modelId="{1E2AF7A7-4249-461B-83BB-16ACFF1DA743}" type="presOf" srcId="{7546B606-AE19-4DA1-836A-6DC3B1656F3B}" destId="{964E6811-5072-4466-B721-689C35A65029}" srcOrd="0" destOrd="1" presId="urn:microsoft.com/office/officeart/2005/8/layout/list1"/>
-    <dgm:cxn modelId="{1D32FCC9-657C-4348-9C0D-52115D559FEB}" srcId="{60CDF8D0-D4FC-4467-A51E-79C5A58B0B2C}" destId="{50629C12-7464-4473-ADEF-1A284F8A9957}" srcOrd="0" destOrd="0" parTransId="{9D1CB46C-0CFA-4B27-9224-267431FBD094}" sibTransId="{4576BCC5-0598-4332-A2E7-87AC3ADD4EB8}"/>
-    <dgm:cxn modelId="{3A76F5FD-AC51-43D5-A60D-6EA2DBBDF0F6}" type="presOf" srcId="{4DF9FE7B-F642-4898-A360-D4E3814E1A3D}" destId="{674922F1-7266-4681-AD4F-1C618A5FFF23}" srcOrd="1" destOrd="0" presId="urn:microsoft.com/office/officeart/2005/8/layout/list1"/>
-    <dgm:cxn modelId="{3E379D5E-3519-4604-8C91-9AEBC1B5DA6A}" type="presOf" srcId="{60CDF8D0-D4FC-4467-A51E-79C5A58B0B2C}" destId="{864CB39B-29F9-473D-90E5-0686D86E278F}" srcOrd="0" destOrd="0" presId="urn:microsoft.com/office/officeart/2005/8/layout/list1"/>
-    <dgm:cxn modelId="{E5CEC4D5-8628-455D-AB22-455033237B52}" type="presOf" srcId="{4ECFD363-85F6-4806-9CE7-A1A1FCEFBEC8}" destId="{432FD8AD-628D-4FE4-9A5D-06069E9A39D1}" srcOrd="0" destOrd="1" presId="urn:microsoft.com/office/officeart/2005/8/layout/list1"/>
-    <dgm:cxn modelId="{706ABD05-1530-4082-93F2-868BABBF7119}" type="presOf" srcId="{811C00EC-AF2A-41BC-B4D9-02AB7BF66167}" destId="{DCECB3F3-48FE-4150-B216-DF6D00C412A6}" srcOrd="0" destOrd="0" presId="urn:microsoft.com/office/officeart/2005/8/layout/list1"/>
-    <dgm:cxn modelId="{B3B26E9A-58E5-497B-BD59-F5567958C609}" srcId="{3929B1E1-4BC4-4C73-ABE8-27CEF96A3652}" destId="{0791135C-9DAB-47F6-BE9C-A3E56A2DDA50}" srcOrd="1" destOrd="0" parTransId="{D6057E63-9793-4991-97C1-30FC405E95A5}" sibTransId="{B670C2A7-83CB-4F4C-BC19-A3A7C066A822}"/>
-    <dgm:cxn modelId="{1339090C-9A95-4C05-841C-FA3AF987601B}" srcId="{3F442EA2-39BA-4C9A-AD59-755D4917D532}" destId="{3929B1E1-4BC4-4C73-ABE8-27CEF96A3652}" srcOrd="1" destOrd="0" parTransId="{F356CC76-9117-4B79-A270-BBBAFD3E9C79}" sibTransId="{19BA0C22-38BB-4E9F-89D5-0FF5FF9F12CE}"/>
-    <dgm:cxn modelId="{A058DDA2-48CA-4E5B-B389-F71A59C262B0}" srcId="{4DF9FE7B-F642-4898-A360-D4E3814E1A3D}" destId="{EFF2750D-B4B3-474C-8B62-8B638DC31F7E}" srcOrd="0" destOrd="0" parTransId="{AEBC78E6-CDDC-4C8F-A157-3C51E907FACD}" sibTransId="{75C067D7-FCD2-4969-8F27-4BBDA88E75ED}"/>
-    <dgm:cxn modelId="{E12E128A-D14B-4DAD-B3C2-4C2D815371A8}" type="presOf" srcId="{3929B1E1-4BC4-4C73-ABE8-27CEF96A3652}" destId="{D0037F0D-DB9A-4BA4-97B4-D939B26E14DA}" srcOrd="0" destOrd="0" presId="urn:microsoft.com/office/officeart/2005/8/layout/list1"/>
-    <dgm:cxn modelId="{841BB473-ABE9-4F34-ADA3-6CC21D9F755C}" type="presOf" srcId="{642344CB-74C8-44A2-9463-BFA935A3A62B}" destId="{432FD8AD-628D-4FE4-9A5D-06069E9A39D1}" srcOrd="0" destOrd="0" presId="urn:microsoft.com/office/officeart/2005/8/layout/list1"/>
     <dgm:cxn modelId="{91E8EE10-A24D-4E72-918C-DFE8B8A56CE9}" type="presOf" srcId="{EFF2750D-B4B3-474C-8B62-8B638DC31F7E}" destId="{80259B02-529C-422B-91BE-D70198BA9F6C}" srcOrd="0" destOrd="0" presId="urn:microsoft.com/office/officeart/2005/8/layout/list1"/>
-    <dgm:cxn modelId="{3F41141F-3FE3-4E69-BA1B-B1022C76134F}" type="presOf" srcId="{0791135C-9DAB-47F6-BE9C-A3E56A2DDA50}" destId="{5282638F-EFF2-4770-BB1A-21455422E45D}" srcOrd="0" destOrd="1" presId="urn:microsoft.com/office/officeart/2005/8/layout/list1"/>
-    <dgm:cxn modelId="{FE866214-6E53-4F61-A3B3-3359C0859B89}" srcId="{60CDF8D0-D4FC-4467-A51E-79C5A58B0B2C}" destId="{7546B606-AE19-4DA1-836A-6DC3B1656F3B}" srcOrd="1" destOrd="0" parTransId="{2B344FFA-B952-4470-BB79-994EACF91B19}" sibTransId="{B629EC96-B0EC-4783-9EA2-7ACAEF35DFEF}"/>
-    <dgm:cxn modelId="{2BA65DEC-E719-4ED3-8135-48349D42DD04}" srcId="{3F442EA2-39BA-4C9A-AD59-755D4917D532}" destId="{60CDF8D0-D4FC-4467-A51E-79C5A58B0B2C}" srcOrd="2" destOrd="0" parTransId="{E12A269F-AB82-486A-9077-80F2BBBE48C2}" sibTransId="{3F7FD59D-A716-4310-A89A-AB6F740D9FFF}"/>
     <dgm:cxn modelId="{E4084DFF-29F3-410F-A8D3-8196CAAA5DB9}" srcId="{3F442EA2-39BA-4C9A-AD59-755D4917D532}" destId="{811C00EC-AF2A-41BC-B4D9-02AB7BF66167}" srcOrd="3" destOrd="0" parTransId="{1BFE45BE-61AB-4FD4-83D0-99B56BDD0245}" sibTransId="{246B1081-1195-470B-AC85-81C4BB95A57C}"/>
     <dgm:cxn modelId="{FC3C0DB7-9FD1-4688-8024-16D6F63718C0}" type="presOf" srcId="{99E0600D-9954-43F4-8926-13B8777FAAA1}" destId="{5282638F-EFF2-4770-BB1A-21455422E45D}" srcOrd="0" destOrd="0" presId="urn:microsoft.com/office/officeart/2005/8/layout/list1"/>
-    <dgm:cxn modelId="{D777451D-9818-431F-B600-33C7C8A40A98}" type="presOf" srcId="{3929B1E1-4BC4-4C73-ABE8-27CEF96A3652}" destId="{21EEBBE2-729F-4D85-8CAE-C2B30FF126D2}" srcOrd="1" destOrd="0" presId="urn:microsoft.com/office/officeart/2005/8/layout/list1"/>
-    <dgm:cxn modelId="{88737A90-08F9-41C4-84D7-F5D26E840A5F}" srcId="{811C00EC-AF2A-41BC-B4D9-02AB7BF66167}" destId="{4ECFD363-85F6-4806-9CE7-A1A1FCEFBEC8}" srcOrd="1" destOrd="0" parTransId="{1EA1C62E-7087-486E-8BB4-15B04AB1553D}" sibTransId="{963EB80F-78DD-485D-93DF-672EF4A6C93E}"/>
-    <dgm:cxn modelId="{50B238DE-3A9C-48F6-8EA6-E05A25BDB667}" type="presOf" srcId="{811C00EC-AF2A-41BC-B4D9-02AB7BF66167}" destId="{017C7AB9-C6C8-4BAC-ADBB-9FD707BE0F60}" srcOrd="1" destOrd="0" presId="urn:microsoft.com/office/officeart/2005/8/layout/list1"/>
-    <dgm:cxn modelId="{F7E95423-786D-404D-8158-68B1C89303BF}" type="presOf" srcId="{4DF9FE7B-F642-4898-A360-D4E3814E1A3D}" destId="{7E290D25-335D-4339-A8E8-B036E46B5EB5}" srcOrd="0" destOrd="0" presId="urn:microsoft.com/office/officeart/2005/8/layout/list1"/>
+    <dgm:cxn modelId="{A058DDA2-48CA-4E5B-B389-F71A59C262B0}" srcId="{4DF9FE7B-F642-4898-A360-D4E3814E1A3D}" destId="{EFF2750D-B4B3-474C-8B62-8B638DC31F7E}" srcOrd="0" destOrd="0" parTransId="{AEBC78E6-CDDC-4C8F-A157-3C51E907FACD}" sibTransId="{75C067D7-FCD2-4969-8F27-4BBDA88E75ED}"/>
     <dgm:cxn modelId="{7C96F733-1FEB-4464-AFE2-A6FFE050E7F5}" type="presParOf" srcId="{E6A445EE-D086-4B01-B491-D67950A5A065}" destId="{6D3A9625-D3EB-4CA1-AB05-34452283708A}" srcOrd="0" destOrd="0" presId="urn:microsoft.com/office/officeart/2005/8/layout/list1"/>
     <dgm:cxn modelId="{52625C28-CB81-4E22-A0FD-8E29373E6B1B}" type="presParOf" srcId="{6D3A9625-D3EB-4CA1-AB05-34452283708A}" destId="{7E290D25-335D-4339-A8E8-B036E46B5EB5}" srcOrd="0" destOrd="0" presId="urn:microsoft.com/office/officeart/2005/8/layout/list1"/>
     <dgm:cxn modelId="{B0C612E2-3EE1-400E-AE2C-6D7A4CC4C27B}" type="presParOf" srcId="{6D3A9625-D3EB-4CA1-AB05-34452283708A}" destId="{674922F1-7266-4681-AD4F-1C618A5FFF23}" srcOrd="1" destOrd="0" presId="urn:microsoft.com/office/officeart/2005/8/layout/list1"/>
@@ -3825,7 +4609,7 @@
           <a:pPr rtl="0"/>
           <a:r>
             <a:rPr lang="it-IT" dirty="0"/>
-            <a:t>«h» 99</a:t>
+            <a:t>«h» 98</a:t>
           </a:r>
           <a:r>
             <a:rPr lang="it" dirty="0"/>
@@ -3985,6 +4769,554 @@
             <a:rPr lang="it" dirty="0"/>
             <a:t>«h» 98%</a:t>
           </a:r>
+        </a:p>
+      </dgm:t>
+    </dgm:pt>
+    <dgm:pt modelId="{D88B29CC-9C89-46D1-9E57-A5161404AFCD}" type="parTrans" cxnId="{8FDA287C-F522-4798-84DD-FAE7202E2218}">
+      <dgm:prSet/>
+      <dgm:spPr/>
+      <dgm:t>
+        <a:bodyPr/>
+        <a:lstStyle/>
+        <a:p>
+          <a:endParaRPr lang="it-IT"/>
+        </a:p>
+      </dgm:t>
+    </dgm:pt>
+    <dgm:pt modelId="{2BEF3B21-EA46-458C-9F13-3A6249480696}" type="sibTrans" cxnId="{8FDA287C-F522-4798-84DD-FAE7202E2218}">
+      <dgm:prSet/>
+      <dgm:spPr/>
+      <dgm:t>
+        <a:bodyPr/>
+        <a:lstStyle/>
+        <a:p>
+          <a:endParaRPr lang="it-IT"/>
+        </a:p>
+      </dgm:t>
+    </dgm:pt>
+    <dgm:pt modelId="{E6A445EE-D086-4B01-B491-D67950A5A065}" type="pres">
+      <dgm:prSet presAssocID="{3F442EA2-39BA-4C9A-AD59-755D4917D532}" presName="linear" presStyleCnt="0">
+        <dgm:presLayoutVars>
+          <dgm:dir/>
+          <dgm:animLvl val="lvl"/>
+          <dgm:resizeHandles val="exact"/>
+        </dgm:presLayoutVars>
+      </dgm:prSet>
+      <dgm:spPr/>
+    </dgm:pt>
+    <dgm:pt modelId="{6D3A9625-D3EB-4CA1-AB05-34452283708A}" type="pres">
+      <dgm:prSet presAssocID="{4DF9FE7B-F642-4898-A360-D4E3814E1A3D}" presName="parentLin" presStyleCnt="0"/>
+      <dgm:spPr/>
+    </dgm:pt>
+    <dgm:pt modelId="{7E290D25-335D-4339-A8E8-B036E46B5EB5}" type="pres">
+      <dgm:prSet presAssocID="{4DF9FE7B-F642-4898-A360-D4E3814E1A3D}" presName="parentLeftMargin" presStyleLbl="node1" presStyleIdx="0" presStyleCnt="4"/>
+      <dgm:spPr/>
+    </dgm:pt>
+    <dgm:pt modelId="{674922F1-7266-4681-AD4F-1C618A5FFF23}" type="pres">
+      <dgm:prSet presAssocID="{4DF9FE7B-F642-4898-A360-D4E3814E1A3D}" presName="parentText" presStyleLbl="node1" presStyleIdx="0" presStyleCnt="4">
+        <dgm:presLayoutVars>
+          <dgm:chMax val="0"/>
+          <dgm:bulletEnabled val="1"/>
+        </dgm:presLayoutVars>
+      </dgm:prSet>
+      <dgm:spPr/>
+    </dgm:pt>
+    <dgm:pt modelId="{96C29850-0672-4B77-B5DE-2E1563038631}" type="pres">
+      <dgm:prSet presAssocID="{4DF9FE7B-F642-4898-A360-D4E3814E1A3D}" presName="negativeSpace" presStyleCnt="0"/>
+      <dgm:spPr/>
+    </dgm:pt>
+    <dgm:pt modelId="{80259B02-529C-422B-91BE-D70198BA9F6C}" type="pres">
+      <dgm:prSet presAssocID="{4DF9FE7B-F642-4898-A360-D4E3814E1A3D}" presName="childText" presStyleLbl="conFgAcc1" presStyleIdx="0" presStyleCnt="4">
+        <dgm:presLayoutVars>
+          <dgm:bulletEnabled val="1"/>
+        </dgm:presLayoutVars>
+      </dgm:prSet>
+      <dgm:spPr/>
+    </dgm:pt>
+    <dgm:pt modelId="{E53EFB4E-D3DB-42E1-82AC-148F7D29254F}" type="pres">
+      <dgm:prSet presAssocID="{43C18EFF-81FC-4D70-8C6B-E95FF3730413}" presName="spaceBetweenRectangles" presStyleCnt="0"/>
+      <dgm:spPr/>
+    </dgm:pt>
+    <dgm:pt modelId="{07AC1C38-F728-4390-9C76-57A49ED97DBB}" type="pres">
+      <dgm:prSet presAssocID="{3929B1E1-4BC4-4C73-ABE8-27CEF96A3652}" presName="parentLin" presStyleCnt="0"/>
+      <dgm:spPr/>
+    </dgm:pt>
+    <dgm:pt modelId="{D0037F0D-DB9A-4BA4-97B4-D939B26E14DA}" type="pres">
+      <dgm:prSet presAssocID="{3929B1E1-4BC4-4C73-ABE8-27CEF96A3652}" presName="parentLeftMargin" presStyleLbl="node1" presStyleIdx="0" presStyleCnt="4"/>
+      <dgm:spPr/>
+    </dgm:pt>
+    <dgm:pt modelId="{21EEBBE2-729F-4D85-8CAE-C2B30FF126D2}" type="pres">
+      <dgm:prSet presAssocID="{3929B1E1-4BC4-4C73-ABE8-27CEF96A3652}" presName="parentText" presStyleLbl="node1" presStyleIdx="1" presStyleCnt="4">
+        <dgm:presLayoutVars>
+          <dgm:chMax val="0"/>
+          <dgm:bulletEnabled val="1"/>
+        </dgm:presLayoutVars>
+      </dgm:prSet>
+      <dgm:spPr/>
+    </dgm:pt>
+    <dgm:pt modelId="{AACB3FAF-C320-430D-84D4-71BA6D1761D1}" type="pres">
+      <dgm:prSet presAssocID="{3929B1E1-4BC4-4C73-ABE8-27CEF96A3652}" presName="negativeSpace" presStyleCnt="0"/>
+      <dgm:spPr/>
+    </dgm:pt>
+    <dgm:pt modelId="{5282638F-EFF2-4770-BB1A-21455422E45D}" type="pres">
+      <dgm:prSet presAssocID="{3929B1E1-4BC4-4C73-ABE8-27CEF96A3652}" presName="childText" presStyleLbl="conFgAcc1" presStyleIdx="1" presStyleCnt="4">
+        <dgm:presLayoutVars>
+          <dgm:bulletEnabled val="1"/>
+        </dgm:presLayoutVars>
+      </dgm:prSet>
+      <dgm:spPr/>
+    </dgm:pt>
+    <dgm:pt modelId="{8CE827AA-77D8-4146-A665-00110A17769E}" type="pres">
+      <dgm:prSet presAssocID="{19BA0C22-38BB-4E9F-89D5-0FF5FF9F12CE}" presName="spaceBetweenRectangles" presStyleCnt="0"/>
+      <dgm:spPr/>
+    </dgm:pt>
+    <dgm:pt modelId="{34C9EE47-81AF-461E-8292-AB107AA0D367}" type="pres">
+      <dgm:prSet presAssocID="{60CDF8D0-D4FC-4467-A51E-79C5A58B0B2C}" presName="parentLin" presStyleCnt="0"/>
+      <dgm:spPr/>
+    </dgm:pt>
+    <dgm:pt modelId="{864CB39B-29F9-473D-90E5-0686D86E278F}" type="pres">
+      <dgm:prSet presAssocID="{60CDF8D0-D4FC-4467-A51E-79C5A58B0B2C}" presName="parentLeftMargin" presStyleLbl="node1" presStyleIdx="1" presStyleCnt="4"/>
+      <dgm:spPr/>
+    </dgm:pt>
+    <dgm:pt modelId="{5B203A22-00AF-46E7-9415-C6DAFD7E01CC}" type="pres">
+      <dgm:prSet presAssocID="{60CDF8D0-D4FC-4467-A51E-79C5A58B0B2C}" presName="parentText" presStyleLbl="node1" presStyleIdx="2" presStyleCnt="4">
+        <dgm:presLayoutVars>
+          <dgm:chMax val="0"/>
+          <dgm:bulletEnabled val="1"/>
+        </dgm:presLayoutVars>
+      </dgm:prSet>
+      <dgm:spPr/>
+    </dgm:pt>
+    <dgm:pt modelId="{DF9C1F84-81DE-4E5D-9537-C2D1A211B8B6}" type="pres">
+      <dgm:prSet presAssocID="{60CDF8D0-D4FC-4467-A51E-79C5A58B0B2C}" presName="negativeSpace" presStyleCnt="0"/>
+      <dgm:spPr/>
+    </dgm:pt>
+    <dgm:pt modelId="{964E6811-5072-4466-B721-689C35A65029}" type="pres">
+      <dgm:prSet presAssocID="{60CDF8D0-D4FC-4467-A51E-79C5A58B0B2C}" presName="childText" presStyleLbl="conFgAcc1" presStyleIdx="2" presStyleCnt="4">
+        <dgm:presLayoutVars>
+          <dgm:bulletEnabled val="1"/>
+        </dgm:presLayoutVars>
+      </dgm:prSet>
+      <dgm:spPr/>
+    </dgm:pt>
+    <dgm:pt modelId="{DCA04B6F-6528-484B-8DA8-5079E691A421}" type="pres">
+      <dgm:prSet presAssocID="{3F7FD59D-A716-4310-A89A-AB6F740D9FFF}" presName="spaceBetweenRectangles" presStyleCnt="0"/>
+      <dgm:spPr/>
+    </dgm:pt>
+    <dgm:pt modelId="{FF7246B5-2A49-4082-98BD-83EEA6857F58}" type="pres">
+      <dgm:prSet presAssocID="{811C00EC-AF2A-41BC-B4D9-02AB7BF66167}" presName="parentLin" presStyleCnt="0"/>
+      <dgm:spPr/>
+    </dgm:pt>
+    <dgm:pt modelId="{DCECB3F3-48FE-4150-B216-DF6D00C412A6}" type="pres">
+      <dgm:prSet presAssocID="{811C00EC-AF2A-41BC-B4D9-02AB7BF66167}" presName="parentLeftMargin" presStyleLbl="node1" presStyleIdx="2" presStyleCnt="4"/>
+      <dgm:spPr/>
+    </dgm:pt>
+    <dgm:pt modelId="{017C7AB9-C6C8-4BAC-ADBB-9FD707BE0F60}" type="pres">
+      <dgm:prSet presAssocID="{811C00EC-AF2A-41BC-B4D9-02AB7BF66167}" presName="parentText" presStyleLbl="node1" presStyleIdx="3" presStyleCnt="4">
+        <dgm:presLayoutVars>
+          <dgm:chMax val="0"/>
+          <dgm:bulletEnabled val="1"/>
+        </dgm:presLayoutVars>
+      </dgm:prSet>
+      <dgm:spPr/>
+    </dgm:pt>
+    <dgm:pt modelId="{89D033E3-793A-4FA3-BF04-638B783B537A}" type="pres">
+      <dgm:prSet presAssocID="{811C00EC-AF2A-41BC-B4D9-02AB7BF66167}" presName="negativeSpace" presStyleCnt="0"/>
+      <dgm:spPr/>
+    </dgm:pt>
+    <dgm:pt modelId="{432FD8AD-628D-4FE4-9A5D-06069E9A39D1}" type="pres">
+      <dgm:prSet presAssocID="{811C00EC-AF2A-41BC-B4D9-02AB7BF66167}" presName="childText" presStyleLbl="conFgAcc1" presStyleIdx="3" presStyleCnt="4">
+        <dgm:presLayoutVars>
+          <dgm:bulletEnabled val="1"/>
+        </dgm:presLayoutVars>
+      </dgm:prSet>
+      <dgm:spPr/>
+    </dgm:pt>
+  </dgm:ptLst>
+  <dgm:cxnLst>
+    <dgm:cxn modelId="{8FDA287C-F522-4798-84DD-FAE7202E2218}" srcId="{811C00EC-AF2A-41BC-B4D9-02AB7BF66167}" destId="{642344CB-74C8-44A2-9463-BFA935A3A62B}" srcOrd="0" destOrd="0" parTransId="{D88B29CC-9C89-46D1-9E57-A5161404AFCD}" sibTransId="{2BEF3B21-EA46-458C-9F13-3A6249480696}"/>
+    <dgm:cxn modelId="{133AB3BA-08EC-432D-814B-0243B8AEAE27}" type="presOf" srcId="{3F442EA2-39BA-4C9A-AD59-755D4917D532}" destId="{E6A445EE-D086-4B01-B491-D67950A5A065}" srcOrd="0" destOrd="0" presId="urn:microsoft.com/office/officeart/2005/8/layout/list1"/>
+    <dgm:cxn modelId="{9F679DC2-6B0E-43AA-A414-29A0BEBDE7EB}" type="presOf" srcId="{50629C12-7464-4473-ADEF-1A284F8A9957}" destId="{964E6811-5072-4466-B721-689C35A65029}" srcOrd="0" destOrd="0" presId="urn:microsoft.com/office/officeart/2005/8/layout/list1"/>
+    <dgm:cxn modelId="{EF39DC10-C489-4F29-BCDA-31D69D3CEE27}" type="presOf" srcId="{60CDF8D0-D4FC-4467-A51E-79C5A58B0B2C}" destId="{5B203A22-00AF-46E7-9415-C6DAFD7E01CC}" srcOrd="1" destOrd="0" presId="urn:microsoft.com/office/officeart/2005/8/layout/list1"/>
+    <dgm:cxn modelId="{EBD8BE8D-6018-43E2-B081-034BB5656EB6}" srcId="{3F442EA2-39BA-4C9A-AD59-755D4917D532}" destId="{4DF9FE7B-F642-4898-A360-D4E3814E1A3D}" srcOrd="0" destOrd="0" parTransId="{1C10F06D-860A-4604-A7AD-02E614FE3976}" sibTransId="{43C18EFF-81FC-4D70-8C6B-E95FF3730413}"/>
+    <dgm:cxn modelId="{09FCCB9D-A30A-4326-970E-26252D39327F}" srcId="{3929B1E1-4BC4-4C73-ABE8-27CEF96A3652}" destId="{99E0600D-9954-43F4-8926-13B8777FAAA1}" srcOrd="0" destOrd="0" parTransId="{BE23F476-2C5C-42ED-BF2B-CD5FC7ADDDF6}" sibTransId="{C44937DC-4907-4769-AA8B-1B3E7391D7B0}"/>
+    <dgm:cxn modelId="{1D32FCC9-657C-4348-9C0D-52115D559FEB}" srcId="{60CDF8D0-D4FC-4467-A51E-79C5A58B0B2C}" destId="{50629C12-7464-4473-ADEF-1A284F8A9957}" srcOrd="0" destOrd="0" parTransId="{9D1CB46C-0CFA-4B27-9224-267431FBD094}" sibTransId="{4576BCC5-0598-4332-A2E7-87AC3ADD4EB8}"/>
+    <dgm:cxn modelId="{3A76F5FD-AC51-43D5-A60D-6EA2DBBDF0F6}" type="presOf" srcId="{4DF9FE7B-F642-4898-A360-D4E3814E1A3D}" destId="{674922F1-7266-4681-AD4F-1C618A5FFF23}" srcOrd="1" destOrd="0" presId="urn:microsoft.com/office/officeart/2005/8/layout/list1"/>
+    <dgm:cxn modelId="{3E379D5E-3519-4604-8C91-9AEBC1B5DA6A}" type="presOf" srcId="{60CDF8D0-D4FC-4467-A51E-79C5A58B0B2C}" destId="{864CB39B-29F9-473D-90E5-0686D86E278F}" srcOrd="0" destOrd="0" presId="urn:microsoft.com/office/officeart/2005/8/layout/list1"/>
+    <dgm:cxn modelId="{706ABD05-1530-4082-93F2-868BABBF7119}" type="presOf" srcId="{811C00EC-AF2A-41BC-B4D9-02AB7BF66167}" destId="{DCECB3F3-48FE-4150-B216-DF6D00C412A6}" srcOrd="0" destOrd="0" presId="urn:microsoft.com/office/officeart/2005/8/layout/list1"/>
+    <dgm:cxn modelId="{1339090C-9A95-4C05-841C-FA3AF987601B}" srcId="{3F442EA2-39BA-4C9A-AD59-755D4917D532}" destId="{3929B1E1-4BC4-4C73-ABE8-27CEF96A3652}" srcOrd="1" destOrd="0" parTransId="{F356CC76-9117-4B79-A270-BBBAFD3E9C79}" sibTransId="{19BA0C22-38BB-4E9F-89D5-0FF5FF9F12CE}"/>
+    <dgm:cxn modelId="{A058DDA2-48CA-4E5B-B389-F71A59C262B0}" srcId="{4DF9FE7B-F642-4898-A360-D4E3814E1A3D}" destId="{EFF2750D-B4B3-474C-8B62-8B638DC31F7E}" srcOrd="0" destOrd="0" parTransId="{AEBC78E6-CDDC-4C8F-A157-3C51E907FACD}" sibTransId="{75C067D7-FCD2-4969-8F27-4BBDA88E75ED}"/>
+    <dgm:cxn modelId="{E12E128A-D14B-4DAD-B3C2-4C2D815371A8}" type="presOf" srcId="{3929B1E1-4BC4-4C73-ABE8-27CEF96A3652}" destId="{D0037F0D-DB9A-4BA4-97B4-D939B26E14DA}" srcOrd="0" destOrd="0" presId="urn:microsoft.com/office/officeart/2005/8/layout/list1"/>
+    <dgm:cxn modelId="{841BB473-ABE9-4F34-ADA3-6CC21D9F755C}" type="presOf" srcId="{642344CB-74C8-44A2-9463-BFA935A3A62B}" destId="{432FD8AD-628D-4FE4-9A5D-06069E9A39D1}" srcOrd="0" destOrd="0" presId="urn:microsoft.com/office/officeart/2005/8/layout/list1"/>
+    <dgm:cxn modelId="{91E8EE10-A24D-4E72-918C-DFE8B8A56CE9}" type="presOf" srcId="{EFF2750D-B4B3-474C-8B62-8B638DC31F7E}" destId="{80259B02-529C-422B-91BE-D70198BA9F6C}" srcOrd="0" destOrd="0" presId="urn:microsoft.com/office/officeart/2005/8/layout/list1"/>
+    <dgm:cxn modelId="{2BA65DEC-E719-4ED3-8135-48349D42DD04}" srcId="{3F442EA2-39BA-4C9A-AD59-755D4917D532}" destId="{60CDF8D0-D4FC-4467-A51E-79C5A58B0B2C}" srcOrd="2" destOrd="0" parTransId="{E12A269F-AB82-486A-9077-80F2BBBE48C2}" sibTransId="{3F7FD59D-A716-4310-A89A-AB6F740D9FFF}"/>
+    <dgm:cxn modelId="{E4084DFF-29F3-410F-A8D3-8196CAAA5DB9}" srcId="{3F442EA2-39BA-4C9A-AD59-755D4917D532}" destId="{811C00EC-AF2A-41BC-B4D9-02AB7BF66167}" srcOrd="3" destOrd="0" parTransId="{1BFE45BE-61AB-4FD4-83D0-99B56BDD0245}" sibTransId="{246B1081-1195-470B-AC85-81C4BB95A57C}"/>
+    <dgm:cxn modelId="{FC3C0DB7-9FD1-4688-8024-16D6F63718C0}" type="presOf" srcId="{99E0600D-9954-43F4-8926-13B8777FAAA1}" destId="{5282638F-EFF2-4770-BB1A-21455422E45D}" srcOrd="0" destOrd="0" presId="urn:microsoft.com/office/officeart/2005/8/layout/list1"/>
+    <dgm:cxn modelId="{D777451D-9818-431F-B600-33C7C8A40A98}" type="presOf" srcId="{3929B1E1-4BC4-4C73-ABE8-27CEF96A3652}" destId="{21EEBBE2-729F-4D85-8CAE-C2B30FF126D2}" srcOrd="1" destOrd="0" presId="urn:microsoft.com/office/officeart/2005/8/layout/list1"/>
+    <dgm:cxn modelId="{50B238DE-3A9C-48F6-8EA6-E05A25BDB667}" type="presOf" srcId="{811C00EC-AF2A-41BC-B4D9-02AB7BF66167}" destId="{017C7AB9-C6C8-4BAC-ADBB-9FD707BE0F60}" srcOrd="1" destOrd="0" presId="urn:microsoft.com/office/officeart/2005/8/layout/list1"/>
+    <dgm:cxn modelId="{F7E95423-786D-404D-8158-68B1C89303BF}" type="presOf" srcId="{4DF9FE7B-F642-4898-A360-D4E3814E1A3D}" destId="{7E290D25-335D-4339-A8E8-B036E46B5EB5}" srcOrd="0" destOrd="0" presId="urn:microsoft.com/office/officeart/2005/8/layout/list1"/>
+    <dgm:cxn modelId="{7C96F733-1FEB-4464-AFE2-A6FFE050E7F5}" type="presParOf" srcId="{E6A445EE-D086-4B01-B491-D67950A5A065}" destId="{6D3A9625-D3EB-4CA1-AB05-34452283708A}" srcOrd="0" destOrd="0" presId="urn:microsoft.com/office/officeart/2005/8/layout/list1"/>
+    <dgm:cxn modelId="{52625C28-CB81-4E22-A0FD-8E29373E6B1B}" type="presParOf" srcId="{6D3A9625-D3EB-4CA1-AB05-34452283708A}" destId="{7E290D25-335D-4339-A8E8-B036E46B5EB5}" srcOrd="0" destOrd="0" presId="urn:microsoft.com/office/officeart/2005/8/layout/list1"/>
+    <dgm:cxn modelId="{B0C612E2-3EE1-400E-AE2C-6D7A4CC4C27B}" type="presParOf" srcId="{6D3A9625-D3EB-4CA1-AB05-34452283708A}" destId="{674922F1-7266-4681-AD4F-1C618A5FFF23}" srcOrd="1" destOrd="0" presId="urn:microsoft.com/office/officeart/2005/8/layout/list1"/>
+    <dgm:cxn modelId="{4744E578-4CB5-48E8-A0C6-86520C5FA672}" type="presParOf" srcId="{E6A445EE-D086-4B01-B491-D67950A5A065}" destId="{96C29850-0672-4B77-B5DE-2E1563038631}" srcOrd="1" destOrd="0" presId="urn:microsoft.com/office/officeart/2005/8/layout/list1"/>
+    <dgm:cxn modelId="{9B31D144-B860-4AE0-AA2A-C3C20A8603D5}" type="presParOf" srcId="{E6A445EE-D086-4B01-B491-D67950A5A065}" destId="{80259B02-529C-422B-91BE-D70198BA9F6C}" srcOrd="2" destOrd="0" presId="urn:microsoft.com/office/officeart/2005/8/layout/list1"/>
+    <dgm:cxn modelId="{7C89F48A-EAC4-44E9-B2C3-D6045323FD07}" type="presParOf" srcId="{E6A445EE-D086-4B01-B491-D67950A5A065}" destId="{E53EFB4E-D3DB-42E1-82AC-148F7D29254F}" srcOrd="3" destOrd="0" presId="urn:microsoft.com/office/officeart/2005/8/layout/list1"/>
+    <dgm:cxn modelId="{BD05F436-0254-432E-8B09-A17511FE268A}" type="presParOf" srcId="{E6A445EE-D086-4B01-B491-D67950A5A065}" destId="{07AC1C38-F728-4390-9C76-57A49ED97DBB}" srcOrd="4" destOrd="0" presId="urn:microsoft.com/office/officeart/2005/8/layout/list1"/>
+    <dgm:cxn modelId="{C0A0D860-DA07-4CBB-91A5-F43E0D04FCF4}" type="presParOf" srcId="{07AC1C38-F728-4390-9C76-57A49ED97DBB}" destId="{D0037F0D-DB9A-4BA4-97B4-D939B26E14DA}" srcOrd="0" destOrd="0" presId="urn:microsoft.com/office/officeart/2005/8/layout/list1"/>
+    <dgm:cxn modelId="{7E09DDEB-EE25-4606-A71C-7D9B4BBA2CC8}" type="presParOf" srcId="{07AC1C38-F728-4390-9C76-57A49ED97DBB}" destId="{21EEBBE2-729F-4D85-8CAE-C2B30FF126D2}" srcOrd="1" destOrd="0" presId="urn:microsoft.com/office/officeart/2005/8/layout/list1"/>
+    <dgm:cxn modelId="{16B4A5AA-CD57-4E81-BD9D-EA0185BCFB1E}" type="presParOf" srcId="{E6A445EE-D086-4B01-B491-D67950A5A065}" destId="{AACB3FAF-C320-430D-84D4-71BA6D1761D1}" srcOrd="5" destOrd="0" presId="urn:microsoft.com/office/officeart/2005/8/layout/list1"/>
+    <dgm:cxn modelId="{87A76DD9-C373-44C0-9414-15DC155EA76E}" type="presParOf" srcId="{E6A445EE-D086-4B01-B491-D67950A5A065}" destId="{5282638F-EFF2-4770-BB1A-21455422E45D}" srcOrd="6" destOrd="0" presId="urn:microsoft.com/office/officeart/2005/8/layout/list1"/>
+    <dgm:cxn modelId="{0755B841-50A5-42EE-A8F3-8B0D460B67BC}" type="presParOf" srcId="{E6A445EE-D086-4B01-B491-D67950A5A065}" destId="{8CE827AA-77D8-4146-A665-00110A17769E}" srcOrd="7" destOrd="0" presId="urn:microsoft.com/office/officeart/2005/8/layout/list1"/>
+    <dgm:cxn modelId="{07113AD3-C775-48C9-830E-576F0EE07749}" type="presParOf" srcId="{E6A445EE-D086-4B01-B491-D67950A5A065}" destId="{34C9EE47-81AF-461E-8292-AB107AA0D367}" srcOrd="8" destOrd="0" presId="urn:microsoft.com/office/officeart/2005/8/layout/list1"/>
+    <dgm:cxn modelId="{4B7DC143-6BA8-45DE-B0C7-421B9E9D50BD}" type="presParOf" srcId="{34C9EE47-81AF-461E-8292-AB107AA0D367}" destId="{864CB39B-29F9-473D-90E5-0686D86E278F}" srcOrd="0" destOrd="0" presId="urn:microsoft.com/office/officeart/2005/8/layout/list1"/>
+    <dgm:cxn modelId="{5D8F5A1E-4827-449A-B310-63F6F8A02B3B}" type="presParOf" srcId="{34C9EE47-81AF-461E-8292-AB107AA0D367}" destId="{5B203A22-00AF-46E7-9415-C6DAFD7E01CC}" srcOrd="1" destOrd="0" presId="urn:microsoft.com/office/officeart/2005/8/layout/list1"/>
+    <dgm:cxn modelId="{1F844143-3020-41F3-A2B1-36CB25F670B9}" type="presParOf" srcId="{E6A445EE-D086-4B01-B491-D67950A5A065}" destId="{DF9C1F84-81DE-4E5D-9537-C2D1A211B8B6}" srcOrd="9" destOrd="0" presId="urn:microsoft.com/office/officeart/2005/8/layout/list1"/>
+    <dgm:cxn modelId="{361E8493-E05B-46F9-A5FF-F03C8BA97CD5}" type="presParOf" srcId="{E6A445EE-D086-4B01-B491-D67950A5A065}" destId="{964E6811-5072-4466-B721-689C35A65029}" srcOrd="10" destOrd="0" presId="urn:microsoft.com/office/officeart/2005/8/layout/list1"/>
+    <dgm:cxn modelId="{C3F1E51F-0BDF-41A8-ADA7-051AEE44BDD4}" type="presParOf" srcId="{E6A445EE-D086-4B01-B491-D67950A5A065}" destId="{DCA04B6F-6528-484B-8DA8-5079E691A421}" srcOrd="11" destOrd="0" presId="urn:microsoft.com/office/officeart/2005/8/layout/list1"/>
+    <dgm:cxn modelId="{0D34D14E-0264-4541-BFD6-AC43A3943133}" type="presParOf" srcId="{E6A445EE-D086-4B01-B491-D67950A5A065}" destId="{FF7246B5-2A49-4082-98BD-83EEA6857F58}" srcOrd="12" destOrd="0" presId="urn:microsoft.com/office/officeart/2005/8/layout/list1"/>
+    <dgm:cxn modelId="{809A327D-178F-44BE-A639-0EC7E71EC723}" type="presParOf" srcId="{FF7246B5-2A49-4082-98BD-83EEA6857F58}" destId="{DCECB3F3-48FE-4150-B216-DF6D00C412A6}" srcOrd="0" destOrd="0" presId="urn:microsoft.com/office/officeart/2005/8/layout/list1"/>
+    <dgm:cxn modelId="{99224BD7-D7DD-4DA1-86D6-66FEBF56B455}" type="presParOf" srcId="{FF7246B5-2A49-4082-98BD-83EEA6857F58}" destId="{017C7AB9-C6C8-4BAC-ADBB-9FD707BE0F60}" srcOrd="1" destOrd="0" presId="urn:microsoft.com/office/officeart/2005/8/layout/list1"/>
+    <dgm:cxn modelId="{E568908E-48EF-47D3-A915-33A1C10F25D9}" type="presParOf" srcId="{E6A445EE-D086-4B01-B491-D67950A5A065}" destId="{89D033E3-793A-4FA3-BF04-638B783B537A}" srcOrd="13" destOrd="0" presId="urn:microsoft.com/office/officeart/2005/8/layout/list1"/>
+    <dgm:cxn modelId="{B00CE83D-44D4-45C9-8830-5FD63FDC2BC0}" type="presParOf" srcId="{E6A445EE-D086-4B01-B491-D67950A5A065}" destId="{432FD8AD-628D-4FE4-9A5D-06069E9A39D1}" srcOrd="14" destOrd="0" presId="urn:microsoft.com/office/officeart/2005/8/layout/list1"/>
+  </dgm:cxnLst>
+  <dgm:bg/>
+  <dgm:whole/>
+  <dgm:extLst>
+    <a:ext uri="http://schemas.microsoft.com/office/drawing/2008/diagram">
+      <dsp:dataModelExt xmlns:dsp="http://schemas.microsoft.com/office/drawing/2008/diagram" relId="rId7" minVer="http://schemas.openxmlformats.org/drawingml/2006/diagram"/>
+    </a:ext>
+  </dgm:extLst>
+</dgm:dataModel>
+</file>
+
+<file path=ppt/diagrams/data4.xml><?xml version="1.0" encoding="utf-8"?>
+<dgm:dataModel xmlns:dgm="http://schemas.openxmlformats.org/drawingml/2006/diagram" xmlns:a="http://schemas.openxmlformats.org/drawingml/2006/main">
+  <dgm:ptLst>
+    <dgm:pt modelId="{3F442EA2-39BA-4C9A-AD59-755D4917D532}" type="doc">
+      <dgm:prSet loTypeId="urn:microsoft.com/office/officeart/2005/8/layout/list1" loCatId="list" qsTypeId="urn:microsoft.com/office/officeart/2005/8/quickstyle/simple1" qsCatId="simple" csTypeId="urn:microsoft.com/office/officeart/2005/8/colors/colorful3" csCatId="colorful" phldr="1"/>
+      <dgm:spPr/>
+      <dgm:t>
+        <a:bodyPr rtlCol="0"/>
+        <a:lstStyle/>
+        <a:p>
+          <a:pPr rtl="0"/>
+          <a:endParaRPr lang="en-US"/>
+        </a:p>
+      </dgm:t>
+    </dgm:pt>
+    <dgm:pt modelId="{4DF9FE7B-F642-4898-A360-D4E3814E1A3D}">
+      <dgm:prSet phldrT="[Text]"/>
+      <dgm:spPr/>
+      <dgm:t>
+        <a:bodyPr rtlCol="0"/>
+        <a:lstStyle/>
+        <a:p>
+          <a:pPr rtl="0"/>
+          <a:r>
+            <a:rPr lang="it" dirty="0"/>
+            <a:t>Pipeline 1</a:t>
+          </a:r>
+          <a:endParaRPr lang="en-US" dirty="0"/>
+        </a:p>
+      </dgm:t>
+    </dgm:pt>
+    <dgm:pt modelId="{1C10F06D-860A-4604-A7AD-02E614FE3976}" type="parTrans" cxnId="{EBD8BE8D-6018-43E2-B081-034BB5656EB6}">
+      <dgm:prSet/>
+      <dgm:spPr/>
+      <dgm:t>
+        <a:bodyPr rtlCol="0"/>
+        <a:lstStyle/>
+        <a:p>
+          <a:pPr rtl="0"/>
+          <a:endParaRPr lang="en-US"/>
+        </a:p>
+      </dgm:t>
+    </dgm:pt>
+    <dgm:pt modelId="{43C18EFF-81FC-4D70-8C6B-E95FF3730413}" type="sibTrans" cxnId="{EBD8BE8D-6018-43E2-B081-034BB5656EB6}">
+      <dgm:prSet/>
+      <dgm:spPr/>
+      <dgm:t>
+        <a:bodyPr rtlCol="0"/>
+        <a:lstStyle/>
+        <a:p>
+          <a:pPr rtl="0"/>
+          <a:endParaRPr lang="en-US"/>
+        </a:p>
+      </dgm:t>
+    </dgm:pt>
+    <dgm:pt modelId="{EFF2750D-B4B3-474C-8B62-8B638DC31F7E}">
+      <dgm:prSet phldrT="[Text]"/>
+      <dgm:spPr/>
+      <dgm:t>
+        <a:bodyPr rtlCol="0"/>
+        <a:lstStyle/>
+        <a:p>
+          <a:pPr rtl="0"/>
+          <a:r>
+            <a:rPr lang="it-IT" dirty="0"/>
+            <a:t>«</a:t>
+          </a:r>
+          <a:r>
+            <a:rPr lang="it-IT" dirty="0" err="1"/>
+            <a:t>s_mediana</a:t>
+          </a:r>
+          <a:r>
+            <a:rPr lang="it" dirty="0"/>
+            <a:t>» 99,6%, «s_alta» 99,3%</a:t>
+          </a:r>
+        </a:p>
+      </dgm:t>
+    </dgm:pt>
+    <dgm:pt modelId="{AEBC78E6-CDDC-4C8F-A157-3C51E907FACD}" type="parTrans" cxnId="{A058DDA2-48CA-4E5B-B389-F71A59C262B0}">
+      <dgm:prSet/>
+      <dgm:spPr/>
+      <dgm:t>
+        <a:bodyPr rtlCol="0"/>
+        <a:lstStyle/>
+        <a:p>
+          <a:pPr rtl="0"/>
+          <a:endParaRPr lang="en-US"/>
+        </a:p>
+      </dgm:t>
+    </dgm:pt>
+    <dgm:pt modelId="{75C067D7-FCD2-4969-8F27-4BBDA88E75ED}" type="sibTrans" cxnId="{A058DDA2-48CA-4E5B-B389-F71A59C262B0}">
+      <dgm:prSet/>
+      <dgm:spPr/>
+      <dgm:t>
+        <a:bodyPr rtlCol="0"/>
+        <a:lstStyle/>
+        <a:p>
+          <a:pPr rtl="0"/>
+          <a:endParaRPr lang="en-US"/>
+        </a:p>
+      </dgm:t>
+    </dgm:pt>
+    <dgm:pt modelId="{3929B1E1-4BC4-4C73-ABE8-27CEF96A3652}">
+      <dgm:prSet phldrT="[Text]"/>
+      <dgm:spPr/>
+      <dgm:t>
+        <a:bodyPr rtlCol="0"/>
+        <a:lstStyle/>
+        <a:p>
+          <a:pPr rtl="0"/>
+          <a:r>
+            <a:rPr lang="it" dirty="0"/>
+            <a:t>Pipeline 2</a:t>
+          </a:r>
+        </a:p>
+      </dgm:t>
+    </dgm:pt>
+    <dgm:pt modelId="{F356CC76-9117-4B79-A270-BBBAFD3E9C79}" type="parTrans" cxnId="{1339090C-9A95-4C05-841C-FA3AF987601B}">
+      <dgm:prSet/>
+      <dgm:spPr/>
+      <dgm:t>
+        <a:bodyPr rtlCol="0"/>
+        <a:lstStyle/>
+        <a:p>
+          <a:pPr rtl="0"/>
+          <a:endParaRPr lang="en-US"/>
+        </a:p>
+      </dgm:t>
+    </dgm:pt>
+    <dgm:pt modelId="{19BA0C22-38BB-4E9F-89D5-0FF5FF9F12CE}" type="sibTrans" cxnId="{1339090C-9A95-4C05-841C-FA3AF987601B}">
+      <dgm:prSet/>
+      <dgm:spPr/>
+      <dgm:t>
+        <a:bodyPr rtlCol="0"/>
+        <a:lstStyle/>
+        <a:p>
+          <a:pPr rtl="0"/>
+          <a:endParaRPr lang="en-US"/>
+        </a:p>
+      </dgm:t>
+    </dgm:pt>
+    <dgm:pt modelId="{99E0600D-9954-43F4-8926-13B8777FAAA1}">
+      <dgm:prSet phldrT="[Text]"/>
+      <dgm:spPr/>
+      <dgm:t>
+        <a:bodyPr rtlCol="0"/>
+        <a:lstStyle/>
+        <a:p>
+          <a:pPr rtl="0"/>
+          <a:r>
+            <a:rPr lang="it-IT" dirty="0"/>
+            <a:t>«</a:t>
+          </a:r>
+          <a:r>
+            <a:rPr lang="it-IT" dirty="0" err="1"/>
+            <a:t>s_alta</a:t>
+          </a:r>
+          <a:r>
+            <a:rPr lang="it-IT" dirty="0"/>
+            <a:t>» 97</a:t>
+          </a:r>
+          <a:r>
+            <a:rPr lang="it" dirty="0"/>
+            <a:t>%, «f» 2%</a:t>
+          </a:r>
+        </a:p>
+      </dgm:t>
+    </dgm:pt>
+    <dgm:pt modelId="{BE23F476-2C5C-42ED-BF2B-CD5FC7ADDDF6}" type="parTrans" cxnId="{09FCCB9D-A30A-4326-970E-26252D39327F}">
+      <dgm:prSet/>
+      <dgm:spPr/>
+      <dgm:t>
+        <a:bodyPr rtlCol="0"/>
+        <a:lstStyle/>
+        <a:p>
+          <a:pPr rtl="0"/>
+          <a:endParaRPr lang="en-US"/>
+        </a:p>
+      </dgm:t>
+    </dgm:pt>
+    <dgm:pt modelId="{C44937DC-4907-4769-AA8B-1B3E7391D7B0}" type="sibTrans" cxnId="{09FCCB9D-A30A-4326-970E-26252D39327F}">
+      <dgm:prSet/>
+      <dgm:spPr/>
+      <dgm:t>
+        <a:bodyPr rtlCol="0"/>
+        <a:lstStyle/>
+        <a:p>
+          <a:pPr rtl="0"/>
+          <a:endParaRPr lang="en-US"/>
+        </a:p>
+      </dgm:t>
+    </dgm:pt>
+    <dgm:pt modelId="{60CDF8D0-D4FC-4467-A51E-79C5A58B0B2C}">
+      <dgm:prSet phldrT="[Text]"/>
+      <dgm:spPr/>
+      <dgm:t>
+        <a:bodyPr rtlCol="0"/>
+        <a:lstStyle/>
+        <a:p>
+          <a:pPr rtl="0"/>
+          <a:r>
+            <a:rPr lang="it" dirty="0"/>
+            <a:t>Pipeline 3</a:t>
+          </a:r>
+        </a:p>
+      </dgm:t>
+    </dgm:pt>
+    <dgm:pt modelId="{E12A269F-AB82-486A-9077-80F2BBBE48C2}" type="parTrans" cxnId="{2BA65DEC-E719-4ED3-8135-48349D42DD04}">
+      <dgm:prSet/>
+      <dgm:spPr/>
+      <dgm:t>
+        <a:bodyPr rtlCol="0"/>
+        <a:lstStyle/>
+        <a:p>
+          <a:pPr rtl="0"/>
+          <a:endParaRPr lang="en-US"/>
+        </a:p>
+      </dgm:t>
+    </dgm:pt>
+    <dgm:pt modelId="{3F7FD59D-A716-4310-A89A-AB6F740D9FFF}" type="sibTrans" cxnId="{2BA65DEC-E719-4ED3-8135-48349D42DD04}">
+      <dgm:prSet/>
+      <dgm:spPr/>
+      <dgm:t>
+        <a:bodyPr rtlCol="0"/>
+        <a:lstStyle/>
+        <a:p>
+          <a:pPr rtl="0"/>
+          <a:endParaRPr lang="en-US"/>
+        </a:p>
+      </dgm:t>
+    </dgm:pt>
+    <dgm:pt modelId="{50629C12-7464-4473-ADEF-1A284F8A9957}">
+      <dgm:prSet phldrT="[Text]"/>
+      <dgm:spPr/>
+      <dgm:t>
+        <a:bodyPr rtlCol="0"/>
+        <a:lstStyle/>
+        <a:p>
+          <a:pPr rtl="0"/>
+          <a:r>
+            <a:rPr lang="it" dirty="0"/>
+            <a:t>Good cut 99,6% + «s_alta» 97%</a:t>
+          </a:r>
+        </a:p>
+      </dgm:t>
+    </dgm:pt>
+    <dgm:pt modelId="{9D1CB46C-0CFA-4B27-9224-267431FBD094}" type="parTrans" cxnId="{1D32FCC9-657C-4348-9C0D-52115D559FEB}">
+      <dgm:prSet/>
+      <dgm:spPr/>
+      <dgm:t>
+        <a:bodyPr rtlCol="0"/>
+        <a:lstStyle/>
+        <a:p>
+          <a:pPr rtl="0"/>
+          <a:endParaRPr lang="en-US"/>
+        </a:p>
+      </dgm:t>
+    </dgm:pt>
+    <dgm:pt modelId="{4576BCC5-0598-4332-A2E7-87AC3ADD4EB8}" type="sibTrans" cxnId="{1D32FCC9-657C-4348-9C0D-52115D559FEB}">
+      <dgm:prSet/>
+      <dgm:spPr/>
+      <dgm:t>
+        <a:bodyPr rtlCol="0"/>
+        <a:lstStyle/>
+        <a:p>
+          <a:pPr rtl="0"/>
+          <a:endParaRPr lang="en-US"/>
+        </a:p>
+      </dgm:t>
+    </dgm:pt>
+    <dgm:pt modelId="{811C00EC-AF2A-41BC-B4D9-02AB7BF66167}">
+      <dgm:prSet phldrT="[Text]"/>
+      <dgm:spPr/>
+      <dgm:t>
+        <a:bodyPr rtlCol="0"/>
+        <a:lstStyle/>
+        <a:p>
+          <a:pPr rtl="0"/>
+          <a:r>
+            <a:rPr lang="it" dirty="0"/>
+            <a:t>Pipeline 4</a:t>
+          </a:r>
+        </a:p>
+      </dgm:t>
+    </dgm:pt>
+    <dgm:pt modelId="{1BFE45BE-61AB-4FD4-83D0-99B56BDD0245}" type="parTrans" cxnId="{E4084DFF-29F3-410F-A8D3-8196CAAA5DB9}">
+      <dgm:prSet/>
+      <dgm:spPr/>
+      <dgm:t>
+        <a:bodyPr/>
+        <a:lstStyle/>
+        <a:p>
+          <a:endParaRPr lang="it-IT"/>
+        </a:p>
+      </dgm:t>
+    </dgm:pt>
+    <dgm:pt modelId="{246B1081-1195-470B-AC85-81C4BB95A57C}" type="sibTrans" cxnId="{E4084DFF-29F3-410F-A8D3-8196CAAA5DB9}">
+      <dgm:prSet/>
+      <dgm:spPr/>
+      <dgm:t>
+        <a:bodyPr/>
+        <a:lstStyle/>
+        <a:p>
+          <a:endParaRPr lang="it-IT"/>
+        </a:p>
+      </dgm:t>
+    </dgm:pt>
+    <dgm:pt modelId="{642344CB-74C8-44A2-9463-BFA935A3A62B}">
+      <dgm:prSet phldrT="[Text]"/>
+      <dgm:spPr/>
+      <dgm:t>
+        <a:bodyPr rtlCol="0"/>
+        <a:lstStyle/>
+        <a:p>
+          <a:pPr rtl="0"/>
+          <a:r>
+            <a:rPr lang="it-IT" dirty="0"/>
+            <a:t>«</a:t>
+          </a:r>
+          <a:r>
+            <a:rPr lang="it-IT" dirty="0" err="1"/>
+            <a:t>s_mediana</a:t>
+          </a:r>
+          <a:r>
+            <a:rPr lang="it" dirty="0"/>
+            <a:t>» 99,6%, «s_alta» 99,3%</a:t>
+          </a:r>
+          <a:endParaRPr lang="it" dirty="0"/>
         </a:p>
       </dgm:t>
     </dgm:pt>
@@ -5773,7 +7105,7 @@
           </a:pPr>
           <a:r>
             <a:rPr lang="it-IT" sz="1800" kern="1200" dirty="0"/>
-            <a:t>«h» 99</a:t>
+            <a:t>«h» 98</a:t>
           </a:r>
           <a:r>
             <a:rPr lang="it" sz="1800" kern="1200" dirty="0"/>
@@ -6089,6 +7421,668 @@
             <a:rPr lang="it" sz="1800" kern="1200" dirty="0"/>
             <a:t>«h» 98%</a:t>
           </a:r>
+        </a:p>
+      </dsp:txBody>
+      <dsp:txXfrm>
+        <a:off x="0" y="3727315"/>
+        <a:ext cx="5904655" cy="765450"/>
+      </dsp:txXfrm>
+    </dsp:sp>
+    <dsp:sp modelId="{017C7AB9-C6C8-4BAC-ADBB-9FD707BE0F60}">
+      <dsp:nvSpPr>
+        <dsp:cNvPr id="0" name=""/>
+        <dsp:cNvSpPr/>
+      </dsp:nvSpPr>
+      <dsp:spPr>
+        <a:xfrm>
+          <a:off x="295232" y="3461635"/>
+          <a:ext cx="4133258" cy="531360"/>
+        </a:xfrm>
+        <a:prstGeom prst="roundRect">
+          <a:avLst/>
+        </a:prstGeom>
+        <a:solidFill>
+          <a:schemeClr val="accent3">
+            <a:hueOff val="12522415"/>
+            <a:satOff val="-67259"/>
+            <a:lumOff val="1178"/>
+            <a:alphaOff val="0"/>
+          </a:schemeClr>
+        </a:solidFill>
+        <a:ln w="12700" cap="flat" cmpd="sng" algn="ctr">
+          <a:solidFill>
+            <a:schemeClr val="lt1">
+              <a:hueOff val="0"/>
+              <a:satOff val="0"/>
+              <a:lumOff val="0"/>
+              <a:alphaOff val="0"/>
+            </a:schemeClr>
+          </a:solidFill>
+          <a:prstDash val="solid"/>
+          <a:miter lim="800000"/>
+        </a:ln>
+        <a:effectLst/>
+      </dsp:spPr>
+      <dsp:style>
+        <a:lnRef idx="2">
+          <a:scrgbClr r="0" g="0" b="0"/>
+        </a:lnRef>
+        <a:fillRef idx="1">
+          <a:scrgbClr r="0" g="0" b="0"/>
+        </a:fillRef>
+        <a:effectRef idx="0">
+          <a:scrgbClr r="0" g="0" b="0"/>
+        </a:effectRef>
+        <a:fontRef idx="minor">
+          <a:schemeClr val="lt1"/>
+        </a:fontRef>
+      </dsp:style>
+      <dsp:txBody>
+        <a:bodyPr spcFirstLastPara="0" vert="horz" wrap="square" lIns="156227" tIns="0" rIns="156227" bIns="0" numCol="1" spcCol="1270" rtlCol="0" anchor="ctr" anchorCtr="0">
+          <a:noAutofit/>
+        </a:bodyPr>
+        <a:lstStyle/>
+        <a:p>
+          <a:pPr marL="0" lvl="0" indent="0" algn="l" defTabSz="800100" rtl="0">
+            <a:lnSpc>
+              <a:spcPct val="90000"/>
+            </a:lnSpc>
+            <a:spcBef>
+              <a:spcPct val="0"/>
+            </a:spcBef>
+            <a:spcAft>
+              <a:spcPct val="35000"/>
+            </a:spcAft>
+            <a:buNone/>
+          </a:pPr>
+          <a:r>
+            <a:rPr lang="it" sz="1800" kern="1200" dirty="0"/>
+            <a:t>Pipeline 4</a:t>
+          </a:r>
+        </a:p>
+      </dsp:txBody>
+      <dsp:txXfrm>
+        <a:off x="321171" y="3487574"/>
+        <a:ext cx="4081380" cy="479482"/>
+      </dsp:txXfrm>
+    </dsp:sp>
+  </dsp:spTree>
+</dsp:drawing>
+</file>
+
+<file path=ppt/diagrams/drawing4.xml><?xml version="1.0" encoding="utf-8"?>
+<dsp:drawing xmlns:dgm="http://schemas.openxmlformats.org/drawingml/2006/diagram" xmlns:dsp="http://schemas.microsoft.com/office/drawing/2008/diagram" xmlns:a="http://schemas.openxmlformats.org/drawingml/2006/main">
+  <dsp:spTree>
+    <dsp:nvGrpSpPr>
+      <dsp:cNvPr id="0" name=""/>
+      <dsp:cNvGrpSpPr/>
+    </dsp:nvGrpSpPr>
+    <dsp:grpSpPr/>
+    <dsp:sp modelId="{80259B02-529C-422B-91BE-D70198BA9F6C}">
+      <dsp:nvSpPr>
+        <dsp:cNvPr id="0" name=""/>
+        <dsp:cNvSpPr/>
+      </dsp:nvSpPr>
+      <dsp:spPr>
+        <a:xfrm>
+          <a:off x="0" y="342325"/>
+          <a:ext cx="5904655" cy="765450"/>
+        </a:xfrm>
+        <a:prstGeom prst="rect">
+          <a:avLst/>
+        </a:prstGeom>
+        <a:solidFill>
+          <a:schemeClr val="lt1">
+            <a:alpha val="90000"/>
+            <a:hueOff val="0"/>
+            <a:satOff val="0"/>
+            <a:lumOff val="0"/>
+            <a:alphaOff val="0"/>
+          </a:schemeClr>
+        </a:solidFill>
+        <a:ln w="12700" cap="flat" cmpd="sng" algn="ctr">
+          <a:solidFill>
+            <a:schemeClr val="accent3">
+              <a:hueOff val="0"/>
+              <a:satOff val="0"/>
+              <a:lumOff val="0"/>
+              <a:alphaOff val="0"/>
+            </a:schemeClr>
+          </a:solidFill>
+          <a:prstDash val="solid"/>
+          <a:miter lim="800000"/>
+        </a:ln>
+        <a:effectLst/>
+      </dsp:spPr>
+      <dsp:style>
+        <a:lnRef idx="2">
+          <a:scrgbClr r="0" g="0" b="0"/>
+        </a:lnRef>
+        <a:fillRef idx="1">
+          <a:scrgbClr r="0" g="0" b="0"/>
+        </a:fillRef>
+        <a:effectRef idx="0">
+          <a:scrgbClr r="0" g="0" b="0"/>
+        </a:effectRef>
+        <a:fontRef idx="minor"/>
+      </dsp:style>
+      <dsp:txBody>
+        <a:bodyPr spcFirstLastPara="0" vert="horz" wrap="square" lIns="458267" tIns="374904" rIns="458267" bIns="128016" numCol="1" spcCol="1270" rtlCol="0" anchor="t" anchorCtr="0">
+          <a:noAutofit/>
+        </a:bodyPr>
+        <a:lstStyle/>
+        <a:p>
+          <a:pPr marL="171450" lvl="1" indent="-171450" algn="l" defTabSz="800100" rtl="0">
+            <a:lnSpc>
+              <a:spcPct val="90000"/>
+            </a:lnSpc>
+            <a:spcBef>
+              <a:spcPct val="0"/>
+            </a:spcBef>
+            <a:spcAft>
+              <a:spcPct val="15000"/>
+            </a:spcAft>
+            <a:buChar char="•"/>
+          </a:pPr>
+          <a:r>
+            <a:rPr lang="it-IT" sz="1800" kern="1200" dirty="0"/>
+            <a:t>«</a:t>
+          </a:r>
+          <a:r>
+            <a:rPr lang="it-IT" sz="1800" kern="1200" dirty="0" err="1"/>
+            <a:t>s_mediana</a:t>
+          </a:r>
+          <a:r>
+            <a:rPr lang="it" sz="1800" kern="1200" dirty="0"/>
+            <a:t>» 99,6%, «s_alta» 99,3%</a:t>
+          </a:r>
+        </a:p>
+      </dsp:txBody>
+      <dsp:txXfrm>
+        <a:off x="0" y="342325"/>
+        <a:ext cx="5904655" cy="765450"/>
+      </dsp:txXfrm>
+    </dsp:sp>
+    <dsp:sp modelId="{674922F1-7266-4681-AD4F-1C618A5FFF23}">
+      <dsp:nvSpPr>
+        <dsp:cNvPr id="0" name=""/>
+        <dsp:cNvSpPr/>
+      </dsp:nvSpPr>
+      <dsp:spPr>
+        <a:xfrm>
+          <a:off x="295232" y="76645"/>
+          <a:ext cx="4133258" cy="531360"/>
+        </a:xfrm>
+        <a:prstGeom prst="roundRect">
+          <a:avLst/>
+        </a:prstGeom>
+        <a:solidFill>
+          <a:schemeClr val="accent3">
+            <a:hueOff val="0"/>
+            <a:satOff val="0"/>
+            <a:lumOff val="0"/>
+            <a:alphaOff val="0"/>
+          </a:schemeClr>
+        </a:solidFill>
+        <a:ln w="12700" cap="flat" cmpd="sng" algn="ctr">
+          <a:solidFill>
+            <a:schemeClr val="lt1">
+              <a:hueOff val="0"/>
+              <a:satOff val="0"/>
+              <a:lumOff val="0"/>
+              <a:alphaOff val="0"/>
+            </a:schemeClr>
+          </a:solidFill>
+          <a:prstDash val="solid"/>
+          <a:miter lim="800000"/>
+        </a:ln>
+        <a:effectLst/>
+      </dsp:spPr>
+      <dsp:style>
+        <a:lnRef idx="2">
+          <a:scrgbClr r="0" g="0" b="0"/>
+        </a:lnRef>
+        <a:fillRef idx="1">
+          <a:scrgbClr r="0" g="0" b="0"/>
+        </a:fillRef>
+        <a:effectRef idx="0">
+          <a:scrgbClr r="0" g="0" b="0"/>
+        </a:effectRef>
+        <a:fontRef idx="minor">
+          <a:schemeClr val="lt1"/>
+        </a:fontRef>
+      </dsp:style>
+      <dsp:txBody>
+        <a:bodyPr spcFirstLastPara="0" vert="horz" wrap="square" lIns="156227" tIns="0" rIns="156227" bIns="0" numCol="1" spcCol="1270" rtlCol="0" anchor="ctr" anchorCtr="0">
+          <a:noAutofit/>
+        </a:bodyPr>
+        <a:lstStyle/>
+        <a:p>
+          <a:pPr marL="0" lvl="0" indent="0" algn="l" defTabSz="800100" rtl="0">
+            <a:lnSpc>
+              <a:spcPct val="90000"/>
+            </a:lnSpc>
+            <a:spcBef>
+              <a:spcPct val="0"/>
+            </a:spcBef>
+            <a:spcAft>
+              <a:spcPct val="35000"/>
+            </a:spcAft>
+            <a:buNone/>
+          </a:pPr>
+          <a:r>
+            <a:rPr lang="it" sz="1800" kern="1200" dirty="0"/>
+            <a:t>Pipeline 1</a:t>
+          </a:r>
+          <a:endParaRPr lang="en-US" sz="1800" kern="1200" dirty="0"/>
+        </a:p>
+      </dsp:txBody>
+      <dsp:txXfrm>
+        <a:off x="321171" y="102584"/>
+        <a:ext cx="4081380" cy="479482"/>
+      </dsp:txXfrm>
+    </dsp:sp>
+    <dsp:sp modelId="{5282638F-EFF2-4770-BB1A-21455422E45D}">
+      <dsp:nvSpPr>
+        <dsp:cNvPr id="0" name=""/>
+        <dsp:cNvSpPr/>
+      </dsp:nvSpPr>
+      <dsp:spPr>
+        <a:xfrm>
+          <a:off x="0" y="1470655"/>
+          <a:ext cx="5904655" cy="765450"/>
+        </a:xfrm>
+        <a:prstGeom prst="rect">
+          <a:avLst/>
+        </a:prstGeom>
+        <a:solidFill>
+          <a:schemeClr val="lt1">
+            <a:alpha val="90000"/>
+            <a:hueOff val="0"/>
+            <a:satOff val="0"/>
+            <a:lumOff val="0"/>
+            <a:alphaOff val="0"/>
+          </a:schemeClr>
+        </a:solidFill>
+        <a:ln w="12700" cap="flat" cmpd="sng" algn="ctr">
+          <a:solidFill>
+            <a:schemeClr val="accent3">
+              <a:hueOff val="4174138"/>
+              <a:satOff val="-22420"/>
+              <a:lumOff val="393"/>
+              <a:alphaOff val="0"/>
+            </a:schemeClr>
+          </a:solidFill>
+          <a:prstDash val="solid"/>
+          <a:miter lim="800000"/>
+        </a:ln>
+        <a:effectLst/>
+      </dsp:spPr>
+      <dsp:style>
+        <a:lnRef idx="2">
+          <a:scrgbClr r="0" g="0" b="0"/>
+        </a:lnRef>
+        <a:fillRef idx="1">
+          <a:scrgbClr r="0" g="0" b="0"/>
+        </a:fillRef>
+        <a:effectRef idx="0">
+          <a:scrgbClr r="0" g="0" b="0"/>
+        </a:effectRef>
+        <a:fontRef idx="minor"/>
+      </dsp:style>
+      <dsp:txBody>
+        <a:bodyPr spcFirstLastPara="0" vert="horz" wrap="square" lIns="458267" tIns="374904" rIns="458267" bIns="128016" numCol="1" spcCol="1270" rtlCol="0" anchor="t" anchorCtr="0">
+          <a:noAutofit/>
+        </a:bodyPr>
+        <a:lstStyle/>
+        <a:p>
+          <a:pPr marL="171450" lvl="1" indent="-171450" algn="l" defTabSz="800100" rtl="0">
+            <a:lnSpc>
+              <a:spcPct val="90000"/>
+            </a:lnSpc>
+            <a:spcBef>
+              <a:spcPct val="0"/>
+            </a:spcBef>
+            <a:spcAft>
+              <a:spcPct val="15000"/>
+            </a:spcAft>
+            <a:buChar char="•"/>
+          </a:pPr>
+          <a:r>
+            <a:rPr lang="it-IT" sz="1800" kern="1200" dirty="0"/>
+            <a:t>«</a:t>
+          </a:r>
+          <a:r>
+            <a:rPr lang="it-IT" sz="1800" kern="1200" dirty="0" err="1"/>
+            <a:t>s_alta</a:t>
+          </a:r>
+          <a:r>
+            <a:rPr lang="it-IT" sz="1800" kern="1200" dirty="0"/>
+            <a:t>» 97</a:t>
+          </a:r>
+          <a:r>
+            <a:rPr lang="it" sz="1800" kern="1200" dirty="0"/>
+            <a:t>%, «f» 2%</a:t>
+          </a:r>
+        </a:p>
+      </dsp:txBody>
+      <dsp:txXfrm>
+        <a:off x="0" y="1470655"/>
+        <a:ext cx="5904655" cy="765450"/>
+      </dsp:txXfrm>
+    </dsp:sp>
+    <dsp:sp modelId="{21EEBBE2-729F-4D85-8CAE-C2B30FF126D2}">
+      <dsp:nvSpPr>
+        <dsp:cNvPr id="0" name=""/>
+        <dsp:cNvSpPr/>
+      </dsp:nvSpPr>
+      <dsp:spPr>
+        <a:xfrm>
+          <a:off x="295232" y="1204975"/>
+          <a:ext cx="4133258" cy="531360"/>
+        </a:xfrm>
+        <a:prstGeom prst="roundRect">
+          <a:avLst/>
+        </a:prstGeom>
+        <a:solidFill>
+          <a:schemeClr val="accent3">
+            <a:hueOff val="4174138"/>
+            <a:satOff val="-22420"/>
+            <a:lumOff val="393"/>
+            <a:alphaOff val="0"/>
+          </a:schemeClr>
+        </a:solidFill>
+        <a:ln w="12700" cap="flat" cmpd="sng" algn="ctr">
+          <a:solidFill>
+            <a:schemeClr val="lt1">
+              <a:hueOff val="0"/>
+              <a:satOff val="0"/>
+              <a:lumOff val="0"/>
+              <a:alphaOff val="0"/>
+            </a:schemeClr>
+          </a:solidFill>
+          <a:prstDash val="solid"/>
+          <a:miter lim="800000"/>
+        </a:ln>
+        <a:effectLst/>
+      </dsp:spPr>
+      <dsp:style>
+        <a:lnRef idx="2">
+          <a:scrgbClr r="0" g="0" b="0"/>
+        </a:lnRef>
+        <a:fillRef idx="1">
+          <a:scrgbClr r="0" g="0" b="0"/>
+        </a:fillRef>
+        <a:effectRef idx="0">
+          <a:scrgbClr r="0" g="0" b="0"/>
+        </a:effectRef>
+        <a:fontRef idx="minor">
+          <a:schemeClr val="lt1"/>
+        </a:fontRef>
+      </dsp:style>
+      <dsp:txBody>
+        <a:bodyPr spcFirstLastPara="0" vert="horz" wrap="square" lIns="156227" tIns="0" rIns="156227" bIns="0" numCol="1" spcCol="1270" rtlCol="0" anchor="ctr" anchorCtr="0">
+          <a:noAutofit/>
+        </a:bodyPr>
+        <a:lstStyle/>
+        <a:p>
+          <a:pPr marL="0" lvl="0" indent="0" algn="l" defTabSz="800100" rtl="0">
+            <a:lnSpc>
+              <a:spcPct val="90000"/>
+            </a:lnSpc>
+            <a:spcBef>
+              <a:spcPct val="0"/>
+            </a:spcBef>
+            <a:spcAft>
+              <a:spcPct val="35000"/>
+            </a:spcAft>
+            <a:buNone/>
+          </a:pPr>
+          <a:r>
+            <a:rPr lang="it" sz="1800" kern="1200" dirty="0"/>
+            <a:t>Pipeline 2</a:t>
+          </a:r>
+        </a:p>
+      </dsp:txBody>
+      <dsp:txXfrm>
+        <a:off x="321171" y="1230914"/>
+        <a:ext cx="4081380" cy="479482"/>
+      </dsp:txXfrm>
+    </dsp:sp>
+    <dsp:sp modelId="{964E6811-5072-4466-B721-689C35A65029}">
+      <dsp:nvSpPr>
+        <dsp:cNvPr id="0" name=""/>
+        <dsp:cNvSpPr/>
+      </dsp:nvSpPr>
+      <dsp:spPr>
+        <a:xfrm>
+          <a:off x="0" y="2598985"/>
+          <a:ext cx="5904655" cy="765450"/>
+        </a:xfrm>
+        <a:prstGeom prst="rect">
+          <a:avLst/>
+        </a:prstGeom>
+        <a:solidFill>
+          <a:schemeClr val="lt1">
+            <a:alpha val="90000"/>
+            <a:hueOff val="0"/>
+            <a:satOff val="0"/>
+            <a:lumOff val="0"/>
+            <a:alphaOff val="0"/>
+          </a:schemeClr>
+        </a:solidFill>
+        <a:ln w="12700" cap="flat" cmpd="sng" algn="ctr">
+          <a:solidFill>
+            <a:schemeClr val="accent3">
+              <a:hueOff val="8348276"/>
+              <a:satOff val="-44839"/>
+              <a:lumOff val="785"/>
+              <a:alphaOff val="0"/>
+            </a:schemeClr>
+          </a:solidFill>
+          <a:prstDash val="solid"/>
+          <a:miter lim="800000"/>
+        </a:ln>
+        <a:effectLst/>
+      </dsp:spPr>
+      <dsp:style>
+        <a:lnRef idx="2">
+          <a:scrgbClr r="0" g="0" b="0"/>
+        </a:lnRef>
+        <a:fillRef idx="1">
+          <a:scrgbClr r="0" g="0" b="0"/>
+        </a:fillRef>
+        <a:effectRef idx="0">
+          <a:scrgbClr r="0" g="0" b="0"/>
+        </a:effectRef>
+        <a:fontRef idx="minor"/>
+      </dsp:style>
+      <dsp:txBody>
+        <a:bodyPr spcFirstLastPara="0" vert="horz" wrap="square" lIns="458267" tIns="374904" rIns="458267" bIns="128016" numCol="1" spcCol="1270" rtlCol="0" anchor="t" anchorCtr="0">
+          <a:noAutofit/>
+        </a:bodyPr>
+        <a:lstStyle/>
+        <a:p>
+          <a:pPr marL="171450" lvl="1" indent="-171450" algn="l" defTabSz="800100" rtl="0">
+            <a:lnSpc>
+              <a:spcPct val="90000"/>
+            </a:lnSpc>
+            <a:spcBef>
+              <a:spcPct val="0"/>
+            </a:spcBef>
+            <a:spcAft>
+              <a:spcPct val="15000"/>
+            </a:spcAft>
+            <a:buChar char="•"/>
+          </a:pPr>
+          <a:r>
+            <a:rPr lang="it" sz="1800" kern="1200" dirty="0"/>
+            <a:t>Good cut 99,6% + «s_alta» 97%</a:t>
+          </a:r>
+        </a:p>
+      </dsp:txBody>
+      <dsp:txXfrm>
+        <a:off x="0" y="2598985"/>
+        <a:ext cx="5904655" cy="765450"/>
+      </dsp:txXfrm>
+    </dsp:sp>
+    <dsp:sp modelId="{5B203A22-00AF-46E7-9415-C6DAFD7E01CC}">
+      <dsp:nvSpPr>
+        <dsp:cNvPr id="0" name=""/>
+        <dsp:cNvSpPr/>
+      </dsp:nvSpPr>
+      <dsp:spPr>
+        <a:xfrm>
+          <a:off x="295232" y="2333305"/>
+          <a:ext cx="4133258" cy="531360"/>
+        </a:xfrm>
+        <a:prstGeom prst="roundRect">
+          <a:avLst/>
+        </a:prstGeom>
+        <a:solidFill>
+          <a:schemeClr val="accent3">
+            <a:hueOff val="8348276"/>
+            <a:satOff val="-44839"/>
+            <a:lumOff val="785"/>
+            <a:alphaOff val="0"/>
+          </a:schemeClr>
+        </a:solidFill>
+        <a:ln w="12700" cap="flat" cmpd="sng" algn="ctr">
+          <a:solidFill>
+            <a:schemeClr val="lt1">
+              <a:hueOff val="0"/>
+              <a:satOff val="0"/>
+              <a:lumOff val="0"/>
+              <a:alphaOff val="0"/>
+            </a:schemeClr>
+          </a:solidFill>
+          <a:prstDash val="solid"/>
+          <a:miter lim="800000"/>
+        </a:ln>
+        <a:effectLst/>
+      </dsp:spPr>
+      <dsp:style>
+        <a:lnRef idx="2">
+          <a:scrgbClr r="0" g="0" b="0"/>
+        </a:lnRef>
+        <a:fillRef idx="1">
+          <a:scrgbClr r="0" g="0" b="0"/>
+        </a:fillRef>
+        <a:effectRef idx="0">
+          <a:scrgbClr r="0" g="0" b="0"/>
+        </a:effectRef>
+        <a:fontRef idx="minor">
+          <a:schemeClr val="lt1"/>
+        </a:fontRef>
+      </dsp:style>
+      <dsp:txBody>
+        <a:bodyPr spcFirstLastPara="0" vert="horz" wrap="square" lIns="156227" tIns="0" rIns="156227" bIns="0" numCol="1" spcCol="1270" rtlCol="0" anchor="ctr" anchorCtr="0">
+          <a:noAutofit/>
+        </a:bodyPr>
+        <a:lstStyle/>
+        <a:p>
+          <a:pPr marL="0" lvl="0" indent="0" algn="l" defTabSz="800100" rtl="0">
+            <a:lnSpc>
+              <a:spcPct val="90000"/>
+            </a:lnSpc>
+            <a:spcBef>
+              <a:spcPct val="0"/>
+            </a:spcBef>
+            <a:spcAft>
+              <a:spcPct val="35000"/>
+            </a:spcAft>
+            <a:buNone/>
+          </a:pPr>
+          <a:r>
+            <a:rPr lang="it" sz="1800" kern="1200" dirty="0"/>
+            <a:t>Pipeline 3</a:t>
+          </a:r>
+        </a:p>
+      </dsp:txBody>
+      <dsp:txXfrm>
+        <a:off x="321171" y="2359244"/>
+        <a:ext cx="4081380" cy="479482"/>
+      </dsp:txXfrm>
+    </dsp:sp>
+    <dsp:sp modelId="{432FD8AD-628D-4FE4-9A5D-06069E9A39D1}">
+      <dsp:nvSpPr>
+        <dsp:cNvPr id="0" name=""/>
+        <dsp:cNvSpPr/>
+      </dsp:nvSpPr>
+      <dsp:spPr>
+        <a:xfrm>
+          <a:off x="0" y="3727315"/>
+          <a:ext cx="5904655" cy="765450"/>
+        </a:xfrm>
+        <a:prstGeom prst="rect">
+          <a:avLst/>
+        </a:prstGeom>
+        <a:solidFill>
+          <a:schemeClr val="lt1">
+            <a:alpha val="90000"/>
+            <a:hueOff val="0"/>
+            <a:satOff val="0"/>
+            <a:lumOff val="0"/>
+            <a:alphaOff val="0"/>
+          </a:schemeClr>
+        </a:solidFill>
+        <a:ln w="12700" cap="flat" cmpd="sng" algn="ctr">
+          <a:solidFill>
+            <a:schemeClr val="accent3">
+              <a:hueOff val="12522415"/>
+              <a:satOff val="-67259"/>
+              <a:lumOff val="1178"/>
+              <a:alphaOff val="0"/>
+            </a:schemeClr>
+          </a:solidFill>
+          <a:prstDash val="solid"/>
+          <a:miter lim="800000"/>
+        </a:ln>
+        <a:effectLst/>
+      </dsp:spPr>
+      <dsp:style>
+        <a:lnRef idx="2">
+          <a:scrgbClr r="0" g="0" b="0"/>
+        </a:lnRef>
+        <a:fillRef idx="1">
+          <a:scrgbClr r="0" g="0" b="0"/>
+        </a:fillRef>
+        <a:effectRef idx="0">
+          <a:scrgbClr r="0" g="0" b="0"/>
+        </a:effectRef>
+        <a:fontRef idx="minor"/>
+      </dsp:style>
+      <dsp:txBody>
+        <a:bodyPr spcFirstLastPara="0" vert="horz" wrap="square" lIns="458267" tIns="374904" rIns="458267" bIns="128016" numCol="1" spcCol="1270" rtlCol="0" anchor="t" anchorCtr="0">
+          <a:noAutofit/>
+        </a:bodyPr>
+        <a:lstStyle/>
+        <a:p>
+          <a:pPr marL="171450" lvl="1" indent="-171450" algn="l" defTabSz="800100" rtl="0">
+            <a:lnSpc>
+              <a:spcPct val="90000"/>
+            </a:lnSpc>
+            <a:spcBef>
+              <a:spcPct val="0"/>
+            </a:spcBef>
+            <a:spcAft>
+              <a:spcPct val="15000"/>
+            </a:spcAft>
+            <a:buChar char="•"/>
+          </a:pPr>
+          <a:r>
+            <a:rPr lang="it-IT" sz="1800" kern="1200" dirty="0"/>
+            <a:t>«</a:t>
+          </a:r>
+          <a:r>
+            <a:rPr lang="it-IT" sz="1800" kern="1200" dirty="0" err="1"/>
+            <a:t>s_mediana</a:t>
+          </a:r>
+          <a:r>
+            <a:rPr lang="it" sz="1800" kern="1200" dirty="0"/>
+            <a:t>» 99,6%, «s_alta» 99,3%</a:t>
+          </a:r>
+          <a:endParaRPr lang="it" sz="1800" kern="1200" dirty="0"/>
         </a:p>
       </dsp:txBody>
       <dsp:txXfrm>
@@ -6853,6 +8847,231 @@
 </dgm:layoutDef>
 </file>
 
+<file path=ppt/diagrams/layout4.xml><?xml version="1.0" encoding="utf-8"?>
+<dgm:layoutDef xmlns:dgm="http://schemas.openxmlformats.org/drawingml/2006/diagram" xmlns:a="http://schemas.openxmlformats.org/drawingml/2006/main" uniqueId="urn:microsoft.com/office/officeart/2005/8/layout/list1">
+  <dgm:title val=""/>
+  <dgm:desc val=""/>
+  <dgm:catLst>
+    <dgm:cat type="list" pri="4000"/>
+  </dgm:catLst>
+  <dgm:sampData>
+    <dgm:dataModel>
+      <dgm:ptLst>
+        <dgm:pt modelId="0" type="doc"/>
+        <dgm:pt modelId="1">
+          <dgm:prSet phldr="1"/>
+        </dgm:pt>
+        <dgm:pt modelId="2">
+          <dgm:prSet phldr="1"/>
+        </dgm:pt>
+        <dgm:pt modelId="3">
+          <dgm:prSet phldr="1"/>
+        </dgm:pt>
+      </dgm:ptLst>
+      <dgm:cxnLst>
+        <dgm:cxn modelId="4" srcId="0" destId="1" srcOrd="0" destOrd="0"/>
+        <dgm:cxn modelId="5" srcId="0" destId="2" srcOrd="1" destOrd="0"/>
+        <dgm:cxn modelId="6" srcId="0" destId="3" srcOrd="2" destOrd="0"/>
+      </dgm:cxnLst>
+      <dgm:bg/>
+      <dgm:whole/>
+    </dgm:dataModel>
+  </dgm:sampData>
+  <dgm:styleData>
+    <dgm:dataModel>
+      <dgm:ptLst>
+        <dgm:pt modelId="0" type="doc"/>
+        <dgm:pt modelId="1"/>
+        <dgm:pt modelId="2"/>
+      </dgm:ptLst>
+      <dgm:cxnLst>
+        <dgm:cxn modelId="4" srcId="0" destId="1" srcOrd="0" destOrd="0"/>
+        <dgm:cxn modelId="5" srcId="0" destId="2" srcOrd="1" destOrd="0"/>
+      </dgm:cxnLst>
+      <dgm:bg/>
+      <dgm:whole/>
+    </dgm:dataModel>
+  </dgm:styleData>
+  <dgm:clrData>
+    <dgm:dataModel>
+      <dgm:ptLst>
+        <dgm:pt modelId="0" type="doc"/>
+        <dgm:pt modelId="1"/>
+        <dgm:pt modelId="2"/>
+        <dgm:pt modelId="3"/>
+        <dgm:pt modelId="4"/>
+      </dgm:ptLst>
+      <dgm:cxnLst>
+        <dgm:cxn modelId="5" srcId="0" destId="1" srcOrd="0" destOrd="0"/>
+        <dgm:cxn modelId="6" srcId="0" destId="2" srcOrd="1" destOrd="0"/>
+        <dgm:cxn modelId="7" srcId="0" destId="3" srcOrd="2" destOrd="0"/>
+        <dgm:cxn modelId="8" srcId="0" destId="4" srcOrd="3" destOrd="0"/>
+      </dgm:cxnLst>
+      <dgm:bg/>
+      <dgm:whole/>
+    </dgm:dataModel>
+  </dgm:clrData>
+  <dgm:layoutNode name="linear">
+    <dgm:varLst>
+      <dgm:dir/>
+      <dgm:animLvl val="lvl"/>
+      <dgm:resizeHandles val="exact"/>
+    </dgm:varLst>
+    <dgm:choose name="Name0">
+      <dgm:if name="Name1" func="var" arg="dir" op="equ" val="norm">
+        <dgm:alg type="lin">
+          <dgm:param type="linDir" val="fromT"/>
+          <dgm:param type="vertAlign" val="mid"/>
+          <dgm:param type="horzAlign" val="l"/>
+          <dgm:param type="nodeHorzAlign" val="l"/>
+        </dgm:alg>
+      </dgm:if>
+      <dgm:else name="Name2">
+        <dgm:alg type="lin">
+          <dgm:param type="linDir" val="fromT"/>
+          <dgm:param type="vertAlign" val="mid"/>
+          <dgm:param type="horzAlign" val="r"/>
+          <dgm:param type="nodeHorzAlign" val="r"/>
+        </dgm:alg>
+      </dgm:else>
+    </dgm:choose>
+    <dgm:shape xmlns:r="http://schemas.openxmlformats.org/officeDocument/2006/relationships" r:blip="">
+      <dgm:adjLst/>
+    </dgm:shape>
+    <dgm:presOf/>
+    <dgm:constrLst>
+      <dgm:constr type="w" for="ch" forName="parentLin" refType="w"/>
+      <dgm:constr type="h" for="ch" forName="parentLin" val="INF"/>
+      <dgm:constr type="w" for="des" forName="parentLeftMargin" refType="w" fact="0.05"/>
+      <dgm:constr type="w" for="des" forName="parentText" refType="w" fact="0.7"/>
+      <dgm:constr type="h" for="des" forName="parentText" refType="primFontSz" refFor="des" refForName="parentText" fact="0.82"/>
+      <dgm:constr type="h" for="ch" forName="negativeSpace" refType="primFontSz" refFor="des" refForName="parentText" fact="-0.41"/>
+      <dgm:constr type="h" for="ch" forName="negativeSpace" refType="h" refFor="des" refForName="parentText" op="lte" fact="-0.82"/>
+      <dgm:constr type="h" for="ch" forName="negativeSpace" refType="h" refFor="des" refForName="parentText" op="gte" fact="-0.82"/>
+      <dgm:constr type="w" for="ch" forName="childText" refType="w"/>
+      <dgm:constr type="h" for="ch" forName="childText" refType="primFontSz" refFor="des" refForName="parentText" fact="0.7"/>
+      <dgm:constr type="primFontSz" for="des" forName="parentText" val="65"/>
+      <dgm:constr type="primFontSz" for="ch" forName="childText" refType="primFontSz" refFor="des" refForName="parentText"/>
+      <dgm:constr type="tMarg" for="ch" forName="childText" refType="primFontSz" refFor="des" refForName="parentText" fact="1.64"/>
+      <dgm:constr type="tMarg" for="ch" forName="childText" refType="h" refFor="des" refForName="parentText" op="lte" fact="3.28"/>
+      <dgm:constr type="tMarg" for="ch" forName="childText" refType="h" refFor="des" refForName="parentText" op="gte" fact="3.28"/>
+      <dgm:constr type="lMarg" for="ch" forName="childText" refType="w" fact="0.22"/>
+      <dgm:constr type="rMarg" for="ch" forName="childText" refType="lMarg" refFor="ch" refForName="childText"/>
+      <dgm:constr type="lMarg" for="des" forName="parentText" refType="w" fact="0.075"/>
+      <dgm:constr type="rMarg" for="des" forName="parentText" refType="lMarg" refFor="des" refForName="parentText"/>
+      <dgm:constr type="h" for="ch" forName="spaceBetweenRectangles" refType="primFontSz" refFor="des" refForName="parentText" fact="0.15"/>
+    </dgm:constrLst>
+    <dgm:ruleLst>
+      <dgm:rule type="primFontSz" for="des" forName="parentText" val="5" fact="NaN" max="NaN"/>
+    </dgm:ruleLst>
+    <dgm:forEach name="Name3" axis="ch" ptType="node">
+      <dgm:layoutNode name="parentLin">
+        <dgm:choose name="Name4">
+          <dgm:if name="Name5" func="var" arg="dir" op="equ" val="norm">
+            <dgm:alg type="lin">
+              <dgm:param type="linDir" val="fromL"/>
+              <dgm:param type="horzAlign" val="l"/>
+              <dgm:param type="nodeHorzAlign" val="l"/>
+            </dgm:alg>
+          </dgm:if>
+          <dgm:else name="Name6">
+            <dgm:alg type="lin">
+              <dgm:param type="linDir" val="fromR"/>
+              <dgm:param type="horzAlign" val="r"/>
+              <dgm:param type="nodeHorzAlign" val="r"/>
+            </dgm:alg>
+          </dgm:else>
+        </dgm:choose>
+        <dgm:shape xmlns:r="http://schemas.openxmlformats.org/officeDocument/2006/relationships" r:blip="">
+          <dgm:adjLst/>
+        </dgm:shape>
+        <dgm:presOf/>
+        <dgm:constrLst/>
+        <dgm:ruleLst/>
+        <dgm:layoutNode name="parentLeftMargin">
+          <dgm:alg type="sp"/>
+          <dgm:shape xmlns:r="http://schemas.openxmlformats.org/officeDocument/2006/relationships" type="rect" r:blip="" hideGeom="1">
+            <dgm:adjLst/>
+          </dgm:shape>
+          <dgm:presOf axis="self"/>
+          <dgm:constrLst>
+            <dgm:constr type="h"/>
+          </dgm:constrLst>
+          <dgm:ruleLst/>
+        </dgm:layoutNode>
+        <dgm:layoutNode name="parentText" styleLbl="node1">
+          <dgm:varLst>
+            <dgm:chMax val="0"/>
+            <dgm:bulletEnabled val="1"/>
+          </dgm:varLst>
+          <dgm:choose name="Name7">
+            <dgm:if name="Name8" func="var" arg="dir" op="equ" val="norm">
+              <dgm:alg type="tx">
+                <dgm:param type="parTxLTRAlign" val="l"/>
+                <dgm:param type="parTxRTLAlign" val="l"/>
+              </dgm:alg>
+            </dgm:if>
+            <dgm:else name="Name9">
+              <dgm:alg type="tx">
+                <dgm:param type="parTxLTRAlign" val="r"/>
+                <dgm:param type="parTxRTLAlign" val="r"/>
+              </dgm:alg>
+            </dgm:else>
+          </dgm:choose>
+          <dgm:shape xmlns:r="http://schemas.openxmlformats.org/officeDocument/2006/relationships" type="roundRect" r:blip="">
+            <dgm:adjLst/>
+          </dgm:shape>
+          <dgm:presOf axis="self" ptType="node"/>
+          <dgm:constrLst>
+            <dgm:constr type="tMarg"/>
+            <dgm:constr type="bMarg"/>
+          </dgm:constrLst>
+          <dgm:ruleLst/>
+        </dgm:layoutNode>
+      </dgm:layoutNode>
+      <dgm:layoutNode name="negativeSpace">
+        <dgm:alg type="sp"/>
+        <dgm:shape xmlns:r="http://schemas.openxmlformats.org/officeDocument/2006/relationships" r:blip="">
+          <dgm:adjLst/>
+        </dgm:shape>
+        <dgm:presOf/>
+        <dgm:constrLst/>
+        <dgm:ruleLst/>
+      </dgm:layoutNode>
+      <dgm:layoutNode name="childText" styleLbl="conFgAcc1">
+        <dgm:varLst>
+          <dgm:bulletEnabled val="1"/>
+        </dgm:varLst>
+        <dgm:alg type="tx">
+          <dgm:param type="stBulletLvl" val="1"/>
+        </dgm:alg>
+        <dgm:shape xmlns:r="http://schemas.openxmlformats.org/officeDocument/2006/relationships" type="rect" r:blip="" zOrderOff="-2">
+          <dgm:adjLst/>
+        </dgm:shape>
+        <dgm:presOf axis="des" ptType="node"/>
+        <dgm:constrLst>
+          <dgm:constr type="secFontSz" refType="primFontSz"/>
+        </dgm:constrLst>
+        <dgm:ruleLst>
+          <dgm:rule type="h" val="INF" fact="NaN" max="NaN"/>
+        </dgm:ruleLst>
+      </dgm:layoutNode>
+      <dgm:forEach name="Name10" axis="followSib" ptType="sibTrans" cnt="1">
+        <dgm:layoutNode name="spaceBetweenRectangles">
+          <dgm:alg type="sp"/>
+          <dgm:shape xmlns:r="http://schemas.openxmlformats.org/officeDocument/2006/relationships" r:blip="">
+            <dgm:adjLst/>
+          </dgm:shape>
+          <dgm:presOf/>
+          <dgm:constrLst/>
+          <dgm:ruleLst/>
+        </dgm:layoutNode>
+      </dgm:forEach>
+    </dgm:forEach>
+  </dgm:layoutNode>
+</dgm:layoutDef>
+</file>
+
 <file path=ppt/diagrams/quickStyle1.xml><?xml version="1.0" encoding="utf-8"?>
 <dgm:styleDef xmlns:dgm="http://schemas.openxmlformats.org/drawingml/2006/diagram" xmlns:a="http://schemas.openxmlformats.org/drawingml/2006/main" uniqueId="urn:microsoft.com/office/officeart/2005/8/quickstyle/simple1">
   <dgm:title val=""/>
@@ -8922,6 +11141,1040 @@
 </file>
 
 <file path=ppt/diagrams/quickStyle3.xml><?xml version="1.0" encoding="utf-8"?>
+<dgm:styleDef xmlns:dgm="http://schemas.openxmlformats.org/drawingml/2006/diagram" xmlns:a="http://schemas.openxmlformats.org/drawingml/2006/main" uniqueId="urn:microsoft.com/office/officeart/2005/8/quickstyle/simple1">
+  <dgm:title val=""/>
+  <dgm:desc val=""/>
+  <dgm:catLst>
+    <dgm:cat type="simple" pri="10100"/>
+  </dgm:catLst>
+  <dgm:scene3d>
+    <a:camera prst="orthographicFront"/>
+    <a:lightRig rig="threePt" dir="t"/>
+  </dgm:scene3d>
+  <dgm:styleLbl name="node0">
+    <dgm:scene3d>
+      <a:camera prst="orthographicFront"/>
+      <a:lightRig rig="threePt" dir="t"/>
+    </dgm:scene3d>
+    <dgm:sp3d/>
+    <dgm:txPr/>
+    <dgm:style>
+      <a:lnRef idx="2">
+        <a:scrgbClr r="0" g="0" b="0"/>
+      </a:lnRef>
+      <a:fillRef idx="1">
+        <a:scrgbClr r="0" g="0" b="0"/>
+      </a:fillRef>
+      <a:effectRef idx="0">
+        <a:scrgbClr r="0" g="0" b="0"/>
+      </a:effectRef>
+      <a:fontRef idx="minor">
+        <a:schemeClr val="lt1"/>
+      </a:fontRef>
+    </dgm:style>
+  </dgm:styleLbl>
+  <dgm:styleLbl name="lnNode1">
+    <dgm:scene3d>
+      <a:camera prst="orthographicFront"/>
+      <a:lightRig rig="threePt" dir="t"/>
+    </dgm:scene3d>
+    <dgm:sp3d/>
+    <dgm:txPr/>
+    <dgm:style>
+      <a:lnRef idx="2">
+        <a:scrgbClr r="0" g="0" b="0"/>
+      </a:lnRef>
+      <a:fillRef idx="1">
+        <a:scrgbClr r="0" g="0" b="0"/>
+      </a:fillRef>
+      <a:effectRef idx="0">
+        <a:scrgbClr r="0" g="0" b="0"/>
+      </a:effectRef>
+      <a:fontRef idx="minor">
+        <a:schemeClr val="lt1"/>
+      </a:fontRef>
+    </dgm:style>
+  </dgm:styleLbl>
+  <dgm:styleLbl name="vennNode1">
+    <dgm:scene3d>
+      <a:camera prst="orthographicFront"/>
+      <a:lightRig rig="threePt" dir="t"/>
+    </dgm:scene3d>
+    <dgm:sp3d/>
+    <dgm:txPr/>
+    <dgm:style>
+      <a:lnRef idx="2">
+        <a:scrgbClr r="0" g="0" b="0"/>
+      </a:lnRef>
+      <a:fillRef idx="1">
+        <a:scrgbClr r="0" g="0" b="0"/>
+      </a:fillRef>
+      <a:effectRef idx="0">
+        <a:scrgbClr r="0" g="0" b="0"/>
+      </a:effectRef>
+      <a:fontRef idx="minor">
+        <a:schemeClr val="tx1"/>
+      </a:fontRef>
+    </dgm:style>
+  </dgm:styleLbl>
+  <dgm:styleLbl name="alignNode1">
+    <dgm:scene3d>
+      <a:camera prst="orthographicFront"/>
+      <a:lightRig rig="threePt" dir="t"/>
+    </dgm:scene3d>
+    <dgm:sp3d/>
+    <dgm:txPr/>
+    <dgm:style>
+      <a:lnRef idx="2">
+        <a:scrgbClr r="0" g="0" b="0"/>
+      </a:lnRef>
+      <a:fillRef idx="1">
+        <a:scrgbClr r="0" g="0" b="0"/>
+      </a:fillRef>
+      <a:effectRef idx="0">
+        <a:scrgbClr r="0" g="0" b="0"/>
+      </a:effectRef>
+      <a:fontRef idx="minor">
+        <a:schemeClr val="lt1"/>
+      </a:fontRef>
+    </dgm:style>
+  </dgm:styleLbl>
+  <dgm:styleLbl name="node1">
+    <dgm:scene3d>
+      <a:camera prst="orthographicFront"/>
+      <a:lightRig rig="threePt" dir="t"/>
+    </dgm:scene3d>
+    <dgm:sp3d/>
+    <dgm:txPr/>
+    <dgm:style>
+      <a:lnRef idx="2">
+        <a:scrgbClr r="0" g="0" b="0"/>
+      </a:lnRef>
+      <a:fillRef idx="1">
+        <a:scrgbClr r="0" g="0" b="0"/>
+      </a:fillRef>
+      <a:effectRef idx="0">
+        <a:scrgbClr r="0" g="0" b="0"/>
+      </a:effectRef>
+      <a:fontRef idx="minor">
+        <a:schemeClr val="lt1"/>
+      </a:fontRef>
+    </dgm:style>
+  </dgm:styleLbl>
+  <dgm:styleLbl name="node2">
+    <dgm:scene3d>
+      <a:camera prst="orthographicFront"/>
+      <a:lightRig rig="threePt" dir="t"/>
+    </dgm:scene3d>
+    <dgm:sp3d/>
+    <dgm:txPr/>
+    <dgm:style>
+      <a:lnRef idx="2">
+        <a:scrgbClr r="0" g="0" b="0"/>
+      </a:lnRef>
+      <a:fillRef idx="1">
+        <a:scrgbClr r="0" g="0" b="0"/>
+      </a:fillRef>
+      <a:effectRef idx="0">
+        <a:scrgbClr r="0" g="0" b="0"/>
+      </a:effectRef>
+      <a:fontRef idx="minor">
+        <a:schemeClr val="lt1"/>
+      </a:fontRef>
+    </dgm:style>
+  </dgm:styleLbl>
+  <dgm:styleLbl name="node3">
+    <dgm:scene3d>
+      <a:camera prst="orthographicFront"/>
+      <a:lightRig rig="threePt" dir="t"/>
+    </dgm:scene3d>
+    <dgm:sp3d/>
+    <dgm:txPr/>
+    <dgm:style>
+      <a:lnRef idx="2">
+        <a:scrgbClr r="0" g="0" b="0"/>
+      </a:lnRef>
+      <a:fillRef idx="1">
+        <a:scrgbClr r="0" g="0" b="0"/>
+      </a:fillRef>
+      <a:effectRef idx="0">
+        <a:scrgbClr r="0" g="0" b="0"/>
+      </a:effectRef>
+      <a:fontRef idx="minor">
+        <a:schemeClr val="lt1"/>
+      </a:fontRef>
+    </dgm:style>
+  </dgm:styleLbl>
+  <dgm:styleLbl name="node4">
+    <dgm:scene3d>
+      <a:camera prst="orthographicFront"/>
+      <a:lightRig rig="threePt" dir="t"/>
+    </dgm:scene3d>
+    <dgm:sp3d/>
+    <dgm:txPr/>
+    <dgm:style>
+      <a:lnRef idx="2">
+        <a:scrgbClr r="0" g="0" b="0"/>
+      </a:lnRef>
+      <a:fillRef idx="1">
+        <a:scrgbClr r="0" g="0" b="0"/>
+      </a:fillRef>
+      <a:effectRef idx="0">
+        <a:scrgbClr r="0" g="0" b="0"/>
+      </a:effectRef>
+      <a:fontRef idx="minor">
+        <a:schemeClr val="lt1"/>
+      </a:fontRef>
+    </dgm:style>
+  </dgm:styleLbl>
+  <dgm:styleLbl name="fgImgPlace1">
+    <dgm:scene3d>
+      <a:camera prst="orthographicFront"/>
+      <a:lightRig rig="threePt" dir="t"/>
+    </dgm:scene3d>
+    <dgm:sp3d/>
+    <dgm:txPr/>
+    <dgm:style>
+      <a:lnRef idx="2">
+        <a:scrgbClr r="0" g="0" b="0"/>
+      </a:lnRef>
+      <a:fillRef idx="1">
+        <a:scrgbClr r="0" g="0" b="0"/>
+      </a:fillRef>
+      <a:effectRef idx="0">
+        <a:scrgbClr r="0" g="0" b="0"/>
+      </a:effectRef>
+      <a:fontRef idx="minor"/>
+    </dgm:style>
+  </dgm:styleLbl>
+  <dgm:styleLbl name="alignImgPlace1">
+    <dgm:scene3d>
+      <a:camera prst="orthographicFront"/>
+      <a:lightRig rig="threePt" dir="t"/>
+    </dgm:scene3d>
+    <dgm:sp3d/>
+    <dgm:txPr/>
+    <dgm:style>
+      <a:lnRef idx="2">
+        <a:scrgbClr r="0" g="0" b="0"/>
+      </a:lnRef>
+      <a:fillRef idx="1">
+        <a:scrgbClr r="0" g="0" b="0"/>
+      </a:fillRef>
+      <a:effectRef idx="0">
+        <a:scrgbClr r="0" g="0" b="0"/>
+      </a:effectRef>
+      <a:fontRef idx="minor"/>
+    </dgm:style>
+  </dgm:styleLbl>
+  <dgm:styleLbl name="bgImgPlace1">
+    <dgm:scene3d>
+      <a:camera prst="orthographicFront"/>
+      <a:lightRig rig="threePt" dir="t"/>
+    </dgm:scene3d>
+    <dgm:sp3d/>
+    <dgm:txPr/>
+    <dgm:style>
+      <a:lnRef idx="2">
+        <a:scrgbClr r="0" g="0" b="0"/>
+      </a:lnRef>
+      <a:fillRef idx="1">
+        <a:scrgbClr r="0" g="0" b="0"/>
+      </a:fillRef>
+      <a:effectRef idx="0">
+        <a:scrgbClr r="0" g="0" b="0"/>
+      </a:effectRef>
+      <a:fontRef idx="minor"/>
+    </dgm:style>
+  </dgm:styleLbl>
+  <dgm:styleLbl name="sibTrans2D1">
+    <dgm:scene3d>
+      <a:camera prst="orthographicFront"/>
+      <a:lightRig rig="threePt" dir="t"/>
+    </dgm:scene3d>
+    <dgm:sp3d/>
+    <dgm:txPr/>
+    <dgm:style>
+      <a:lnRef idx="0">
+        <a:scrgbClr r="0" g="0" b="0"/>
+      </a:lnRef>
+      <a:fillRef idx="1">
+        <a:scrgbClr r="0" g="0" b="0"/>
+      </a:fillRef>
+      <a:effectRef idx="0">
+        <a:scrgbClr r="0" g="0" b="0"/>
+      </a:effectRef>
+      <a:fontRef idx="minor">
+        <a:schemeClr val="lt1"/>
+      </a:fontRef>
+    </dgm:style>
+  </dgm:styleLbl>
+  <dgm:styleLbl name="fgSibTrans2D1">
+    <dgm:scene3d>
+      <a:camera prst="orthographicFront"/>
+      <a:lightRig rig="threePt" dir="t"/>
+    </dgm:scene3d>
+    <dgm:sp3d/>
+    <dgm:txPr/>
+    <dgm:style>
+      <a:lnRef idx="0">
+        <a:scrgbClr r="0" g="0" b="0"/>
+      </a:lnRef>
+      <a:fillRef idx="1">
+        <a:scrgbClr r="0" g="0" b="0"/>
+      </a:fillRef>
+      <a:effectRef idx="0">
+        <a:scrgbClr r="0" g="0" b="0"/>
+      </a:effectRef>
+      <a:fontRef idx="minor">
+        <a:schemeClr val="lt1"/>
+      </a:fontRef>
+    </dgm:style>
+  </dgm:styleLbl>
+  <dgm:styleLbl name="bgSibTrans2D1">
+    <dgm:scene3d>
+      <a:camera prst="orthographicFront"/>
+      <a:lightRig rig="threePt" dir="t"/>
+    </dgm:scene3d>
+    <dgm:sp3d/>
+    <dgm:txPr/>
+    <dgm:style>
+      <a:lnRef idx="0">
+        <a:scrgbClr r="0" g="0" b="0"/>
+      </a:lnRef>
+      <a:fillRef idx="1">
+        <a:scrgbClr r="0" g="0" b="0"/>
+      </a:fillRef>
+      <a:effectRef idx="0">
+        <a:scrgbClr r="0" g="0" b="0"/>
+      </a:effectRef>
+      <a:fontRef idx="minor">
+        <a:schemeClr val="lt1"/>
+      </a:fontRef>
+    </dgm:style>
+  </dgm:styleLbl>
+  <dgm:styleLbl name="sibTrans1D1">
+    <dgm:scene3d>
+      <a:camera prst="orthographicFront"/>
+      <a:lightRig rig="threePt" dir="t"/>
+    </dgm:scene3d>
+    <dgm:sp3d/>
+    <dgm:txPr/>
+    <dgm:style>
+      <a:lnRef idx="1">
+        <a:scrgbClr r="0" g="0" b="0"/>
+      </a:lnRef>
+      <a:fillRef idx="0">
+        <a:scrgbClr r="0" g="0" b="0"/>
+      </a:fillRef>
+      <a:effectRef idx="0">
+        <a:scrgbClr r="0" g="0" b="0"/>
+      </a:effectRef>
+      <a:fontRef idx="minor"/>
+    </dgm:style>
+  </dgm:styleLbl>
+  <dgm:styleLbl name="callout">
+    <dgm:scene3d>
+      <a:camera prst="orthographicFront"/>
+      <a:lightRig rig="threePt" dir="t"/>
+    </dgm:scene3d>
+    <dgm:sp3d/>
+    <dgm:txPr/>
+    <dgm:style>
+      <a:lnRef idx="2">
+        <a:scrgbClr r="0" g="0" b="0"/>
+      </a:lnRef>
+      <a:fillRef idx="1">
+        <a:scrgbClr r="0" g="0" b="0"/>
+      </a:fillRef>
+      <a:effectRef idx="0">
+        <a:scrgbClr r="0" g="0" b="0"/>
+      </a:effectRef>
+      <a:fontRef idx="minor"/>
+    </dgm:style>
+  </dgm:styleLbl>
+  <dgm:styleLbl name="asst0">
+    <dgm:scene3d>
+      <a:camera prst="orthographicFront"/>
+      <a:lightRig rig="threePt" dir="t"/>
+    </dgm:scene3d>
+    <dgm:sp3d/>
+    <dgm:txPr/>
+    <dgm:style>
+      <a:lnRef idx="2">
+        <a:scrgbClr r="0" g="0" b="0"/>
+      </a:lnRef>
+      <a:fillRef idx="1">
+        <a:scrgbClr r="0" g="0" b="0"/>
+      </a:fillRef>
+      <a:effectRef idx="0">
+        <a:scrgbClr r="0" g="0" b="0"/>
+      </a:effectRef>
+      <a:fontRef idx="minor">
+        <a:schemeClr val="lt1"/>
+      </a:fontRef>
+    </dgm:style>
+  </dgm:styleLbl>
+  <dgm:styleLbl name="asst1">
+    <dgm:scene3d>
+      <a:camera prst="orthographicFront"/>
+      <a:lightRig rig="threePt" dir="t"/>
+    </dgm:scene3d>
+    <dgm:sp3d/>
+    <dgm:txPr/>
+    <dgm:style>
+      <a:lnRef idx="2">
+        <a:scrgbClr r="0" g="0" b="0"/>
+      </a:lnRef>
+      <a:fillRef idx="1">
+        <a:scrgbClr r="0" g="0" b="0"/>
+      </a:fillRef>
+      <a:effectRef idx="0">
+        <a:scrgbClr r="0" g="0" b="0"/>
+      </a:effectRef>
+      <a:fontRef idx="minor">
+        <a:schemeClr val="lt1"/>
+      </a:fontRef>
+    </dgm:style>
+  </dgm:styleLbl>
+  <dgm:styleLbl name="asst2">
+    <dgm:scene3d>
+      <a:camera prst="orthographicFront"/>
+      <a:lightRig rig="threePt" dir="t"/>
+    </dgm:scene3d>
+    <dgm:sp3d/>
+    <dgm:txPr/>
+    <dgm:style>
+      <a:lnRef idx="2">
+        <a:scrgbClr r="0" g="0" b="0"/>
+      </a:lnRef>
+      <a:fillRef idx="1">
+        <a:scrgbClr r="0" g="0" b="0"/>
+      </a:fillRef>
+      <a:effectRef idx="0">
+        <a:scrgbClr r="0" g="0" b="0"/>
+      </a:effectRef>
+      <a:fontRef idx="minor">
+        <a:schemeClr val="lt1"/>
+      </a:fontRef>
+    </dgm:style>
+  </dgm:styleLbl>
+  <dgm:styleLbl name="asst3">
+    <dgm:scene3d>
+      <a:camera prst="orthographicFront"/>
+      <a:lightRig rig="threePt" dir="t"/>
+    </dgm:scene3d>
+    <dgm:sp3d/>
+    <dgm:txPr/>
+    <dgm:style>
+      <a:lnRef idx="2">
+        <a:scrgbClr r="0" g="0" b="0"/>
+      </a:lnRef>
+      <a:fillRef idx="1">
+        <a:scrgbClr r="0" g="0" b="0"/>
+      </a:fillRef>
+      <a:effectRef idx="0">
+        <a:scrgbClr r="0" g="0" b="0"/>
+      </a:effectRef>
+      <a:fontRef idx="minor">
+        <a:schemeClr val="lt1"/>
+      </a:fontRef>
+    </dgm:style>
+  </dgm:styleLbl>
+  <dgm:styleLbl name="asst4">
+    <dgm:scene3d>
+      <a:camera prst="orthographicFront"/>
+      <a:lightRig rig="threePt" dir="t"/>
+    </dgm:scene3d>
+    <dgm:sp3d/>
+    <dgm:txPr/>
+    <dgm:style>
+      <a:lnRef idx="2">
+        <a:scrgbClr r="0" g="0" b="0"/>
+      </a:lnRef>
+      <a:fillRef idx="1">
+        <a:scrgbClr r="0" g="0" b="0"/>
+      </a:fillRef>
+      <a:effectRef idx="0">
+        <a:scrgbClr r="0" g="0" b="0"/>
+      </a:effectRef>
+      <a:fontRef idx="minor">
+        <a:schemeClr val="lt1"/>
+      </a:fontRef>
+    </dgm:style>
+  </dgm:styleLbl>
+  <dgm:styleLbl name="parChTrans2D1">
+    <dgm:scene3d>
+      <a:camera prst="orthographicFront"/>
+      <a:lightRig rig="threePt" dir="t"/>
+    </dgm:scene3d>
+    <dgm:sp3d/>
+    <dgm:txPr/>
+    <dgm:style>
+      <a:lnRef idx="2">
+        <a:scrgbClr r="0" g="0" b="0"/>
+      </a:lnRef>
+      <a:fillRef idx="1">
+        <a:scrgbClr r="0" g="0" b="0"/>
+      </a:fillRef>
+      <a:effectRef idx="0">
+        <a:scrgbClr r="0" g="0" b="0"/>
+      </a:effectRef>
+      <a:fontRef idx="minor">
+        <a:schemeClr val="lt1"/>
+      </a:fontRef>
+    </dgm:style>
+  </dgm:styleLbl>
+  <dgm:styleLbl name="parChTrans2D2">
+    <dgm:scene3d>
+      <a:camera prst="orthographicFront"/>
+      <a:lightRig rig="threePt" dir="t"/>
+    </dgm:scene3d>
+    <dgm:sp3d/>
+    <dgm:txPr/>
+    <dgm:style>
+      <a:lnRef idx="2">
+        <a:scrgbClr r="0" g="0" b="0"/>
+      </a:lnRef>
+      <a:fillRef idx="1">
+        <a:scrgbClr r="0" g="0" b="0"/>
+      </a:fillRef>
+      <a:effectRef idx="0">
+        <a:scrgbClr r="0" g="0" b="0"/>
+      </a:effectRef>
+      <a:fontRef idx="minor">
+        <a:schemeClr val="lt1"/>
+      </a:fontRef>
+    </dgm:style>
+  </dgm:styleLbl>
+  <dgm:styleLbl name="parChTrans2D3">
+    <dgm:scene3d>
+      <a:camera prst="orthographicFront"/>
+      <a:lightRig rig="threePt" dir="t"/>
+    </dgm:scene3d>
+    <dgm:sp3d/>
+    <dgm:txPr/>
+    <dgm:style>
+      <a:lnRef idx="2">
+        <a:scrgbClr r="0" g="0" b="0"/>
+      </a:lnRef>
+      <a:fillRef idx="1">
+        <a:scrgbClr r="0" g="0" b="0"/>
+      </a:fillRef>
+      <a:effectRef idx="0">
+        <a:scrgbClr r="0" g="0" b="0"/>
+      </a:effectRef>
+      <a:fontRef idx="minor">
+        <a:schemeClr val="lt1"/>
+      </a:fontRef>
+    </dgm:style>
+  </dgm:styleLbl>
+  <dgm:styleLbl name="parChTrans2D4">
+    <dgm:scene3d>
+      <a:camera prst="orthographicFront"/>
+      <a:lightRig rig="threePt" dir="t"/>
+    </dgm:scene3d>
+    <dgm:sp3d/>
+    <dgm:txPr/>
+    <dgm:style>
+      <a:lnRef idx="2">
+        <a:scrgbClr r="0" g="0" b="0"/>
+      </a:lnRef>
+      <a:fillRef idx="1">
+        <a:scrgbClr r="0" g="0" b="0"/>
+      </a:fillRef>
+      <a:effectRef idx="0">
+        <a:scrgbClr r="0" g="0" b="0"/>
+      </a:effectRef>
+      <a:fontRef idx="minor">
+        <a:schemeClr val="lt1"/>
+      </a:fontRef>
+    </dgm:style>
+  </dgm:styleLbl>
+  <dgm:styleLbl name="parChTrans1D1">
+    <dgm:scene3d>
+      <a:camera prst="orthographicFront"/>
+      <a:lightRig rig="threePt" dir="t"/>
+    </dgm:scene3d>
+    <dgm:sp3d/>
+    <dgm:txPr/>
+    <dgm:style>
+      <a:lnRef idx="2">
+        <a:scrgbClr r="0" g="0" b="0"/>
+      </a:lnRef>
+      <a:fillRef idx="0">
+        <a:scrgbClr r="0" g="0" b="0"/>
+      </a:fillRef>
+      <a:effectRef idx="0">
+        <a:scrgbClr r="0" g="0" b="0"/>
+      </a:effectRef>
+      <a:fontRef idx="minor"/>
+    </dgm:style>
+  </dgm:styleLbl>
+  <dgm:styleLbl name="parChTrans1D2">
+    <dgm:scene3d>
+      <a:camera prst="orthographicFront"/>
+      <a:lightRig rig="threePt" dir="t"/>
+    </dgm:scene3d>
+    <dgm:sp3d/>
+    <dgm:txPr/>
+    <dgm:style>
+      <a:lnRef idx="2">
+        <a:scrgbClr r="0" g="0" b="0"/>
+      </a:lnRef>
+      <a:fillRef idx="0">
+        <a:scrgbClr r="0" g="0" b="0"/>
+      </a:fillRef>
+      <a:effectRef idx="0">
+        <a:scrgbClr r="0" g="0" b="0"/>
+      </a:effectRef>
+      <a:fontRef idx="minor"/>
+    </dgm:style>
+  </dgm:styleLbl>
+  <dgm:styleLbl name="parChTrans1D3">
+    <dgm:scene3d>
+      <a:camera prst="orthographicFront"/>
+      <a:lightRig rig="threePt" dir="t"/>
+    </dgm:scene3d>
+    <dgm:sp3d/>
+    <dgm:txPr/>
+    <dgm:style>
+      <a:lnRef idx="2">
+        <a:scrgbClr r="0" g="0" b="0"/>
+      </a:lnRef>
+      <a:fillRef idx="0">
+        <a:scrgbClr r="0" g="0" b="0"/>
+      </a:fillRef>
+      <a:effectRef idx="0">
+        <a:scrgbClr r="0" g="0" b="0"/>
+      </a:effectRef>
+      <a:fontRef idx="minor"/>
+    </dgm:style>
+  </dgm:styleLbl>
+  <dgm:styleLbl name="parChTrans1D4">
+    <dgm:scene3d>
+      <a:camera prst="orthographicFront"/>
+      <a:lightRig rig="threePt" dir="t"/>
+    </dgm:scene3d>
+    <dgm:sp3d/>
+    <dgm:txPr/>
+    <dgm:style>
+      <a:lnRef idx="2">
+        <a:scrgbClr r="0" g="0" b="0"/>
+      </a:lnRef>
+      <a:fillRef idx="0">
+        <a:scrgbClr r="0" g="0" b="0"/>
+      </a:fillRef>
+      <a:effectRef idx="0">
+        <a:scrgbClr r="0" g="0" b="0"/>
+      </a:effectRef>
+      <a:fontRef idx="minor"/>
+    </dgm:style>
+  </dgm:styleLbl>
+  <dgm:styleLbl name="fgAcc1">
+    <dgm:scene3d>
+      <a:camera prst="orthographicFront"/>
+      <a:lightRig rig="threePt" dir="t"/>
+    </dgm:scene3d>
+    <dgm:sp3d/>
+    <dgm:txPr/>
+    <dgm:style>
+      <a:lnRef idx="2">
+        <a:scrgbClr r="0" g="0" b="0"/>
+      </a:lnRef>
+      <a:fillRef idx="1">
+        <a:scrgbClr r="0" g="0" b="0"/>
+      </a:fillRef>
+      <a:effectRef idx="0">
+        <a:scrgbClr r="0" g="0" b="0"/>
+      </a:effectRef>
+      <a:fontRef idx="minor"/>
+    </dgm:style>
+  </dgm:styleLbl>
+  <dgm:styleLbl name="conFgAcc1">
+    <dgm:scene3d>
+      <a:camera prst="orthographicFront"/>
+      <a:lightRig rig="threePt" dir="t"/>
+    </dgm:scene3d>
+    <dgm:sp3d/>
+    <dgm:txPr/>
+    <dgm:style>
+      <a:lnRef idx="2">
+        <a:scrgbClr r="0" g="0" b="0"/>
+      </a:lnRef>
+      <a:fillRef idx="1">
+        <a:scrgbClr r="0" g="0" b="0"/>
+      </a:fillRef>
+      <a:effectRef idx="0">
+        <a:scrgbClr r="0" g="0" b="0"/>
+      </a:effectRef>
+      <a:fontRef idx="minor"/>
+    </dgm:style>
+  </dgm:styleLbl>
+  <dgm:styleLbl name="alignAcc1">
+    <dgm:scene3d>
+      <a:camera prst="orthographicFront"/>
+      <a:lightRig rig="threePt" dir="t"/>
+    </dgm:scene3d>
+    <dgm:sp3d/>
+    <dgm:txPr/>
+    <dgm:style>
+      <a:lnRef idx="2">
+        <a:scrgbClr r="0" g="0" b="0"/>
+      </a:lnRef>
+      <a:fillRef idx="1">
+        <a:scrgbClr r="0" g="0" b="0"/>
+      </a:fillRef>
+      <a:effectRef idx="0">
+        <a:scrgbClr r="0" g="0" b="0"/>
+      </a:effectRef>
+      <a:fontRef idx="minor"/>
+    </dgm:style>
+  </dgm:styleLbl>
+  <dgm:styleLbl name="trAlignAcc1">
+    <dgm:scene3d>
+      <a:camera prst="orthographicFront"/>
+      <a:lightRig rig="threePt" dir="t"/>
+    </dgm:scene3d>
+    <dgm:sp3d/>
+    <dgm:txPr/>
+    <dgm:style>
+      <a:lnRef idx="1">
+        <a:scrgbClr r="0" g="0" b="0"/>
+      </a:lnRef>
+      <a:fillRef idx="1">
+        <a:scrgbClr r="0" g="0" b="0"/>
+      </a:fillRef>
+      <a:effectRef idx="0">
+        <a:scrgbClr r="0" g="0" b="0"/>
+      </a:effectRef>
+      <a:fontRef idx="minor"/>
+    </dgm:style>
+  </dgm:styleLbl>
+  <dgm:styleLbl name="bgAcc1">
+    <dgm:scene3d>
+      <a:camera prst="orthographicFront"/>
+      <a:lightRig rig="threePt" dir="t"/>
+    </dgm:scene3d>
+    <dgm:sp3d/>
+    <dgm:txPr/>
+    <dgm:style>
+      <a:lnRef idx="2">
+        <a:scrgbClr r="0" g="0" b="0"/>
+      </a:lnRef>
+      <a:fillRef idx="1">
+        <a:scrgbClr r="0" g="0" b="0"/>
+      </a:fillRef>
+      <a:effectRef idx="0">
+        <a:scrgbClr r="0" g="0" b="0"/>
+      </a:effectRef>
+      <a:fontRef idx="minor"/>
+    </dgm:style>
+  </dgm:styleLbl>
+  <dgm:styleLbl name="solidFgAcc1">
+    <dgm:scene3d>
+      <a:camera prst="orthographicFront"/>
+      <a:lightRig rig="threePt" dir="t"/>
+    </dgm:scene3d>
+    <dgm:sp3d/>
+    <dgm:txPr/>
+    <dgm:style>
+      <a:lnRef idx="2">
+        <a:scrgbClr r="0" g="0" b="0"/>
+      </a:lnRef>
+      <a:fillRef idx="1">
+        <a:scrgbClr r="0" g="0" b="0"/>
+      </a:fillRef>
+      <a:effectRef idx="0">
+        <a:scrgbClr r="0" g="0" b="0"/>
+      </a:effectRef>
+      <a:fontRef idx="minor"/>
+    </dgm:style>
+  </dgm:styleLbl>
+  <dgm:styleLbl name="solidAlignAcc1">
+    <dgm:scene3d>
+      <a:camera prst="orthographicFront"/>
+      <a:lightRig rig="threePt" dir="t"/>
+    </dgm:scene3d>
+    <dgm:sp3d/>
+    <dgm:txPr/>
+    <dgm:style>
+      <a:lnRef idx="2">
+        <a:scrgbClr r="0" g="0" b="0"/>
+      </a:lnRef>
+      <a:fillRef idx="1">
+        <a:scrgbClr r="0" g="0" b="0"/>
+      </a:fillRef>
+      <a:effectRef idx="0">
+        <a:scrgbClr r="0" g="0" b="0"/>
+      </a:effectRef>
+      <a:fontRef idx="minor"/>
+    </dgm:style>
+  </dgm:styleLbl>
+  <dgm:styleLbl name="solidBgAcc1">
+    <dgm:scene3d>
+      <a:camera prst="orthographicFront"/>
+      <a:lightRig rig="threePt" dir="t"/>
+    </dgm:scene3d>
+    <dgm:sp3d/>
+    <dgm:txPr/>
+    <dgm:style>
+      <a:lnRef idx="2">
+        <a:scrgbClr r="0" g="0" b="0"/>
+      </a:lnRef>
+      <a:fillRef idx="1">
+        <a:scrgbClr r="0" g="0" b="0"/>
+      </a:fillRef>
+      <a:effectRef idx="0">
+        <a:scrgbClr r="0" g="0" b="0"/>
+      </a:effectRef>
+      <a:fontRef idx="minor"/>
+    </dgm:style>
+  </dgm:styleLbl>
+  <dgm:styleLbl name="fgAccFollowNode1">
+    <dgm:scene3d>
+      <a:camera prst="orthographicFront"/>
+      <a:lightRig rig="threePt" dir="t"/>
+    </dgm:scene3d>
+    <dgm:sp3d/>
+    <dgm:txPr/>
+    <dgm:style>
+      <a:lnRef idx="2">
+        <a:scrgbClr r="0" g="0" b="0"/>
+      </a:lnRef>
+      <a:fillRef idx="1">
+        <a:scrgbClr r="0" g="0" b="0"/>
+      </a:fillRef>
+      <a:effectRef idx="0">
+        <a:scrgbClr r="0" g="0" b="0"/>
+      </a:effectRef>
+      <a:fontRef idx="minor"/>
+    </dgm:style>
+  </dgm:styleLbl>
+  <dgm:styleLbl name="alignAccFollowNode1">
+    <dgm:scene3d>
+      <a:camera prst="orthographicFront"/>
+      <a:lightRig rig="threePt" dir="t"/>
+    </dgm:scene3d>
+    <dgm:sp3d/>
+    <dgm:txPr/>
+    <dgm:style>
+      <a:lnRef idx="2">
+        <a:scrgbClr r="0" g="0" b="0"/>
+      </a:lnRef>
+      <a:fillRef idx="1">
+        <a:scrgbClr r="0" g="0" b="0"/>
+      </a:fillRef>
+      <a:effectRef idx="0">
+        <a:scrgbClr r="0" g="0" b="0"/>
+      </a:effectRef>
+      <a:fontRef idx="minor"/>
+    </dgm:style>
+  </dgm:styleLbl>
+  <dgm:styleLbl name="bgAccFollowNode1">
+    <dgm:scene3d>
+      <a:camera prst="orthographicFront"/>
+      <a:lightRig rig="threePt" dir="t"/>
+    </dgm:scene3d>
+    <dgm:sp3d/>
+    <dgm:txPr/>
+    <dgm:style>
+      <a:lnRef idx="2">
+        <a:scrgbClr r="0" g="0" b="0"/>
+      </a:lnRef>
+      <a:fillRef idx="1">
+        <a:scrgbClr r="0" g="0" b="0"/>
+      </a:fillRef>
+      <a:effectRef idx="0">
+        <a:scrgbClr r="0" g="0" b="0"/>
+      </a:effectRef>
+      <a:fontRef idx="minor"/>
+    </dgm:style>
+  </dgm:styleLbl>
+  <dgm:styleLbl name="fgAcc0">
+    <dgm:scene3d>
+      <a:camera prst="orthographicFront"/>
+      <a:lightRig rig="threePt" dir="t"/>
+    </dgm:scene3d>
+    <dgm:sp3d/>
+    <dgm:txPr/>
+    <dgm:style>
+      <a:lnRef idx="2">
+        <a:scrgbClr r="0" g="0" b="0"/>
+      </a:lnRef>
+      <a:fillRef idx="1">
+        <a:scrgbClr r="0" g="0" b="0"/>
+      </a:fillRef>
+      <a:effectRef idx="0">
+        <a:scrgbClr r="0" g="0" b="0"/>
+      </a:effectRef>
+      <a:fontRef idx="minor"/>
+    </dgm:style>
+  </dgm:styleLbl>
+  <dgm:styleLbl name="fgAcc2">
+    <dgm:scene3d>
+      <a:camera prst="orthographicFront"/>
+      <a:lightRig rig="threePt" dir="t"/>
+    </dgm:scene3d>
+    <dgm:sp3d/>
+    <dgm:txPr/>
+    <dgm:style>
+      <a:lnRef idx="2">
+        <a:scrgbClr r="0" g="0" b="0"/>
+      </a:lnRef>
+      <a:fillRef idx="1">
+        <a:scrgbClr r="0" g="0" b="0"/>
+      </a:fillRef>
+      <a:effectRef idx="0">
+        <a:scrgbClr r="0" g="0" b="0"/>
+      </a:effectRef>
+      <a:fontRef idx="minor"/>
+    </dgm:style>
+  </dgm:styleLbl>
+  <dgm:styleLbl name="fgAcc3">
+    <dgm:scene3d>
+      <a:camera prst="orthographicFront"/>
+      <a:lightRig rig="threePt" dir="t"/>
+    </dgm:scene3d>
+    <dgm:sp3d/>
+    <dgm:txPr/>
+    <dgm:style>
+      <a:lnRef idx="2">
+        <a:scrgbClr r="0" g="0" b="0"/>
+      </a:lnRef>
+      <a:fillRef idx="1">
+        <a:scrgbClr r="0" g="0" b="0"/>
+      </a:fillRef>
+      <a:effectRef idx="0">
+        <a:scrgbClr r="0" g="0" b="0"/>
+      </a:effectRef>
+      <a:fontRef idx="minor"/>
+    </dgm:style>
+  </dgm:styleLbl>
+  <dgm:styleLbl name="fgAcc4">
+    <dgm:scene3d>
+      <a:camera prst="orthographicFront"/>
+      <a:lightRig rig="threePt" dir="t"/>
+    </dgm:scene3d>
+    <dgm:sp3d/>
+    <dgm:txPr/>
+    <dgm:style>
+      <a:lnRef idx="2">
+        <a:scrgbClr r="0" g="0" b="0"/>
+      </a:lnRef>
+      <a:fillRef idx="1">
+        <a:scrgbClr r="0" g="0" b="0"/>
+      </a:fillRef>
+      <a:effectRef idx="0">
+        <a:scrgbClr r="0" g="0" b="0"/>
+      </a:effectRef>
+      <a:fontRef idx="minor"/>
+    </dgm:style>
+  </dgm:styleLbl>
+  <dgm:styleLbl name="bgShp">
+    <dgm:scene3d>
+      <a:camera prst="orthographicFront"/>
+      <a:lightRig rig="threePt" dir="t"/>
+    </dgm:scene3d>
+    <dgm:sp3d/>
+    <dgm:txPr/>
+    <dgm:style>
+      <a:lnRef idx="0">
+        <a:scrgbClr r="0" g="0" b="0"/>
+      </a:lnRef>
+      <a:fillRef idx="1">
+        <a:scrgbClr r="0" g="0" b="0"/>
+      </a:fillRef>
+      <a:effectRef idx="0">
+        <a:scrgbClr r="0" g="0" b="0"/>
+      </a:effectRef>
+      <a:fontRef idx="minor"/>
+    </dgm:style>
+  </dgm:styleLbl>
+  <dgm:styleLbl name="dkBgShp">
+    <dgm:scene3d>
+      <a:camera prst="orthographicFront"/>
+      <a:lightRig rig="threePt" dir="t"/>
+    </dgm:scene3d>
+    <dgm:sp3d/>
+    <dgm:txPr/>
+    <dgm:style>
+      <a:lnRef idx="0">
+        <a:scrgbClr r="0" g="0" b="0"/>
+      </a:lnRef>
+      <a:fillRef idx="1">
+        <a:scrgbClr r="0" g="0" b="0"/>
+      </a:fillRef>
+      <a:effectRef idx="0">
+        <a:scrgbClr r="0" g="0" b="0"/>
+      </a:effectRef>
+      <a:fontRef idx="minor"/>
+    </dgm:style>
+  </dgm:styleLbl>
+  <dgm:styleLbl name="trBgShp">
+    <dgm:scene3d>
+      <a:camera prst="orthographicFront"/>
+      <a:lightRig rig="threePt" dir="t"/>
+    </dgm:scene3d>
+    <dgm:sp3d/>
+    <dgm:txPr/>
+    <dgm:style>
+      <a:lnRef idx="0">
+        <a:scrgbClr r="0" g="0" b="0"/>
+      </a:lnRef>
+      <a:fillRef idx="1">
+        <a:scrgbClr r="0" g="0" b="0"/>
+      </a:fillRef>
+      <a:effectRef idx="0">
+        <a:scrgbClr r="0" g="0" b="0"/>
+      </a:effectRef>
+      <a:fontRef idx="minor"/>
+    </dgm:style>
+  </dgm:styleLbl>
+  <dgm:styleLbl name="fgShp">
+    <dgm:scene3d>
+      <a:camera prst="orthographicFront"/>
+      <a:lightRig rig="threePt" dir="t"/>
+    </dgm:scene3d>
+    <dgm:sp3d/>
+    <dgm:txPr/>
+    <dgm:style>
+      <a:lnRef idx="2">
+        <a:scrgbClr r="0" g="0" b="0"/>
+      </a:lnRef>
+      <a:fillRef idx="1">
+        <a:scrgbClr r="0" g="0" b="0"/>
+      </a:fillRef>
+      <a:effectRef idx="0">
+        <a:scrgbClr r="0" g="0" b="0"/>
+      </a:effectRef>
+      <a:fontRef idx="minor"/>
+    </dgm:style>
+  </dgm:styleLbl>
+  <dgm:styleLbl name="revTx">
+    <dgm:scene3d>
+      <a:camera prst="orthographicFront"/>
+      <a:lightRig rig="threePt" dir="t"/>
+    </dgm:scene3d>
+    <dgm:sp3d/>
+    <dgm:txPr/>
+    <dgm:style>
+      <a:lnRef idx="0">
+        <a:scrgbClr r="0" g="0" b="0"/>
+      </a:lnRef>
+      <a:fillRef idx="0">
+        <a:scrgbClr r="0" g="0" b="0"/>
+      </a:fillRef>
+      <a:effectRef idx="0">
+        <a:scrgbClr r="0" g="0" b="0"/>
+      </a:effectRef>
+      <a:fontRef idx="minor"/>
+    </dgm:style>
+  </dgm:styleLbl>
+</dgm:styleDef>
+</file>
+
+<file path=ppt/diagrams/quickStyle4.xml><?xml version="1.0" encoding="utf-8"?>
 <dgm:styleDef xmlns:dgm="http://schemas.openxmlformats.org/drawingml/2006/diagram" xmlns:a="http://schemas.openxmlformats.org/drawingml/2006/main" uniqueId="urn:microsoft.com/office/officeart/2005/8/quickstyle/simple1">
   <dgm:title val=""/>
   <dgm:desc val=""/>
@@ -10039,7 +13292,7 @@
             <a:pPr algn="r" rtl="0"/>
             <a:fld id="{E435D5CA-217C-4614-9A3C-EEC5D594B056}" type="datetime1">
               <a:rPr lang="it-IT" smtClean="0"/>
-              <a:t>22/02/2017</a:t>
+              <a:t>23/02/2017</a:t>
             </a:fld>
             <a:endParaRPr lang="it-IT" dirty="0"/>
           </a:p>
@@ -10209,7 +13462,7 @@
             <a:fld id="{733F77F8-8E21-427A-8345-023BF3B42495}" type="datetime1">
               <a:rPr lang="it-IT" smtClean="0"/>
               <a:pPr/>
-              <a:t>22/02/2017</a:t>
+              <a:t>23/02/2017</a:t>
             </a:fld>
             <a:endParaRPr lang="it-IT" dirty="0"/>
           </a:p>
@@ -11060,7 +14313,7 @@
             <a:fld id="{954F1948-006C-4AF2-9BB8-5590DE340B4E}" type="datetime1">
               <a:rPr lang="it-IT" smtClean="0"/>
               <a:pPr/>
-              <a:t>22/02/2017</a:t>
+              <a:t>23/02/2017</a:t>
             </a:fld>
             <a:endParaRPr lang="it-IT" dirty="0"/>
           </a:p>
@@ -11676,7 +14929,7 @@
             <a:fld id="{52F27A4B-BCBB-40DF-973A-4AE100165E4F}" type="datetime1">
               <a:rPr lang="it-IT" smtClean="0"/>
               <a:pPr/>
-              <a:t>22/02/2017</a:t>
+              <a:t>23/02/2017</a:t>
             </a:fld>
             <a:endParaRPr lang="it-IT" dirty="0"/>
           </a:p>
@@ -11893,7 +15146,7 @@
             <a:fld id="{C5CBB97D-C66D-4A88-B7A2-EC7A53906B2B}" type="datetime1">
               <a:rPr lang="it-IT" smtClean="0"/>
               <a:pPr/>
-              <a:t>22/02/2017</a:t>
+              <a:t>23/02/2017</a:t>
             </a:fld>
             <a:endParaRPr lang="it-IT" dirty="0"/>
           </a:p>
@@ -12100,7 +15353,7 @@
             <a:fld id="{173EC95F-BA1B-4C18-9366-021280E8FCDD}" type="datetime1">
               <a:rPr lang="it-IT" smtClean="0"/>
               <a:pPr/>
-              <a:t>22/02/2017</a:t>
+              <a:t>23/02/2017</a:t>
             </a:fld>
             <a:endParaRPr lang="it-IT" dirty="0"/>
           </a:p>
@@ -12373,7 +15626,7 @@
             <a:fld id="{13B66685-9917-4FA9-97FA-F7CBD01B573E}" type="datetime1">
               <a:rPr lang="it-IT" smtClean="0"/>
               <a:pPr/>
-              <a:t>22/02/2017</a:t>
+              <a:t>23/02/2017</a:t>
             </a:fld>
             <a:endParaRPr lang="it-IT" dirty="0"/>
           </a:p>
@@ -12890,7 +16143,7 @@
             <a:fld id="{C3AD8BBD-71CC-409E-BFB2-246F17C5C82E}" type="datetime1">
               <a:rPr lang="it-IT" smtClean="0"/>
               <a:pPr/>
-              <a:t>22/02/2017</a:t>
+              <a:t>23/02/2017</a:t>
             </a:fld>
             <a:endParaRPr lang="it-IT" dirty="0"/>
           </a:p>
@@ -13359,7 +16612,7 @@
             <a:fld id="{4DC9B8B0-4BE3-42F0-A6AA-86DCD761CF6F}" type="datetime1">
               <a:rPr lang="it-IT" smtClean="0"/>
               <a:pPr/>
-              <a:t>22/02/2017</a:t>
+              <a:t>23/02/2017</a:t>
             </a:fld>
             <a:endParaRPr lang="it-IT" dirty="0"/>
           </a:p>
@@ -13498,7 +16751,7 @@
             <a:fld id="{96968A3D-76C6-4711-9926-51A6FD430964}" type="datetime1">
               <a:rPr lang="it-IT" smtClean="0"/>
               <a:pPr/>
-              <a:t>22/02/2017</a:t>
+              <a:t>23/02/2017</a:t>
             </a:fld>
             <a:endParaRPr lang="it-IT" dirty="0"/>
           </a:p>
@@ -13613,7 +16866,7 @@
             <a:fld id="{711C083B-9FB4-4496-A1AA-CFC98E67E418}" type="datetime1">
               <a:rPr lang="it-IT" smtClean="0"/>
               <a:pPr/>
-              <a:t>22/02/2017</a:t>
+              <a:t>23/02/2017</a:t>
             </a:fld>
             <a:endParaRPr lang="it-IT" dirty="0"/>
           </a:p>
@@ -13915,7 +17168,7 @@
             <a:fld id="{9A4DDAF3-125A-477E-8366-A2A105615D0C}" type="datetime1">
               <a:rPr lang="it-IT" smtClean="0"/>
               <a:pPr/>
-              <a:t>22/02/2017</a:t>
+              <a:t>23/02/2017</a:t>
             </a:fld>
             <a:endParaRPr lang="it-IT" dirty="0"/>
           </a:p>
@@ -14248,7 +17501,7 @@
             <a:fld id="{FAAED65B-ABDB-4384-BED8-4E778B05E186}" type="datetime1">
               <a:rPr lang="it-IT" smtClean="0"/>
               <a:pPr/>
-              <a:t>22/02/2017</a:t>
+              <a:t>23/02/2017</a:t>
             </a:fld>
             <a:endParaRPr lang="it-IT" dirty="0"/>
           </a:p>
@@ -14594,7 +17847,7 @@
             <a:fld id="{9A476C03-45BF-421B-88D9-2B5ED35BE8EE}" type="datetime1">
               <a:rPr lang="it-IT" smtClean="0"/>
               <a:pPr/>
-              <a:t>22/02/2017</a:t>
+              <a:t>23/02/2017</a:t>
             </a:fld>
             <a:endParaRPr lang="it-IT" dirty="0"/>
           </a:p>
@@ -21525,6 +24778,96 @@
           </a:graphicData>
         </a:graphic>
       </p:graphicFrame>
+      <p:sp>
+        <p:nvSpPr>
+          <p:cNvPr id="5" name="Figura a mano libera: forma 4"/>
+          <p:cNvSpPr/>
+          <p:nvPr/>
+        </p:nvSpPr>
+        <p:spPr>
+          <a:xfrm>
+            <a:off x="10990956" y="3573016"/>
+            <a:ext cx="578357" cy="2300644"/>
+          </a:xfrm>
+          <a:custGeom>
+            <a:avLst/>
+            <a:gdLst>
+              <a:gd name="connsiteX0" fmla="*/ 0 w 578357"/>
+              <a:gd name="connsiteY0" fmla="*/ 0 h 3380764"/>
+              <a:gd name="connsiteX1" fmla="*/ 486562 w 578357"/>
+              <a:gd name="connsiteY1" fmla="*/ 553674 h 3380764"/>
+              <a:gd name="connsiteX2" fmla="*/ 536895 w 578357"/>
+              <a:gd name="connsiteY2" fmla="*/ 2709644 h 3380764"/>
+              <a:gd name="connsiteX3" fmla="*/ 25167 w 578357"/>
+              <a:gd name="connsiteY3" fmla="*/ 3380764 h 3380764"/>
+            </a:gdLst>
+            <a:ahLst/>
+            <a:cxnLst>
+              <a:cxn ang="0">
+                <a:pos x="connsiteX0" y="connsiteY0"/>
+              </a:cxn>
+              <a:cxn ang="0">
+                <a:pos x="connsiteX1" y="connsiteY1"/>
+              </a:cxn>
+              <a:cxn ang="0">
+                <a:pos x="connsiteX2" y="connsiteY2"/>
+              </a:cxn>
+              <a:cxn ang="0">
+                <a:pos x="connsiteX3" y="connsiteY3"/>
+              </a:cxn>
+            </a:cxnLst>
+            <a:rect l="l" t="t" r="r" b="b"/>
+            <a:pathLst>
+              <a:path w="578357" h="3380764">
+                <a:moveTo>
+                  <a:pt x="0" y="0"/>
+                </a:moveTo>
+                <a:cubicBezTo>
+                  <a:pt x="198540" y="51033"/>
+                  <a:pt x="397080" y="102067"/>
+                  <a:pt x="486562" y="553674"/>
+                </a:cubicBezTo>
+                <a:cubicBezTo>
+                  <a:pt x="576044" y="1005281"/>
+                  <a:pt x="613794" y="2238462"/>
+                  <a:pt x="536895" y="2709644"/>
+                </a:cubicBezTo>
+                <a:cubicBezTo>
+                  <a:pt x="459996" y="3180826"/>
+                  <a:pt x="242581" y="3280795"/>
+                  <a:pt x="25167" y="3380764"/>
+                </a:cubicBezTo>
+              </a:path>
+            </a:pathLst>
+          </a:custGeom>
+          <a:ln>
+            <a:headEnd type="arrow" w="med" len="med"/>
+            <a:tailEnd type="arrow" w="med" len="med"/>
+          </a:ln>
+        </p:spPr>
+        <p:style>
+          <a:lnRef idx="3">
+            <a:schemeClr val="accent6"/>
+          </a:lnRef>
+          <a:fillRef idx="0">
+            <a:schemeClr val="accent6"/>
+          </a:fillRef>
+          <a:effectRef idx="2">
+            <a:schemeClr val="accent6"/>
+          </a:effectRef>
+          <a:fontRef idx="minor">
+            <a:schemeClr val="tx1"/>
+          </a:fontRef>
+        </p:style>
+        <p:txBody>
+          <a:bodyPr rtlCol="0" anchor="ctr"/>
+          <a:lstStyle/>
+          <a:p>
+            <a:pPr algn="ctr"/>
+            <a:endParaRPr lang="it-IT"/>
+          </a:p>
+        </p:txBody>
+      </p:sp>
     </p:spTree>
     <p:extLst>
       <p:ext uri="{BB962C8B-B14F-4D97-AF65-F5344CB8AC3E}">
@@ -21627,7 +24970,7 @@
           <p:nvPr>
             <p:extLst>
               <p:ext uri="{D42A27DB-BD31-4B8C-83A1-F6EECF244321}">
-                <p14:modId xmlns:p14="http://schemas.microsoft.com/office/powerpoint/2010/main" val="3145152742"/>
+                <p14:modId xmlns:p14="http://schemas.microsoft.com/office/powerpoint/2010/main" val="1092285144"/>
               </p:ext>
             </p:extLst>
           </p:nvPr>
@@ -22048,6 +25391,218 @@
           <a:p>
             <a:r>
               <a:rPr lang="it-IT" dirty="0"/>
+              <a:t>Esempio di output delle 4 pipeline </a:t>
+            </a:r>
+            <a:r>
+              <a:rPr lang="it-IT" sz="2000" dirty="0"/>
+              <a:t>(taglio corretto ma difficile)</a:t>
+            </a:r>
+            <a:endParaRPr lang="it-IT" dirty="0"/>
+          </a:p>
+        </p:txBody>
+      </p:sp>
+      <p:pic>
+        <p:nvPicPr>
+          <p:cNvPr id="7" name="Segnaposto contenuto 6"/>
+          <p:cNvPicPr>
+            <a:picLocks noGrp="1" noChangeAspect="1"/>
+          </p:cNvPicPr>
+          <p:nvPr>
+            <p:ph idx="1"/>
+          </p:nvPr>
+        </p:nvPicPr>
+        <p:blipFill>
+          <a:blip r:embed="rId2">
+            <a:extLst>
+              <a:ext uri="{28A0092B-C50C-407E-A947-70E740481C1C}">
+                <a14:useLocalDpi xmlns:a14="http://schemas.microsoft.com/office/drawing/2010/main" val="0"/>
+              </a:ext>
+            </a:extLst>
+          </a:blip>
+          <a:stretch>
+            <a:fillRect/>
+          </a:stretch>
+        </p:blipFill>
+        <p:spPr>
+          <a:xfrm>
+            <a:off x="1629255" y="1998638"/>
+            <a:ext cx="2737625" cy="3990435"/>
+          </a:xfrm>
+        </p:spPr>
+      </p:pic>
+      <p:graphicFrame>
+        <p:nvGraphicFramePr>
+          <p:cNvPr id="11" name="Segnaposto contenuto 8" descr="Elenco caselle verticale che mostra 3 gruppi disposti uno sotto l'altro, con punti elenco al di sotto di ogni elenco."/>
+          <p:cNvGraphicFramePr>
+            <a:graphicFrameLocks/>
+          </p:cNvGraphicFramePr>
+          <p:nvPr>
+            <p:extLst>
+              <p:ext uri="{D42A27DB-BD31-4B8C-83A1-F6EECF244321}">
+                <p14:modId xmlns:p14="http://schemas.microsoft.com/office/powerpoint/2010/main" val="1498795889"/>
+              </p:ext>
+            </p:extLst>
+          </p:nvPr>
+        </p:nvGraphicFramePr>
+        <p:xfrm>
+          <a:off x="5065288" y="1709150"/>
+          <a:ext cx="5904655" cy="4569411"/>
+        </p:xfrm>
+        <a:graphic>
+          <a:graphicData uri="http://schemas.openxmlformats.org/drawingml/2006/diagram">
+            <dgm:relIds xmlns:dgm="http://schemas.openxmlformats.org/drawingml/2006/diagram" xmlns:r="http://schemas.openxmlformats.org/officeDocument/2006/relationships" r:dm="rId3" r:lo="rId4" r:qs="rId5" r:cs="rId6"/>
+          </a:graphicData>
+        </a:graphic>
+      </p:graphicFrame>
+      <p:sp>
+        <p:nvSpPr>
+          <p:cNvPr id="4" name="Figura a mano libera: forma 3"/>
+          <p:cNvSpPr/>
+          <p:nvPr/>
+        </p:nvSpPr>
+        <p:spPr>
+          <a:xfrm>
+            <a:off x="10990956" y="2492896"/>
+            <a:ext cx="578357" cy="3380764"/>
+          </a:xfrm>
+          <a:custGeom>
+            <a:avLst/>
+            <a:gdLst>
+              <a:gd name="connsiteX0" fmla="*/ 0 w 578357"/>
+              <a:gd name="connsiteY0" fmla="*/ 0 h 3380764"/>
+              <a:gd name="connsiteX1" fmla="*/ 486562 w 578357"/>
+              <a:gd name="connsiteY1" fmla="*/ 553674 h 3380764"/>
+              <a:gd name="connsiteX2" fmla="*/ 536895 w 578357"/>
+              <a:gd name="connsiteY2" fmla="*/ 2709644 h 3380764"/>
+              <a:gd name="connsiteX3" fmla="*/ 25167 w 578357"/>
+              <a:gd name="connsiteY3" fmla="*/ 3380764 h 3380764"/>
+            </a:gdLst>
+            <a:ahLst/>
+            <a:cxnLst>
+              <a:cxn ang="0">
+                <a:pos x="connsiteX0" y="connsiteY0"/>
+              </a:cxn>
+              <a:cxn ang="0">
+                <a:pos x="connsiteX1" y="connsiteY1"/>
+              </a:cxn>
+              <a:cxn ang="0">
+                <a:pos x="connsiteX2" y="connsiteY2"/>
+              </a:cxn>
+              <a:cxn ang="0">
+                <a:pos x="connsiteX3" y="connsiteY3"/>
+              </a:cxn>
+            </a:cxnLst>
+            <a:rect l="l" t="t" r="r" b="b"/>
+            <a:pathLst>
+              <a:path w="578357" h="3380764">
+                <a:moveTo>
+                  <a:pt x="0" y="0"/>
+                </a:moveTo>
+                <a:cubicBezTo>
+                  <a:pt x="198540" y="51033"/>
+                  <a:pt x="397080" y="102067"/>
+                  <a:pt x="486562" y="553674"/>
+                </a:cubicBezTo>
+                <a:cubicBezTo>
+                  <a:pt x="576044" y="1005281"/>
+                  <a:pt x="613794" y="2238462"/>
+                  <a:pt x="536895" y="2709644"/>
+                </a:cubicBezTo>
+                <a:cubicBezTo>
+                  <a:pt x="459996" y="3180826"/>
+                  <a:pt x="242581" y="3280795"/>
+                  <a:pt x="25167" y="3380764"/>
+                </a:cubicBezTo>
+              </a:path>
+            </a:pathLst>
+          </a:custGeom>
+          <a:ln>
+            <a:headEnd type="arrow" w="med" len="med"/>
+            <a:tailEnd type="arrow" w="med" len="med"/>
+          </a:ln>
+        </p:spPr>
+        <p:style>
+          <a:lnRef idx="3">
+            <a:schemeClr val="accent6"/>
+          </a:lnRef>
+          <a:fillRef idx="0">
+            <a:schemeClr val="accent6"/>
+          </a:fillRef>
+          <a:effectRef idx="2">
+            <a:schemeClr val="accent6"/>
+          </a:effectRef>
+          <a:fontRef idx="minor">
+            <a:schemeClr val="tx1"/>
+          </a:fontRef>
+        </p:style>
+        <p:txBody>
+          <a:bodyPr rtlCol="0" anchor="ctr"/>
+          <a:lstStyle/>
+          <a:p>
+            <a:pPr algn="ctr"/>
+            <a:endParaRPr lang="it-IT"/>
+          </a:p>
+        </p:txBody>
+      </p:sp>
+    </p:spTree>
+    <p:extLst>
+      <p:ext uri="{BB962C8B-B14F-4D97-AF65-F5344CB8AC3E}">
+        <p14:creationId xmlns:p14="http://schemas.microsoft.com/office/powerpoint/2010/main" val="1083099074"/>
+      </p:ext>
+    </p:extLst>
+  </p:cSld>
+  <p:clrMapOvr>
+    <a:masterClrMapping/>
+  </p:clrMapOvr>
+  <mc:AlternateContent xmlns:mc="http://schemas.openxmlformats.org/markup-compatibility/2006" xmlns:p14="http://schemas.microsoft.com/office/powerpoint/2010/main">
+    <mc:Choice Requires="p14">
+      <p:transition spd="med" p14:dur="700">
+        <p:fade/>
+      </p:transition>
+    </mc:Choice>
+    <mc:Fallback xmlns="">
+      <p:transition spd="med">
+        <p:fade/>
+      </p:transition>
+    </mc:Fallback>
+  </mc:AlternateContent>
+</p:sld>
+</file>
+
+<file path=ppt/slides/slide21.xml><?xml version="1.0" encoding="utf-8"?>
+<p:sld xmlns:a="http://schemas.openxmlformats.org/drawingml/2006/main" xmlns:r="http://schemas.openxmlformats.org/officeDocument/2006/relationships" xmlns:p="http://schemas.openxmlformats.org/presentationml/2006/main">
+  <p:cSld>
+    <p:spTree>
+      <p:nvGrpSpPr>
+        <p:cNvPr id="1" name=""/>
+        <p:cNvGrpSpPr/>
+        <p:nvPr/>
+      </p:nvGrpSpPr>
+      <p:grpSpPr>
+        <a:xfrm>
+          <a:off x="0" y="0"/>
+          <a:ext cx="0" cy="0"/>
+          <a:chOff x="0" y="0"/>
+          <a:chExt cx="0" cy="0"/>
+        </a:xfrm>
+      </p:grpSpPr>
+      <p:sp>
+        <p:nvSpPr>
+          <p:cNvPr id="2" name="Titolo 1"/>
+          <p:cNvSpPr>
+            <a:spLocks noGrp="1"/>
+          </p:cNvSpPr>
+          <p:nvPr>
+            <p:ph type="title"/>
+          </p:nvPr>
+        </p:nvSpPr>
+        <p:spPr/>
+        <p:txBody>
+          <a:bodyPr/>
+          <a:lstStyle/>
+          <a:p>
+            <a:r>
+              <a:rPr lang="it-IT" dirty="0"/>
               <a:t>Risultati</a:t>
             </a:r>
           </a:p>
@@ -22072,7 +25627,7 @@
           <a:p>
             <a:r>
               <a:rPr lang="it-IT" dirty="0"/>
-              <a:t>Abbiamo testato le 4 pipeline su un foglio con 13500 tagli di lettere.</a:t>
+              <a:t>Abbiamo testato le 4 pipeline su un foglio con 13000 tagli di lettere.</a:t>
             </a:r>
           </a:p>
           <a:p>
@@ -22084,7 +25639,7 @@
           <a:p>
             <a:r>
               <a:rPr lang="it-IT" dirty="0"/>
-              <a:t>Le pipeline 2 e 4 hanno pochissimi falsi positivi ma sporadici falsi negativi, e fra loro la pipeline 2 ha il miglior ranking. </a:t>
+              <a:t>Le pipeline 2 e 4 hanno pochissimi falsi positivi ma sporadici falsi negativi, e fra loro la pipeline 2 ha il miglior ranking. Sui tagli corretti la pipeline 4 si comporta come la 1, classificando talvolta peggio della 2.</a:t>
             </a:r>
           </a:p>
           <a:p>
@@ -22134,7 +25689,99 @@
 </p:sld>
 </file>
 
-<file path=ppt/slides/slide21.xml><?xml version="1.0" encoding="utf-8"?>
+<file path=ppt/slides/slide22.xml><?xml version="1.0" encoding="utf-8"?>
+<p:sld xmlns:a="http://schemas.openxmlformats.org/drawingml/2006/main" xmlns:r="http://schemas.openxmlformats.org/officeDocument/2006/relationships" xmlns:p="http://schemas.openxmlformats.org/presentationml/2006/main">
+  <p:cSld>
+    <p:spTree>
+      <p:nvGrpSpPr>
+        <p:cNvPr id="1" name=""/>
+        <p:cNvGrpSpPr/>
+        <p:nvPr/>
+      </p:nvGrpSpPr>
+      <p:grpSpPr>
+        <a:xfrm>
+          <a:off x="0" y="0"/>
+          <a:ext cx="0" cy="0"/>
+          <a:chOff x="0" y="0"/>
+          <a:chExt cx="0" cy="0"/>
+        </a:xfrm>
+      </p:grpSpPr>
+      <p:sp>
+        <p:nvSpPr>
+          <p:cNvPr id="2" name="Titolo 1"/>
+          <p:cNvSpPr>
+            <a:spLocks noGrp="1"/>
+          </p:cNvSpPr>
+          <p:nvPr>
+            <p:ph type="title"/>
+          </p:nvPr>
+        </p:nvSpPr>
+        <p:spPr/>
+        <p:txBody>
+          <a:bodyPr/>
+          <a:lstStyle/>
+          <a:p>
+            <a:r>
+              <a:rPr lang="it-IT" dirty="0"/>
+              <a:t>Risultati</a:t>
+            </a:r>
+          </a:p>
+        </p:txBody>
+      </p:sp>
+      <p:sp>
+        <p:nvSpPr>
+          <p:cNvPr id="3" name="Segnaposto contenuto 2"/>
+          <p:cNvSpPr>
+            <a:spLocks noGrp="1"/>
+          </p:cNvSpPr>
+          <p:nvPr>
+            <p:ph idx="1"/>
+          </p:nvPr>
+        </p:nvSpPr>
+        <p:spPr/>
+        <p:txBody>
+          <a:bodyPr/>
+          <a:lstStyle/>
+          <a:p>
+            <a:r>
+              <a:rPr lang="it-IT" dirty="0"/>
+              <a:t>Su 100 tagli etichettati manualmente tutte le pipeline hanno incluso nel ranking la lettera corretta, con una precisione del 100% sul campione.</a:t>
+            </a:r>
+          </a:p>
+          <a:p>
+            <a:r>
+              <a:rPr lang="it-IT" dirty="0"/>
+              <a:t>Tuttavia includendo fra le etichette anche i tagli errati, la precisione cambia. Le pipeline 1 e 3 hanno ottenuto una precisione del 21%, con moltissimi falsi positivi, le pipeline 2 e 4 invece hanno ottenuto una precisione dell’86%, con la pipeline 2 ad avere il ranking più accurato nel 100% dei casi, mentre la 4 ha talvolta messo la lettera giusta in seconda posizione. </a:t>
+            </a:r>
+          </a:p>
+        </p:txBody>
+      </p:sp>
+    </p:spTree>
+    <p:extLst>
+      <p:ext uri="{BB962C8B-B14F-4D97-AF65-F5344CB8AC3E}">
+        <p14:creationId xmlns:p14="http://schemas.microsoft.com/office/powerpoint/2010/main" val="1821468114"/>
+      </p:ext>
+    </p:extLst>
+  </p:cSld>
+  <p:clrMapOvr>
+    <a:masterClrMapping/>
+  </p:clrMapOvr>
+  <mc:AlternateContent xmlns:mc="http://schemas.openxmlformats.org/markup-compatibility/2006" xmlns:p14="http://schemas.microsoft.com/office/powerpoint/2010/main">
+    <mc:Choice Requires="p14">
+      <p:transition spd="med" p14:dur="700">
+        <p:fade/>
+      </p:transition>
+    </mc:Choice>
+    <mc:Fallback xmlns="">
+      <p:transition spd="med">
+        <p:fade/>
+      </p:transition>
+    </mc:Fallback>
+  </mc:AlternateContent>
+</p:sld>
+</file>
+
+<file path=ppt/slides/slide23.xml><?xml version="1.0" encoding="utf-8"?>
 <p:sld xmlns:a="http://schemas.openxmlformats.org/drawingml/2006/main" xmlns:r="http://schemas.openxmlformats.org/officeDocument/2006/relationships" xmlns:p="http://schemas.openxmlformats.org/presentationml/2006/main">
   <p:cSld>
     <p:spTree>
@@ -22261,7 +25908,7 @@
           <a:graphicData uri="http://schemas.openxmlformats.org/presentationml/2006/ole">
             <mc:AlternateContent xmlns:mc="http://schemas.openxmlformats.org/markup-compatibility/2006">
               <mc:Choice xmlns:v="urn:schemas-microsoft-com:vml" Requires="v">
-                <p:oleObj spid="_x0000_s1033" name="Image" r:id="rId3" imgW="10234800" imgH="3263400" progId="Photoshop.Image.16">
+                <p:oleObj spid="_x0000_s1041" name="Image" r:id="rId3" imgW="10234800" imgH="3263400" progId="Photoshop.Image.16">
                   <p:embed/>
                 </p:oleObj>
               </mc:Choice>
@@ -22975,7 +26622,7 @@
           <a:graphicData uri="http://schemas.openxmlformats.org/presentationml/2006/ole">
             <mc:AlternateContent xmlns:mc="http://schemas.openxmlformats.org/markup-compatibility/2006">
               <mc:Choice xmlns:v="urn:schemas-microsoft-com:vml" Requires="v">
-                <p:oleObj spid="_x0000_s1034" name="Image" r:id="rId9" imgW="3161880" imgH="469800" progId="Photoshop.Image.16">
+                <p:oleObj spid="_x0000_s1042" name="Image" r:id="rId9" imgW="3161880" imgH="469800" progId="Photoshop.Image.16">
                   <p:embed/>
                 </p:oleObj>
               </mc:Choice>
@@ -23259,7 +26906,7 @@
         </p:nvSpPr>
         <p:spPr>
           <a:xfrm>
-            <a:off x="8648125" y="1559176"/>
+            <a:off x="8040016" y="1534080"/>
             <a:ext cx="200712" cy="200712"/>
           </a:xfrm>
           <a:prstGeom prst="noSmoking">
@@ -23296,6 +26943,186 @@
                 <a:schemeClr val="tx1"/>
               </a:solidFill>
             </a:endParaRPr>
+          </a:p>
+        </p:txBody>
+      </p:sp>
+      <p:sp>
+        <p:nvSpPr>
+          <p:cNvPr id="3" name="Figura a mano libera: forma 2"/>
+          <p:cNvSpPr/>
+          <p:nvPr/>
+        </p:nvSpPr>
+        <p:spPr>
+          <a:xfrm>
+            <a:off x="7218626" y="2274873"/>
+            <a:ext cx="1468074" cy="2810311"/>
+          </a:xfrm>
+          <a:custGeom>
+            <a:avLst/>
+            <a:gdLst>
+              <a:gd name="connsiteX0" fmla="*/ 0 w 1468074"/>
+              <a:gd name="connsiteY0" fmla="*/ 2810311 h 2810311"/>
+              <a:gd name="connsiteX1" fmla="*/ 469784 w 1468074"/>
+              <a:gd name="connsiteY1" fmla="*/ 2248249 h 2810311"/>
+              <a:gd name="connsiteX2" fmla="*/ 578841 w 1468074"/>
+              <a:gd name="connsiteY2" fmla="*/ 973122 h 2810311"/>
+              <a:gd name="connsiteX3" fmla="*/ 1468074 w 1468074"/>
+              <a:gd name="connsiteY3" fmla="*/ 0 h 2810311"/>
+            </a:gdLst>
+            <a:ahLst/>
+            <a:cxnLst>
+              <a:cxn ang="0">
+                <a:pos x="connsiteX0" y="connsiteY0"/>
+              </a:cxn>
+              <a:cxn ang="0">
+                <a:pos x="connsiteX1" y="connsiteY1"/>
+              </a:cxn>
+              <a:cxn ang="0">
+                <a:pos x="connsiteX2" y="connsiteY2"/>
+              </a:cxn>
+              <a:cxn ang="0">
+                <a:pos x="connsiteX3" y="connsiteY3"/>
+              </a:cxn>
+            </a:cxnLst>
+            <a:rect l="l" t="t" r="r" b="b"/>
+            <a:pathLst>
+              <a:path w="1468074" h="2810311">
+                <a:moveTo>
+                  <a:pt x="0" y="2810311"/>
+                </a:moveTo>
+                <a:cubicBezTo>
+                  <a:pt x="186655" y="2682379"/>
+                  <a:pt x="373311" y="2554447"/>
+                  <a:pt x="469784" y="2248249"/>
+                </a:cubicBezTo>
+                <a:cubicBezTo>
+                  <a:pt x="566257" y="1942051"/>
+                  <a:pt x="412459" y="1347830"/>
+                  <a:pt x="578841" y="973122"/>
+                </a:cubicBezTo>
+                <a:cubicBezTo>
+                  <a:pt x="745223" y="598414"/>
+                  <a:pt x="1106648" y="299207"/>
+                  <a:pt x="1468074" y="0"/>
+                </a:cubicBezTo>
+              </a:path>
+            </a:pathLst>
+          </a:custGeom>
+          <a:ln>
+            <a:headEnd type="none" w="med" len="med"/>
+            <a:tailEnd type="arrow" w="med" len="med"/>
+          </a:ln>
+        </p:spPr>
+        <p:style>
+          <a:lnRef idx="3">
+            <a:schemeClr val="accent3"/>
+          </a:lnRef>
+          <a:fillRef idx="0">
+            <a:schemeClr val="accent3"/>
+          </a:fillRef>
+          <a:effectRef idx="2">
+            <a:schemeClr val="accent3"/>
+          </a:effectRef>
+          <a:fontRef idx="minor">
+            <a:schemeClr val="tx1"/>
+          </a:fontRef>
+        </p:style>
+        <p:txBody>
+          <a:bodyPr rtlCol="0" anchor="ctr"/>
+          <a:lstStyle/>
+          <a:p>
+            <a:pPr algn="ctr"/>
+            <a:endParaRPr lang="it-IT"/>
+          </a:p>
+        </p:txBody>
+      </p:sp>
+      <p:sp>
+        <p:nvSpPr>
+          <p:cNvPr id="7" name="Figura a mano libera: forma 6"/>
+          <p:cNvSpPr/>
+          <p:nvPr/>
+        </p:nvSpPr>
+        <p:spPr>
+          <a:xfrm>
+            <a:off x="7004979" y="1412776"/>
+            <a:ext cx="1033649" cy="3422679"/>
+          </a:xfrm>
+          <a:custGeom>
+            <a:avLst/>
+            <a:gdLst>
+              <a:gd name="connsiteX0" fmla="*/ 85693 w 1033649"/>
+              <a:gd name="connsiteY0" fmla="*/ 3422679 h 3422679"/>
+              <a:gd name="connsiteX1" fmla="*/ 211528 w 1033649"/>
+              <a:gd name="connsiteY1" fmla="*/ 2558613 h 3422679"/>
+              <a:gd name="connsiteX2" fmla="*/ 35359 w 1033649"/>
+              <a:gd name="connsiteY2" fmla="*/ 260029 h 3422679"/>
+              <a:gd name="connsiteX3" fmla="*/ 1033649 w 1033649"/>
+              <a:gd name="connsiteY3" fmla="*/ 150972 h 3422679"/>
+            </a:gdLst>
+            <a:ahLst/>
+            <a:cxnLst>
+              <a:cxn ang="0">
+                <a:pos x="connsiteX0" y="connsiteY0"/>
+              </a:cxn>
+              <a:cxn ang="0">
+                <a:pos x="connsiteX1" y="connsiteY1"/>
+              </a:cxn>
+              <a:cxn ang="0">
+                <a:pos x="connsiteX2" y="connsiteY2"/>
+              </a:cxn>
+              <a:cxn ang="0">
+                <a:pos x="connsiteX3" y="connsiteY3"/>
+              </a:cxn>
+            </a:cxnLst>
+            <a:rect l="l" t="t" r="r" b="b"/>
+            <a:pathLst>
+              <a:path w="1033649" h="3422679">
+                <a:moveTo>
+                  <a:pt x="85693" y="3422679"/>
+                </a:moveTo>
+                <a:cubicBezTo>
+                  <a:pt x="152805" y="3254200"/>
+                  <a:pt x="219917" y="3085721"/>
+                  <a:pt x="211528" y="2558613"/>
+                </a:cubicBezTo>
+                <a:cubicBezTo>
+                  <a:pt x="203139" y="2031505"/>
+                  <a:pt x="-101661" y="661302"/>
+                  <a:pt x="35359" y="260029"/>
+                </a:cubicBezTo>
+                <a:cubicBezTo>
+                  <a:pt x="172379" y="-141245"/>
+                  <a:pt x="603014" y="4863"/>
+                  <a:pt x="1033649" y="150972"/>
+                </a:cubicBezTo>
+              </a:path>
+            </a:pathLst>
+          </a:custGeom>
+          <a:ln>
+            <a:headEnd type="none" w="med" len="med"/>
+            <a:tailEnd type="arrow" w="med" len="med"/>
+          </a:ln>
+        </p:spPr>
+        <p:style>
+          <a:lnRef idx="3">
+            <a:schemeClr val="accent3"/>
+          </a:lnRef>
+          <a:fillRef idx="0">
+            <a:schemeClr val="accent3"/>
+          </a:fillRef>
+          <a:effectRef idx="2">
+            <a:schemeClr val="accent3"/>
+          </a:effectRef>
+          <a:fontRef idx="minor">
+            <a:schemeClr val="tx1"/>
+          </a:fontRef>
+        </p:style>
+        <p:txBody>
+          <a:bodyPr rtlCol="0" anchor="ctr"/>
+          <a:lstStyle/>
+          <a:p>
+            <a:pPr algn="ctr"/>
+            <a:endParaRPr lang="it-IT"/>
           </a:p>
         </p:txBody>
       </p:sp>
@@ -25559,6 +29386,15 @@
 </file>
 
 <file path=customXml/item1.xml><?xml version="1.0" encoding="utf-8"?>
+<?mso-contentType ?>
+<FormTemplates xmlns="http://schemas.microsoft.com/sharepoint/v3/contenttype/forms">
+  <Display>DocumentLibraryForm</Display>
+  <Edit>AssetEditForm</Edit>
+  <New>DocumentLibraryForm</New>
+</FormTemplates>
+</file>
+
+<file path=customXml/item2.xml><?xml version="1.0" encoding="utf-8"?>
 <ct:contentTypeSchema xmlns:ct="http://schemas.microsoft.com/office/2006/metadata/contentType" xmlns:ma="http://schemas.microsoft.com/office/2006/metadata/properties/metaAttributes" ct:_="" ma:_="" ma:contentTypeName="TemplateFile" ma:contentTypeID="0x0101006EDDDB5EE6D98C44930B742096920B300400F5B6D36B3EF94B4E9A635CDF2A18F5B8" ma:contentTypeVersion="72" ma:contentTypeDescription="Create a new document." ma:contentTypeScope="" ma:versionID="a23e56308344d904b51738559c3d67c9">
   <xsd:schema xmlns:xsd="http://www.w3.org/2001/XMLSchema" xmlns:xs="http://www.w3.org/2001/XMLSchema" xmlns:p="http://schemas.microsoft.com/office/2006/metadata/properties" xmlns:ns2="4873beb7-5857-4685-be1f-d57550cc96cc" targetNamespace="http://schemas.microsoft.com/office/2006/metadata/properties" ma:root="true" ma:fieldsID="cd0908cc4600e77bf5da051303e00c8d" ns2:_="">
     <xsd:import namespace="4873beb7-5857-4685-be1f-d57550cc96cc"/>
@@ -26598,15 +30434,6 @@
 </ct:contentTypeSchema>
 </file>
 
-<file path=customXml/item2.xml><?xml version="1.0" encoding="utf-8"?>
-<?mso-contentType ?>
-<FormTemplates xmlns="http://schemas.microsoft.com/sharepoint/v3/contenttype/forms">
-  <Display>DocumentLibraryForm</Display>
-  <Edit>AssetEditForm</Edit>
-  <New>DocumentLibraryForm</New>
-</FormTemplates>
-</file>
-
 <file path=customXml/item3.xml><?xml version="1.0" encoding="utf-8"?>
 <p:properties xmlns:p="http://schemas.microsoft.com/office/2006/metadata/properties" xmlns:xsi="http://www.w3.org/2001/XMLSchema-instance" xmlns:pc="http://schemas.microsoft.com/office/infopath/2007/PartnerControls">
   <documentManagement>
@@ -26734,6 +30561,14 @@
 </file>
 
 <file path=customXml/itemProps1.xml><?xml version="1.0" encoding="utf-8"?>
+<ds:datastoreItem xmlns:ds="http://schemas.openxmlformats.org/officeDocument/2006/customXml" ds:itemID="{8D003AC8-209A-4321-A17C-1B7A20643390}">
+  <ds:schemaRefs>
+    <ds:schemaRef ds:uri="http://schemas.microsoft.com/sharepoint/v3/contenttype/forms"/>
+  </ds:schemaRefs>
+</ds:datastoreItem>
+</file>
+
+<file path=customXml/itemProps2.xml><?xml version="1.0" encoding="utf-8"?>
 <ds:datastoreItem xmlns:ds="http://schemas.openxmlformats.org/officeDocument/2006/customXml" ds:itemID="{83ED4759-CFDD-43F0-817C-11D9197192BA}">
   <ds:schemaRefs>
     <ds:schemaRef ds:uri="http://schemas.microsoft.com/office/2006/metadata/contentType"/>
@@ -26747,14 +30582,6 @@
     <ds:schemaRef ds:uri="http://purl.org/dc/elements/1.1/"/>
     <ds:schemaRef ds:uri="http://purl.org/dc/terms/"/>
     <ds:schemaRef ds:uri="http://schemas.microsoft.com/internal/obd"/>
-  </ds:schemaRefs>
-</ds:datastoreItem>
-</file>
-
-<file path=customXml/itemProps2.xml><?xml version="1.0" encoding="utf-8"?>
-<ds:datastoreItem xmlns:ds="http://schemas.openxmlformats.org/officeDocument/2006/customXml" ds:itemID="{8D003AC8-209A-4321-A17C-1B7A20643390}">
-  <ds:schemaRefs>
-    <ds:schemaRef ds:uri="http://schemas.microsoft.com/sharepoint/v3/contenttype/forms"/>
   </ds:schemaRefs>
 </ds:datastoreItem>
 </file>

</xml_diff>

<commit_message>
update slide and relazione
</commit_message>
<xml_diff>
--- a/Relazione/Slide.pptx
+++ b/Relazione/Slide.pptx
@@ -3871,32 +3871,32 @@
   </dgm:ptLst>
   <dgm:cxnLst>
     <dgm:cxn modelId="{8FDA287C-F522-4798-84DD-FAE7202E2218}" srcId="{811C00EC-AF2A-41BC-B4D9-02AB7BF66167}" destId="{642344CB-74C8-44A2-9463-BFA935A3A62B}" srcOrd="0" destOrd="0" parTransId="{D88B29CC-9C89-46D1-9E57-A5161404AFCD}" sibTransId="{2BEF3B21-EA46-458C-9F13-3A6249480696}"/>
+    <dgm:cxn modelId="{133AB3BA-08EC-432D-814B-0243B8AEAE27}" type="presOf" srcId="{3F442EA2-39BA-4C9A-AD59-755D4917D532}" destId="{E6A445EE-D086-4B01-B491-D67950A5A065}" srcOrd="0" destOrd="0" presId="urn:microsoft.com/office/officeart/2005/8/layout/list1"/>
+    <dgm:cxn modelId="{9F679DC2-6B0E-43AA-A414-29A0BEBDE7EB}" type="presOf" srcId="{50629C12-7464-4473-ADEF-1A284F8A9957}" destId="{964E6811-5072-4466-B721-689C35A65029}" srcOrd="0" destOrd="0" presId="urn:microsoft.com/office/officeart/2005/8/layout/list1"/>
+    <dgm:cxn modelId="{EF39DC10-C489-4F29-BCDA-31D69D3CEE27}" type="presOf" srcId="{60CDF8D0-D4FC-4467-A51E-79C5A58B0B2C}" destId="{5B203A22-00AF-46E7-9415-C6DAFD7E01CC}" srcOrd="1" destOrd="0" presId="urn:microsoft.com/office/officeart/2005/8/layout/list1"/>
+    <dgm:cxn modelId="{EBD8BE8D-6018-43E2-B081-034BB5656EB6}" srcId="{3F442EA2-39BA-4C9A-AD59-755D4917D532}" destId="{4DF9FE7B-F642-4898-A360-D4E3814E1A3D}" srcOrd="0" destOrd="0" parTransId="{1C10F06D-860A-4604-A7AD-02E614FE3976}" sibTransId="{43C18EFF-81FC-4D70-8C6B-E95FF3730413}"/>
+    <dgm:cxn modelId="{09FCCB9D-A30A-4326-970E-26252D39327F}" srcId="{3929B1E1-4BC4-4C73-ABE8-27CEF96A3652}" destId="{99E0600D-9954-43F4-8926-13B8777FAAA1}" srcOrd="0" destOrd="0" parTransId="{BE23F476-2C5C-42ED-BF2B-CD5FC7ADDDF6}" sibTransId="{C44937DC-4907-4769-AA8B-1B3E7391D7B0}"/>
+    <dgm:cxn modelId="{1E2AF7A7-4249-461B-83BB-16ACFF1DA743}" type="presOf" srcId="{7546B606-AE19-4DA1-836A-6DC3B1656F3B}" destId="{964E6811-5072-4466-B721-689C35A65029}" srcOrd="0" destOrd="1" presId="urn:microsoft.com/office/officeart/2005/8/layout/list1"/>
+    <dgm:cxn modelId="{1D32FCC9-657C-4348-9C0D-52115D559FEB}" srcId="{60CDF8D0-D4FC-4467-A51E-79C5A58B0B2C}" destId="{50629C12-7464-4473-ADEF-1A284F8A9957}" srcOrd="0" destOrd="0" parTransId="{9D1CB46C-0CFA-4B27-9224-267431FBD094}" sibTransId="{4576BCC5-0598-4332-A2E7-87AC3ADD4EB8}"/>
+    <dgm:cxn modelId="{3A76F5FD-AC51-43D5-A60D-6EA2DBBDF0F6}" type="presOf" srcId="{4DF9FE7B-F642-4898-A360-D4E3814E1A3D}" destId="{674922F1-7266-4681-AD4F-1C618A5FFF23}" srcOrd="1" destOrd="0" presId="urn:microsoft.com/office/officeart/2005/8/layout/list1"/>
+    <dgm:cxn modelId="{3E379D5E-3519-4604-8C91-9AEBC1B5DA6A}" type="presOf" srcId="{60CDF8D0-D4FC-4467-A51E-79C5A58B0B2C}" destId="{864CB39B-29F9-473D-90E5-0686D86E278F}" srcOrd="0" destOrd="0" presId="urn:microsoft.com/office/officeart/2005/8/layout/list1"/>
+    <dgm:cxn modelId="{E5CEC4D5-8628-455D-AB22-455033237B52}" type="presOf" srcId="{4ECFD363-85F6-4806-9CE7-A1A1FCEFBEC8}" destId="{432FD8AD-628D-4FE4-9A5D-06069E9A39D1}" srcOrd="0" destOrd="1" presId="urn:microsoft.com/office/officeart/2005/8/layout/list1"/>
     <dgm:cxn modelId="{706ABD05-1530-4082-93F2-868BABBF7119}" type="presOf" srcId="{811C00EC-AF2A-41BC-B4D9-02AB7BF66167}" destId="{DCECB3F3-48FE-4150-B216-DF6D00C412A6}" srcOrd="0" destOrd="0" presId="urn:microsoft.com/office/officeart/2005/8/layout/list1"/>
-    <dgm:cxn modelId="{3A76F5FD-AC51-43D5-A60D-6EA2DBBDF0F6}" type="presOf" srcId="{4DF9FE7B-F642-4898-A360-D4E3814E1A3D}" destId="{674922F1-7266-4681-AD4F-1C618A5FFF23}" srcOrd="1" destOrd="0" presId="urn:microsoft.com/office/officeart/2005/8/layout/list1"/>
+    <dgm:cxn modelId="{B3B26E9A-58E5-497B-BD59-F5567958C609}" srcId="{3929B1E1-4BC4-4C73-ABE8-27CEF96A3652}" destId="{0791135C-9DAB-47F6-BE9C-A3E56A2DDA50}" srcOrd="1" destOrd="0" parTransId="{D6057E63-9793-4991-97C1-30FC405E95A5}" sibTransId="{B670C2A7-83CB-4F4C-BC19-A3A7C066A822}"/>
+    <dgm:cxn modelId="{1339090C-9A95-4C05-841C-FA3AF987601B}" srcId="{3F442EA2-39BA-4C9A-AD59-755D4917D532}" destId="{3929B1E1-4BC4-4C73-ABE8-27CEF96A3652}" srcOrd="1" destOrd="0" parTransId="{F356CC76-9117-4B79-A270-BBBAFD3E9C79}" sibTransId="{19BA0C22-38BB-4E9F-89D5-0FF5FF9F12CE}"/>
+    <dgm:cxn modelId="{A058DDA2-48CA-4E5B-B389-F71A59C262B0}" srcId="{4DF9FE7B-F642-4898-A360-D4E3814E1A3D}" destId="{EFF2750D-B4B3-474C-8B62-8B638DC31F7E}" srcOrd="0" destOrd="0" parTransId="{AEBC78E6-CDDC-4C8F-A157-3C51E907FACD}" sibTransId="{75C067D7-FCD2-4969-8F27-4BBDA88E75ED}"/>
+    <dgm:cxn modelId="{E12E128A-D14B-4DAD-B3C2-4C2D815371A8}" type="presOf" srcId="{3929B1E1-4BC4-4C73-ABE8-27CEF96A3652}" destId="{D0037F0D-DB9A-4BA4-97B4-D939B26E14DA}" srcOrd="0" destOrd="0" presId="urn:microsoft.com/office/officeart/2005/8/layout/list1"/>
+    <dgm:cxn modelId="{841BB473-ABE9-4F34-ADA3-6CC21D9F755C}" type="presOf" srcId="{642344CB-74C8-44A2-9463-BFA935A3A62B}" destId="{432FD8AD-628D-4FE4-9A5D-06069E9A39D1}" srcOrd="0" destOrd="0" presId="urn:microsoft.com/office/officeart/2005/8/layout/list1"/>
+    <dgm:cxn modelId="{91E8EE10-A24D-4E72-918C-DFE8B8A56CE9}" type="presOf" srcId="{EFF2750D-B4B3-474C-8B62-8B638DC31F7E}" destId="{80259B02-529C-422B-91BE-D70198BA9F6C}" srcOrd="0" destOrd="0" presId="urn:microsoft.com/office/officeart/2005/8/layout/list1"/>
     <dgm:cxn modelId="{3F41141F-3FE3-4E69-BA1B-B1022C76134F}" type="presOf" srcId="{0791135C-9DAB-47F6-BE9C-A3E56A2DDA50}" destId="{5282638F-EFF2-4770-BB1A-21455422E45D}" srcOrd="0" destOrd="1" presId="urn:microsoft.com/office/officeart/2005/8/layout/list1"/>
-    <dgm:cxn modelId="{B3B26E9A-58E5-497B-BD59-F5567958C609}" srcId="{3929B1E1-4BC4-4C73-ABE8-27CEF96A3652}" destId="{0791135C-9DAB-47F6-BE9C-A3E56A2DDA50}" srcOrd="1" destOrd="0" parTransId="{D6057E63-9793-4991-97C1-30FC405E95A5}" sibTransId="{B670C2A7-83CB-4F4C-BC19-A3A7C066A822}"/>
-    <dgm:cxn modelId="{133AB3BA-08EC-432D-814B-0243B8AEAE27}" type="presOf" srcId="{3F442EA2-39BA-4C9A-AD59-755D4917D532}" destId="{E6A445EE-D086-4B01-B491-D67950A5A065}" srcOrd="0" destOrd="0" presId="urn:microsoft.com/office/officeart/2005/8/layout/list1"/>
-    <dgm:cxn modelId="{1E2AF7A7-4249-461B-83BB-16ACFF1DA743}" type="presOf" srcId="{7546B606-AE19-4DA1-836A-6DC3B1656F3B}" destId="{964E6811-5072-4466-B721-689C35A65029}" srcOrd="0" destOrd="1" presId="urn:microsoft.com/office/officeart/2005/8/layout/list1"/>
     <dgm:cxn modelId="{FE866214-6E53-4F61-A3B3-3359C0859B89}" srcId="{60CDF8D0-D4FC-4467-A51E-79C5A58B0B2C}" destId="{7546B606-AE19-4DA1-836A-6DC3B1656F3B}" srcOrd="1" destOrd="0" parTransId="{2B344FFA-B952-4470-BB79-994EACF91B19}" sibTransId="{B629EC96-B0EC-4783-9EA2-7ACAEF35DFEF}"/>
-    <dgm:cxn modelId="{EF39DC10-C489-4F29-BCDA-31D69D3CEE27}" type="presOf" srcId="{60CDF8D0-D4FC-4467-A51E-79C5A58B0B2C}" destId="{5B203A22-00AF-46E7-9415-C6DAFD7E01CC}" srcOrd="1" destOrd="0" presId="urn:microsoft.com/office/officeart/2005/8/layout/list1"/>
-    <dgm:cxn modelId="{3E379D5E-3519-4604-8C91-9AEBC1B5DA6A}" type="presOf" srcId="{60CDF8D0-D4FC-4467-A51E-79C5A58B0B2C}" destId="{864CB39B-29F9-473D-90E5-0686D86E278F}" srcOrd="0" destOrd="0" presId="urn:microsoft.com/office/officeart/2005/8/layout/list1"/>
     <dgm:cxn modelId="{2BA65DEC-E719-4ED3-8135-48349D42DD04}" srcId="{3F442EA2-39BA-4C9A-AD59-755D4917D532}" destId="{60CDF8D0-D4FC-4467-A51E-79C5A58B0B2C}" srcOrd="2" destOrd="0" parTransId="{E12A269F-AB82-486A-9077-80F2BBBE48C2}" sibTransId="{3F7FD59D-A716-4310-A89A-AB6F740D9FFF}"/>
-    <dgm:cxn modelId="{E12E128A-D14B-4DAD-B3C2-4C2D815371A8}" type="presOf" srcId="{3929B1E1-4BC4-4C73-ABE8-27CEF96A3652}" destId="{D0037F0D-DB9A-4BA4-97B4-D939B26E14DA}" srcOrd="0" destOrd="0" presId="urn:microsoft.com/office/officeart/2005/8/layout/list1"/>
-    <dgm:cxn modelId="{1339090C-9A95-4C05-841C-FA3AF987601B}" srcId="{3F442EA2-39BA-4C9A-AD59-755D4917D532}" destId="{3929B1E1-4BC4-4C73-ABE8-27CEF96A3652}" srcOrd="1" destOrd="0" parTransId="{F356CC76-9117-4B79-A270-BBBAFD3E9C79}" sibTransId="{19BA0C22-38BB-4E9F-89D5-0FF5FF9F12CE}"/>
-    <dgm:cxn modelId="{50B238DE-3A9C-48F6-8EA6-E05A25BDB667}" type="presOf" srcId="{811C00EC-AF2A-41BC-B4D9-02AB7BF66167}" destId="{017C7AB9-C6C8-4BAC-ADBB-9FD707BE0F60}" srcOrd="1" destOrd="0" presId="urn:microsoft.com/office/officeart/2005/8/layout/list1"/>
-    <dgm:cxn modelId="{1D32FCC9-657C-4348-9C0D-52115D559FEB}" srcId="{60CDF8D0-D4FC-4467-A51E-79C5A58B0B2C}" destId="{50629C12-7464-4473-ADEF-1A284F8A9957}" srcOrd="0" destOrd="0" parTransId="{9D1CB46C-0CFA-4B27-9224-267431FBD094}" sibTransId="{4576BCC5-0598-4332-A2E7-87AC3ADD4EB8}"/>
-    <dgm:cxn modelId="{88737A90-08F9-41C4-84D7-F5D26E840A5F}" srcId="{811C00EC-AF2A-41BC-B4D9-02AB7BF66167}" destId="{4ECFD363-85F6-4806-9CE7-A1A1FCEFBEC8}" srcOrd="1" destOrd="0" parTransId="{1EA1C62E-7087-486E-8BB4-15B04AB1553D}" sibTransId="{963EB80F-78DD-485D-93DF-672EF4A6C93E}"/>
-    <dgm:cxn modelId="{F7E95423-786D-404D-8158-68B1C89303BF}" type="presOf" srcId="{4DF9FE7B-F642-4898-A360-D4E3814E1A3D}" destId="{7E290D25-335D-4339-A8E8-B036E46B5EB5}" srcOrd="0" destOrd="0" presId="urn:microsoft.com/office/officeart/2005/8/layout/list1"/>
-    <dgm:cxn modelId="{E5CEC4D5-8628-455D-AB22-455033237B52}" type="presOf" srcId="{4ECFD363-85F6-4806-9CE7-A1A1FCEFBEC8}" destId="{432FD8AD-628D-4FE4-9A5D-06069E9A39D1}" srcOrd="0" destOrd="1" presId="urn:microsoft.com/office/officeart/2005/8/layout/list1"/>
-    <dgm:cxn modelId="{D777451D-9818-431F-B600-33C7C8A40A98}" type="presOf" srcId="{3929B1E1-4BC4-4C73-ABE8-27CEF96A3652}" destId="{21EEBBE2-729F-4D85-8CAE-C2B30FF126D2}" srcOrd="1" destOrd="0" presId="urn:microsoft.com/office/officeart/2005/8/layout/list1"/>
-    <dgm:cxn modelId="{9F679DC2-6B0E-43AA-A414-29A0BEBDE7EB}" type="presOf" srcId="{50629C12-7464-4473-ADEF-1A284F8A9957}" destId="{964E6811-5072-4466-B721-689C35A65029}" srcOrd="0" destOrd="0" presId="urn:microsoft.com/office/officeart/2005/8/layout/list1"/>
-    <dgm:cxn modelId="{841BB473-ABE9-4F34-ADA3-6CC21D9F755C}" type="presOf" srcId="{642344CB-74C8-44A2-9463-BFA935A3A62B}" destId="{432FD8AD-628D-4FE4-9A5D-06069E9A39D1}" srcOrd="0" destOrd="0" presId="urn:microsoft.com/office/officeart/2005/8/layout/list1"/>
-    <dgm:cxn modelId="{09FCCB9D-A30A-4326-970E-26252D39327F}" srcId="{3929B1E1-4BC4-4C73-ABE8-27CEF96A3652}" destId="{99E0600D-9954-43F4-8926-13B8777FAAA1}" srcOrd="0" destOrd="0" parTransId="{BE23F476-2C5C-42ED-BF2B-CD5FC7ADDDF6}" sibTransId="{C44937DC-4907-4769-AA8B-1B3E7391D7B0}"/>
-    <dgm:cxn modelId="{EBD8BE8D-6018-43E2-B081-034BB5656EB6}" srcId="{3F442EA2-39BA-4C9A-AD59-755D4917D532}" destId="{4DF9FE7B-F642-4898-A360-D4E3814E1A3D}" srcOrd="0" destOrd="0" parTransId="{1C10F06D-860A-4604-A7AD-02E614FE3976}" sibTransId="{43C18EFF-81FC-4D70-8C6B-E95FF3730413}"/>
-    <dgm:cxn modelId="{91E8EE10-A24D-4E72-918C-DFE8B8A56CE9}" type="presOf" srcId="{EFF2750D-B4B3-474C-8B62-8B638DC31F7E}" destId="{80259B02-529C-422B-91BE-D70198BA9F6C}" srcOrd="0" destOrd="0" presId="urn:microsoft.com/office/officeart/2005/8/layout/list1"/>
     <dgm:cxn modelId="{E4084DFF-29F3-410F-A8D3-8196CAAA5DB9}" srcId="{3F442EA2-39BA-4C9A-AD59-755D4917D532}" destId="{811C00EC-AF2A-41BC-B4D9-02AB7BF66167}" srcOrd="3" destOrd="0" parTransId="{1BFE45BE-61AB-4FD4-83D0-99B56BDD0245}" sibTransId="{246B1081-1195-470B-AC85-81C4BB95A57C}"/>
     <dgm:cxn modelId="{FC3C0DB7-9FD1-4688-8024-16D6F63718C0}" type="presOf" srcId="{99E0600D-9954-43F4-8926-13B8777FAAA1}" destId="{5282638F-EFF2-4770-BB1A-21455422E45D}" srcOrd="0" destOrd="0" presId="urn:microsoft.com/office/officeart/2005/8/layout/list1"/>
-    <dgm:cxn modelId="{A058DDA2-48CA-4E5B-B389-F71A59C262B0}" srcId="{4DF9FE7B-F642-4898-A360-D4E3814E1A3D}" destId="{EFF2750D-B4B3-474C-8B62-8B638DC31F7E}" srcOrd="0" destOrd="0" parTransId="{AEBC78E6-CDDC-4C8F-A157-3C51E907FACD}" sibTransId="{75C067D7-FCD2-4969-8F27-4BBDA88E75ED}"/>
+    <dgm:cxn modelId="{D777451D-9818-431F-B600-33C7C8A40A98}" type="presOf" srcId="{3929B1E1-4BC4-4C73-ABE8-27CEF96A3652}" destId="{21EEBBE2-729F-4D85-8CAE-C2B30FF126D2}" srcOrd="1" destOrd="0" presId="urn:microsoft.com/office/officeart/2005/8/layout/list1"/>
+    <dgm:cxn modelId="{88737A90-08F9-41C4-84D7-F5D26E840A5F}" srcId="{811C00EC-AF2A-41BC-B4D9-02AB7BF66167}" destId="{4ECFD363-85F6-4806-9CE7-A1A1FCEFBEC8}" srcOrd="1" destOrd="0" parTransId="{1EA1C62E-7087-486E-8BB4-15B04AB1553D}" sibTransId="{963EB80F-78DD-485D-93DF-672EF4A6C93E}"/>
+    <dgm:cxn modelId="{50B238DE-3A9C-48F6-8EA6-E05A25BDB667}" type="presOf" srcId="{811C00EC-AF2A-41BC-B4D9-02AB7BF66167}" destId="{017C7AB9-C6C8-4BAC-ADBB-9FD707BE0F60}" srcOrd="1" destOrd="0" presId="urn:microsoft.com/office/officeart/2005/8/layout/list1"/>
+    <dgm:cxn modelId="{F7E95423-786D-404D-8158-68B1C89303BF}" type="presOf" srcId="{4DF9FE7B-F642-4898-A360-D4E3814E1A3D}" destId="{7E290D25-335D-4339-A8E8-B036E46B5EB5}" srcOrd="0" destOrd="0" presId="urn:microsoft.com/office/officeart/2005/8/layout/list1"/>
     <dgm:cxn modelId="{7C96F733-1FEB-4464-AFE2-A6FFE050E7F5}" type="presParOf" srcId="{E6A445EE-D086-4B01-B491-D67950A5A065}" destId="{6D3A9625-D3EB-4CA1-AB05-34452283708A}" srcOrd="0" destOrd="0" presId="urn:microsoft.com/office/officeart/2005/8/layout/list1"/>
     <dgm:cxn modelId="{52625C28-CB81-4E22-A0FD-8E29373E6B1B}" type="presParOf" srcId="{6D3A9625-D3EB-4CA1-AB05-34452283708A}" destId="{7E290D25-335D-4339-A8E8-B036E46B5EB5}" srcOrd="0" destOrd="0" presId="urn:microsoft.com/office/officeart/2005/8/layout/list1"/>
     <dgm:cxn modelId="{B0C612E2-3EE1-400E-AE2C-6D7A4CC4C27B}" type="presParOf" srcId="{6D3A9625-D3EB-4CA1-AB05-34452283708A}" destId="{674922F1-7266-4681-AD4F-1C618A5FFF23}" srcOrd="1" destOrd="0" presId="urn:microsoft.com/office/officeart/2005/8/layout/list1"/>
@@ -5316,7 +5316,6 @@
             <a:rPr lang="it" dirty="0"/>
             <a:t>» 99,6%, «s_alta» 99,3%</a:t>
           </a:r>
-          <a:endParaRPr lang="it" dirty="0"/>
         </a:p>
       </dgm:t>
     </dgm:pt>
@@ -8082,7 +8081,6 @@
             <a:rPr lang="it" sz="1800" kern="1200" dirty="0"/>
             <a:t>» 99,6%, «s_alta» 99,3%</a:t>
           </a:r>
-          <a:endParaRPr lang="it" sz="1800" kern="1200" dirty="0"/>
         </a:p>
       </dsp:txBody>
       <dsp:txXfrm>
@@ -13292,7 +13290,7 @@
             <a:pPr algn="r" rtl="0"/>
             <a:fld id="{E435D5CA-217C-4614-9A3C-EEC5D594B056}" type="datetime1">
               <a:rPr lang="it-IT" smtClean="0"/>
-              <a:t>23/02/2017</a:t>
+              <a:t>24/02/2017</a:t>
             </a:fld>
             <a:endParaRPr lang="it-IT" dirty="0"/>
           </a:p>
@@ -13462,7 +13460,7 @@
             <a:fld id="{733F77F8-8E21-427A-8345-023BF3B42495}" type="datetime1">
               <a:rPr lang="it-IT" smtClean="0"/>
               <a:pPr/>
-              <a:t>23/02/2017</a:t>
+              <a:t>24/02/2017</a:t>
             </a:fld>
             <a:endParaRPr lang="it-IT" dirty="0"/>
           </a:p>
@@ -14313,7 +14311,7 @@
             <a:fld id="{954F1948-006C-4AF2-9BB8-5590DE340B4E}" type="datetime1">
               <a:rPr lang="it-IT" smtClean="0"/>
               <a:pPr/>
-              <a:t>23/02/2017</a:t>
+              <a:t>24/02/2017</a:t>
             </a:fld>
             <a:endParaRPr lang="it-IT" dirty="0"/>
           </a:p>
@@ -14929,7 +14927,7 @@
             <a:fld id="{52F27A4B-BCBB-40DF-973A-4AE100165E4F}" type="datetime1">
               <a:rPr lang="it-IT" smtClean="0"/>
               <a:pPr/>
-              <a:t>23/02/2017</a:t>
+              <a:t>24/02/2017</a:t>
             </a:fld>
             <a:endParaRPr lang="it-IT" dirty="0"/>
           </a:p>
@@ -15146,7 +15144,7 @@
             <a:fld id="{C5CBB97D-C66D-4A88-B7A2-EC7A53906B2B}" type="datetime1">
               <a:rPr lang="it-IT" smtClean="0"/>
               <a:pPr/>
-              <a:t>23/02/2017</a:t>
+              <a:t>24/02/2017</a:t>
             </a:fld>
             <a:endParaRPr lang="it-IT" dirty="0"/>
           </a:p>
@@ -15353,7 +15351,7 @@
             <a:fld id="{173EC95F-BA1B-4C18-9366-021280E8FCDD}" type="datetime1">
               <a:rPr lang="it-IT" smtClean="0"/>
               <a:pPr/>
-              <a:t>23/02/2017</a:t>
+              <a:t>24/02/2017</a:t>
             </a:fld>
             <a:endParaRPr lang="it-IT" dirty="0"/>
           </a:p>
@@ -15626,7 +15624,7 @@
             <a:fld id="{13B66685-9917-4FA9-97FA-F7CBD01B573E}" type="datetime1">
               <a:rPr lang="it-IT" smtClean="0"/>
               <a:pPr/>
-              <a:t>23/02/2017</a:t>
+              <a:t>24/02/2017</a:t>
             </a:fld>
             <a:endParaRPr lang="it-IT" dirty="0"/>
           </a:p>
@@ -16143,7 +16141,7 @@
             <a:fld id="{C3AD8BBD-71CC-409E-BFB2-246F17C5C82E}" type="datetime1">
               <a:rPr lang="it-IT" smtClean="0"/>
               <a:pPr/>
-              <a:t>23/02/2017</a:t>
+              <a:t>24/02/2017</a:t>
             </a:fld>
             <a:endParaRPr lang="it-IT" dirty="0"/>
           </a:p>
@@ -16612,7 +16610,7 @@
             <a:fld id="{4DC9B8B0-4BE3-42F0-A6AA-86DCD761CF6F}" type="datetime1">
               <a:rPr lang="it-IT" smtClean="0"/>
               <a:pPr/>
-              <a:t>23/02/2017</a:t>
+              <a:t>24/02/2017</a:t>
             </a:fld>
             <a:endParaRPr lang="it-IT" dirty="0"/>
           </a:p>
@@ -16751,7 +16749,7 @@
             <a:fld id="{96968A3D-76C6-4711-9926-51A6FD430964}" type="datetime1">
               <a:rPr lang="it-IT" smtClean="0"/>
               <a:pPr/>
-              <a:t>23/02/2017</a:t>
+              <a:t>24/02/2017</a:t>
             </a:fld>
             <a:endParaRPr lang="it-IT" dirty="0"/>
           </a:p>
@@ -16866,7 +16864,7 @@
             <a:fld id="{711C083B-9FB4-4496-A1AA-CFC98E67E418}" type="datetime1">
               <a:rPr lang="it-IT" smtClean="0"/>
               <a:pPr/>
-              <a:t>23/02/2017</a:t>
+              <a:t>24/02/2017</a:t>
             </a:fld>
             <a:endParaRPr lang="it-IT" dirty="0"/>
           </a:p>
@@ -17168,7 +17166,7 @@
             <a:fld id="{9A4DDAF3-125A-477E-8366-A2A105615D0C}" type="datetime1">
               <a:rPr lang="it-IT" smtClean="0"/>
               <a:pPr/>
-              <a:t>23/02/2017</a:t>
+              <a:t>24/02/2017</a:t>
             </a:fld>
             <a:endParaRPr lang="it-IT" dirty="0"/>
           </a:p>
@@ -17501,7 +17499,7 @@
             <a:fld id="{FAAED65B-ABDB-4384-BED8-4E778B05E186}" type="datetime1">
               <a:rPr lang="it-IT" smtClean="0"/>
               <a:pPr/>
-              <a:t>23/02/2017</a:t>
+              <a:t>24/02/2017</a:t>
             </a:fld>
             <a:endParaRPr lang="it-IT" dirty="0"/>
           </a:p>
@@ -17847,7 +17845,7 @@
             <a:fld id="{9A476C03-45BF-421B-88D9-2B5ED35BE8EE}" type="datetime1">
               <a:rPr lang="it-IT" smtClean="0"/>
               <a:pPr/>
-              <a:t>23/02/2017</a:t>
+              <a:t>24/02/2017</a:t>
             </a:fld>
             <a:endParaRPr lang="it-IT" dirty="0"/>
           </a:p>
@@ -25751,7 +25749,13 @@
           <a:p>
             <a:r>
               <a:rPr lang="it-IT" dirty="0"/>
-              <a:t>Tuttavia includendo fra le etichette anche i tagli errati, la precisione cambia. Le pipeline 1 e 3 hanno ottenuto una precisione del 21%, con moltissimi falsi positivi, le pipeline 2 e 4 invece hanno ottenuto una precisione dell’86%, con la pipeline 2 ad avere il ranking più accurato nel 100% dei casi, mentre la 4 ha talvolta messo la lettera giusta in seconda posizione. </a:t>
+              <a:t>Tuttavia, includendo fra le etichette anche i tagli errati, la precisione cambia. Le pipeline 1 e 3 hanno ottenuto una precisione del 21%, con moltissimi falsi positivi, le pipeline 2 e 4 invece hanno ottenuto una precisione dell’86%, con la pipeline 2 ad avere il ranking più accurato nel 100% dei casi, mentre la 4 ha talvolta messo la lettera giusta in seconda posizione. </a:t>
+            </a:r>
+          </a:p>
+          <a:p>
+            <a:r>
+              <a:rPr lang="it-IT" dirty="0"/>
+              <a:t>La pipeline 2 è inoltre da 10 a 50 volte più veloce delle altre, in grado di elaborare 1000 immagini di lettera al secondo.</a:t>
             </a:r>
           </a:p>
         </p:txBody>
@@ -25908,7 +25912,7 @@
           <a:graphicData uri="http://schemas.openxmlformats.org/presentationml/2006/ole">
             <mc:AlternateContent xmlns:mc="http://schemas.openxmlformats.org/markup-compatibility/2006">
               <mc:Choice xmlns:v="urn:schemas-microsoft-com:vml" Requires="v">
-                <p:oleObj spid="_x0000_s1041" name="Image" r:id="rId3" imgW="10234800" imgH="3263400" progId="Photoshop.Image.16">
+                <p:oleObj spid="_x0000_s1049" name="Image" r:id="rId3" imgW="10234800" imgH="3263400" progId="Photoshop.Image.16">
                   <p:embed/>
                 </p:oleObj>
               </mc:Choice>
@@ -26622,7 +26626,7 @@
           <a:graphicData uri="http://schemas.openxmlformats.org/presentationml/2006/ole">
             <mc:AlternateContent xmlns:mc="http://schemas.openxmlformats.org/markup-compatibility/2006">
               <mc:Choice xmlns:v="urn:schemas-microsoft-com:vml" Requires="v">
-                <p:oleObj spid="_x0000_s1042" name="Image" r:id="rId9" imgW="3161880" imgH="469800" progId="Photoshop.Image.16">
+                <p:oleObj spid="_x0000_s1050" name="Image" r:id="rId9" imgW="3161880" imgH="469800" progId="Photoshop.Image.16">
                   <p:embed/>
                 </p:oleObj>
               </mc:Choice>
@@ -29386,15 +29390,6 @@
 </file>
 
 <file path=customXml/item1.xml><?xml version="1.0" encoding="utf-8"?>
-<?mso-contentType ?>
-<FormTemplates xmlns="http://schemas.microsoft.com/sharepoint/v3/contenttype/forms">
-  <Display>DocumentLibraryForm</Display>
-  <Edit>AssetEditForm</Edit>
-  <New>DocumentLibraryForm</New>
-</FormTemplates>
-</file>
-
-<file path=customXml/item2.xml><?xml version="1.0" encoding="utf-8"?>
 <ct:contentTypeSchema xmlns:ct="http://schemas.microsoft.com/office/2006/metadata/contentType" xmlns:ma="http://schemas.microsoft.com/office/2006/metadata/properties/metaAttributes" ct:_="" ma:_="" ma:contentTypeName="TemplateFile" ma:contentTypeID="0x0101006EDDDB5EE6D98C44930B742096920B300400F5B6D36B3EF94B4E9A635CDF2A18F5B8" ma:contentTypeVersion="72" ma:contentTypeDescription="Create a new document." ma:contentTypeScope="" ma:versionID="a23e56308344d904b51738559c3d67c9">
   <xsd:schema xmlns:xsd="http://www.w3.org/2001/XMLSchema" xmlns:xs="http://www.w3.org/2001/XMLSchema" xmlns:p="http://schemas.microsoft.com/office/2006/metadata/properties" xmlns:ns2="4873beb7-5857-4685-be1f-d57550cc96cc" targetNamespace="http://schemas.microsoft.com/office/2006/metadata/properties" ma:root="true" ma:fieldsID="cd0908cc4600e77bf5da051303e00c8d" ns2:_="">
     <xsd:import namespace="4873beb7-5857-4685-be1f-d57550cc96cc"/>
@@ -30434,6 +30429,15 @@
 </ct:contentTypeSchema>
 </file>
 
+<file path=customXml/item2.xml><?xml version="1.0" encoding="utf-8"?>
+<?mso-contentType ?>
+<FormTemplates xmlns="http://schemas.microsoft.com/sharepoint/v3/contenttype/forms">
+  <Display>DocumentLibraryForm</Display>
+  <Edit>AssetEditForm</Edit>
+  <New>DocumentLibraryForm</New>
+</FormTemplates>
+</file>
+
 <file path=customXml/item3.xml><?xml version="1.0" encoding="utf-8"?>
 <p:properties xmlns:p="http://schemas.microsoft.com/office/2006/metadata/properties" xmlns:xsi="http://www.w3.org/2001/XMLSchema-instance" xmlns:pc="http://schemas.microsoft.com/office/infopath/2007/PartnerControls">
   <documentManagement>
@@ -30561,14 +30565,6 @@
 </file>
 
 <file path=customXml/itemProps1.xml><?xml version="1.0" encoding="utf-8"?>
-<ds:datastoreItem xmlns:ds="http://schemas.openxmlformats.org/officeDocument/2006/customXml" ds:itemID="{8D003AC8-209A-4321-A17C-1B7A20643390}">
-  <ds:schemaRefs>
-    <ds:schemaRef ds:uri="http://schemas.microsoft.com/sharepoint/v3/contenttype/forms"/>
-  </ds:schemaRefs>
-</ds:datastoreItem>
-</file>
-
-<file path=customXml/itemProps2.xml><?xml version="1.0" encoding="utf-8"?>
 <ds:datastoreItem xmlns:ds="http://schemas.openxmlformats.org/officeDocument/2006/customXml" ds:itemID="{83ED4759-CFDD-43F0-817C-11D9197192BA}">
   <ds:schemaRefs>
     <ds:schemaRef ds:uri="http://schemas.microsoft.com/office/2006/metadata/contentType"/>
@@ -30582,6 +30578,14 @@
     <ds:schemaRef ds:uri="http://purl.org/dc/elements/1.1/"/>
     <ds:schemaRef ds:uri="http://purl.org/dc/terms/"/>
     <ds:schemaRef ds:uri="http://schemas.microsoft.com/internal/obd"/>
+  </ds:schemaRefs>
+</ds:datastoreItem>
+</file>
+
+<file path=customXml/itemProps2.xml><?xml version="1.0" encoding="utf-8"?>
+<ds:datastoreItem xmlns:ds="http://schemas.openxmlformats.org/officeDocument/2006/customXml" ds:itemID="{8D003AC8-209A-4321-A17C-1B7A20643390}">
+  <ds:schemaRefs>
+    <ds:schemaRef ds:uri="http://schemas.microsoft.com/sharepoint/v3/contenttype/forms"/>
   </ds:schemaRefs>
 </ds:datastoreItem>
 </file>

</xml_diff>

<commit_message>
some reorder and data update
</commit_message>
<xml_diff>
--- a/Relazione/Slide.pptx
+++ b/Relazione/Slide.pptx
@@ -3871,32 +3871,32 @@
   </dgm:ptLst>
   <dgm:cxnLst>
     <dgm:cxn modelId="{8FDA287C-F522-4798-84DD-FAE7202E2218}" srcId="{811C00EC-AF2A-41BC-B4D9-02AB7BF66167}" destId="{642344CB-74C8-44A2-9463-BFA935A3A62B}" srcOrd="0" destOrd="0" parTransId="{D88B29CC-9C89-46D1-9E57-A5161404AFCD}" sibTransId="{2BEF3B21-EA46-458C-9F13-3A6249480696}"/>
+    <dgm:cxn modelId="{706ABD05-1530-4082-93F2-868BABBF7119}" type="presOf" srcId="{811C00EC-AF2A-41BC-B4D9-02AB7BF66167}" destId="{DCECB3F3-48FE-4150-B216-DF6D00C412A6}" srcOrd="0" destOrd="0" presId="urn:microsoft.com/office/officeart/2005/8/layout/list1"/>
+    <dgm:cxn modelId="{3A76F5FD-AC51-43D5-A60D-6EA2DBBDF0F6}" type="presOf" srcId="{4DF9FE7B-F642-4898-A360-D4E3814E1A3D}" destId="{674922F1-7266-4681-AD4F-1C618A5FFF23}" srcOrd="1" destOrd="0" presId="urn:microsoft.com/office/officeart/2005/8/layout/list1"/>
+    <dgm:cxn modelId="{3F41141F-3FE3-4E69-BA1B-B1022C76134F}" type="presOf" srcId="{0791135C-9DAB-47F6-BE9C-A3E56A2DDA50}" destId="{5282638F-EFF2-4770-BB1A-21455422E45D}" srcOrd="0" destOrd="1" presId="urn:microsoft.com/office/officeart/2005/8/layout/list1"/>
+    <dgm:cxn modelId="{B3B26E9A-58E5-497B-BD59-F5567958C609}" srcId="{3929B1E1-4BC4-4C73-ABE8-27CEF96A3652}" destId="{0791135C-9DAB-47F6-BE9C-A3E56A2DDA50}" srcOrd="1" destOrd="0" parTransId="{D6057E63-9793-4991-97C1-30FC405E95A5}" sibTransId="{B670C2A7-83CB-4F4C-BC19-A3A7C066A822}"/>
     <dgm:cxn modelId="{133AB3BA-08EC-432D-814B-0243B8AEAE27}" type="presOf" srcId="{3F442EA2-39BA-4C9A-AD59-755D4917D532}" destId="{E6A445EE-D086-4B01-B491-D67950A5A065}" srcOrd="0" destOrd="0" presId="urn:microsoft.com/office/officeart/2005/8/layout/list1"/>
+    <dgm:cxn modelId="{1E2AF7A7-4249-461B-83BB-16ACFF1DA743}" type="presOf" srcId="{7546B606-AE19-4DA1-836A-6DC3B1656F3B}" destId="{964E6811-5072-4466-B721-689C35A65029}" srcOrd="0" destOrd="1" presId="urn:microsoft.com/office/officeart/2005/8/layout/list1"/>
+    <dgm:cxn modelId="{FE866214-6E53-4F61-A3B3-3359C0859B89}" srcId="{60CDF8D0-D4FC-4467-A51E-79C5A58B0B2C}" destId="{7546B606-AE19-4DA1-836A-6DC3B1656F3B}" srcOrd="1" destOrd="0" parTransId="{2B344FFA-B952-4470-BB79-994EACF91B19}" sibTransId="{B629EC96-B0EC-4783-9EA2-7ACAEF35DFEF}"/>
+    <dgm:cxn modelId="{EF39DC10-C489-4F29-BCDA-31D69D3CEE27}" type="presOf" srcId="{60CDF8D0-D4FC-4467-A51E-79C5A58B0B2C}" destId="{5B203A22-00AF-46E7-9415-C6DAFD7E01CC}" srcOrd="1" destOrd="0" presId="urn:microsoft.com/office/officeart/2005/8/layout/list1"/>
+    <dgm:cxn modelId="{3E379D5E-3519-4604-8C91-9AEBC1B5DA6A}" type="presOf" srcId="{60CDF8D0-D4FC-4467-A51E-79C5A58B0B2C}" destId="{864CB39B-29F9-473D-90E5-0686D86E278F}" srcOrd="0" destOrd="0" presId="urn:microsoft.com/office/officeart/2005/8/layout/list1"/>
+    <dgm:cxn modelId="{2BA65DEC-E719-4ED3-8135-48349D42DD04}" srcId="{3F442EA2-39BA-4C9A-AD59-755D4917D532}" destId="{60CDF8D0-D4FC-4467-A51E-79C5A58B0B2C}" srcOrd="2" destOrd="0" parTransId="{E12A269F-AB82-486A-9077-80F2BBBE48C2}" sibTransId="{3F7FD59D-A716-4310-A89A-AB6F740D9FFF}"/>
+    <dgm:cxn modelId="{E12E128A-D14B-4DAD-B3C2-4C2D815371A8}" type="presOf" srcId="{3929B1E1-4BC4-4C73-ABE8-27CEF96A3652}" destId="{D0037F0D-DB9A-4BA4-97B4-D939B26E14DA}" srcOrd="0" destOrd="0" presId="urn:microsoft.com/office/officeart/2005/8/layout/list1"/>
+    <dgm:cxn modelId="{1339090C-9A95-4C05-841C-FA3AF987601B}" srcId="{3F442EA2-39BA-4C9A-AD59-755D4917D532}" destId="{3929B1E1-4BC4-4C73-ABE8-27CEF96A3652}" srcOrd="1" destOrd="0" parTransId="{F356CC76-9117-4B79-A270-BBBAFD3E9C79}" sibTransId="{19BA0C22-38BB-4E9F-89D5-0FF5FF9F12CE}"/>
+    <dgm:cxn modelId="{50B238DE-3A9C-48F6-8EA6-E05A25BDB667}" type="presOf" srcId="{811C00EC-AF2A-41BC-B4D9-02AB7BF66167}" destId="{017C7AB9-C6C8-4BAC-ADBB-9FD707BE0F60}" srcOrd="1" destOrd="0" presId="urn:microsoft.com/office/officeart/2005/8/layout/list1"/>
+    <dgm:cxn modelId="{1D32FCC9-657C-4348-9C0D-52115D559FEB}" srcId="{60CDF8D0-D4FC-4467-A51E-79C5A58B0B2C}" destId="{50629C12-7464-4473-ADEF-1A284F8A9957}" srcOrd="0" destOrd="0" parTransId="{9D1CB46C-0CFA-4B27-9224-267431FBD094}" sibTransId="{4576BCC5-0598-4332-A2E7-87AC3ADD4EB8}"/>
+    <dgm:cxn modelId="{88737A90-08F9-41C4-84D7-F5D26E840A5F}" srcId="{811C00EC-AF2A-41BC-B4D9-02AB7BF66167}" destId="{4ECFD363-85F6-4806-9CE7-A1A1FCEFBEC8}" srcOrd="1" destOrd="0" parTransId="{1EA1C62E-7087-486E-8BB4-15B04AB1553D}" sibTransId="{963EB80F-78DD-485D-93DF-672EF4A6C93E}"/>
+    <dgm:cxn modelId="{F7E95423-786D-404D-8158-68B1C89303BF}" type="presOf" srcId="{4DF9FE7B-F642-4898-A360-D4E3814E1A3D}" destId="{7E290D25-335D-4339-A8E8-B036E46B5EB5}" srcOrd="0" destOrd="0" presId="urn:microsoft.com/office/officeart/2005/8/layout/list1"/>
+    <dgm:cxn modelId="{E5CEC4D5-8628-455D-AB22-455033237B52}" type="presOf" srcId="{4ECFD363-85F6-4806-9CE7-A1A1FCEFBEC8}" destId="{432FD8AD-628D-4FE4-9A5D-06069E9A39D1}" srcOrd="0" destOrd="1" presId="urn:microsoft.com/office/officeart/2005/8/layout/list1"/>
+    <dgm:cxn modelId="{D777451D-9818-431F-B600-33C7C8A40A98}" type="presOf" srcId="{3929B1E1-4BC4-4C73-ABE8-27CEF96A3652}" destId="{21EEBBE2-729F-4D85-8CAE-C2B30FF126D2}" srcOrd="1" destOrd="0" presId="urn:microsoft.com/office/officeart/2005/8/layout/list1"/>
     <dgm:cxn modelId="{9F679DC2-6B0E-43AA-A414-29A0BEBDE7EB}" type="presOf" srcId="{50629C12-7464-4473-ADEF-1A284F8A9957}" destId="{964E6811-5072-4466-B721-689C35A65029}" srcOrd="0" destOrd="0" presId="urn:microsoft.com/office/officeart/2005/8/layout/list1"/>
-    <dgm:cxn modelId="{EF39DC10-C489-4F29-BCDA-31D69D3CEE27}" type="presOf" srcId="{60CDF8D0-D4FC-4467-A51E-79C5A58B0B2C}" destId="{5B203A22-00AF-46E7-9415-C6DAFD7E01CC}" srcOrd="1" destOrd="0" presId="urn:microsoft.com/office/officeart/2005/8/layout/list1"/>
+    <dgm:cxn modelId="{841BB473-ABE9-4F34-ADA3-6CC21D9F755C}" type="presOf" srcId="{642344CB-74C8-44A2-9463-BFA935A3A62B}" destId="{432FD8AD-628D-4FE4-9A5D-06069E9A39D1}" srcOrd="0" destOrd="0" presId="urn:microsoft.com/office/officeart/2005/8/layout/list1"/>
+    <dgm:cxn modelId="{09FCCB9D-A30A-4326-970E-26252D39327F}" srcId="{3929B1E1-4BC4-4C73-ABE8-27CEF96A3652}" destId="{99E0600D-9954-43F4-8926-13B8777FAAA1}" srcOrd="0" destOrd="0" parTransId="{BE23F476-2C5C-42ED-BF2B-CD5FC7ADDDF6}" sibTransId="{C44937DC-4907-4769-AA8B-1B3E7391D7B0}"/>
     <dgm:cxn modelId="{EBD8BE8D-6018-43E2-B081-034BB5656EB6}" srcId="{3F442EA2-39BA-4C9A-AD59-755D4917D532}" destId="{4DF9FE7B-F642-4898-A360-D4E3814E1A3D}" srcOrd="0" destOrd="0" parTransId="{1C10F06D-860A-4604-A7AD-02E614FE3976}" sibTransId="{43C18EFF-81FC-4D70-8C6B-E95FF3730413}"/>
-    <dgm:cxn modelId="{09FCCB9D-A30A-4326-970E-26252D39327F}" srcId="{3929B1E1-4BC4-4C73-ABE8-27CEF96A3652}" destId="{99E0600D-9954-43F4-8926-13B8777FAAA1}" srcOrd="0" destOrd="0" parTransId="{BE23F476-2C5C-42ED-BF2B-CD5FC7ADDDF6}" sibTransId="{C44937DC-4907-4769-AA8B-1B3E7391D7B0}"/>
-    <dgm:cxn modelId="{1E2AF7A7-4249-461B-83BB-16ACFF1DA743}" type="presOf" srcId="{7546B606-AE19-4DA1-836A-6DC3B1656F3B}" destId="{964E6811-5072-4466-B721-689C35A65029}" srcOrd="0" destOrd="1" presId="urn:microsoft.com/office/officeart/2005/8/layout/list1"/>
-    <dgm:cxn modelId="{1D32FCC9-657C-4348-9C0D-52115D559FEB}" srcId="{60CDF8D0-D4FC-4467-A51E-79C5A58B0B2C}" destId="{50629C12-7464-4473-ADEF-1A284F8A9957}" srcOrd="0" destOrd="0" parTransId="{9D1CB46C-0CFA-4B27-9224-267431FBD094}" sibTransId="{4576BCC5-0598-4332-A2E7-87AC3ADD4EB8}"/>
-    <dgm:cxn modelId="{3A76F5FD-AC51-43D5-A60D-6EA2DBBDF0F6}" type="presOf" srcId="{4DF9FE7B-F642-4898-A360-D4E3814E1A3D}" destId="{674922F1-7266-4681-AD4F-1C618A5FFF23}" srcOrd="1" destOrd="0" presId="urn:microsoft.com/office/officeart/2005/8/layout/list1"/>
-    <dgm:cxn modelId="{3E379D5E-3519-4604-8C91-9AEBC1B5DA6A}" type="presOf" srcId="{60CDF8D0-D4FC-4467-A51E-79C5A58B0B2C}" destId="{864CB39B-29F9-473D-90E5-0686D86E278F}" srcOrd="0" destOrd="0" presId="urn:microsoft.com/office/officeart/2005/8/layout/list1"/>
-    <dgm:cxn modelId="{E5CEC4D5-8628-455D-AB22-455033237B52}" type="presOf" srcId="{4ECFD363-85F6-4806-9CE7-A1A1FCEFBEC8}" destId="{432FD8AD-628D-4FE4-9A5D-06069E9A39D1}" srcOrd="0" destOrd="1" presId="urn:microsoft.com/office/officeart/2005/8/layout/list1"/>
-    <dgm:cxn modelId="{706ABD05-1530-4082-93F2-868BABBF7119}" type="presOf" srcId="{811C00EC-AF2A-41BC-B4D9-02AB7BF66167}" destId="{DCECB3F3-48FE-4150-B216-DF6D00C412A6}" srcOrd="0" destOrd="0" presId="urn:microsoft.com/office/officeart/2005/8/layout/list1"/>
-    <dgm:cxn modelId="{B3B26E9A-58E5-497B-BD59-F5567958C609}" srcId="{3929B1E1-4BC4-4C73-ABE8-27CEF96A3652}" destId="{0791135C-9DAB-47F6-BE9C-A3E56A2DDA50}" srcOrd="1" destOrd="0" parTransId="{D6057E63-9793-4991-97C1-30FC405E95A5}" sibTransId="{B670C2A7-83CB-4F4C-BC19-A3A7C066A822}"/>
-    <dgm:cxn modelId="{1339090C-9A95-4C05-841C-FA3AF987601B}" srcId="{3F442EA2-39BA-4C9A-AD59-755D4917D532}" destId="{3929B1E1-4BC4-4C73-ABE8-27CEF96A3652}" srcOrd="1" destOrd="0" parTransId="{F356CC76-9117-4B79-A270-BBBAFD3E9C79}" sibTransId="{19BA0C22-38BB-4E9F-89D5-0FF5FF9F12CE}"/>
-    <dgm:cxn modelId="{A058DDA2-48CA-4E5B-B389-F71A59C262B0}" srcId="{4DF9FE7B-F642-4898-A360-D4E3814E1A3D}" destId="{EFF2750D-B4B3-474C-8B62-8B638DC31F7E}" srcOrd="0" destOrd="0" parTransId="{AEBC78E6-CDDC-4C8F-A157-3C51E907FACD}" sibTransId="{75C067D7-FCD2-4969-8F27-4BBDA88E75ED}"/>
-    <dgm:cxn modelId="{E12E128A-D14B-4DAD-B3C2-4C2D815371A8}" type="presOf" srcId="{3929B1E1-4BC4-4C73-ABE8-27CEF96A3652}" destId="{D0037F0D-DB9A-4BA4-97B4-D939B26E14DA}" srcOrd="0" destOrd="0" presId="urn:microsoft.com/office/officeart/2005/8/layout/list1"/>
-    <dgm:cxn modelId="{841BB473-ABE9-4F34-ADA3-6CC21D9F755C}" type="presOf" srcId="{642344CB-74C8-44A2-9463-BFA935A3A62B}" destId="{432FD8AD-628D-4FE4-9A5D-06069E9A39D1}" srcOrd="0" destOrd="0" presId="urn:microsoft.com/office/officeart/2005/8/layout/list1"/>
     <dgm:cxn modelId="{91E8EE10-A24D-4E72-918C-DFE8B8A56CE9}" type="presOf" srcId="{EFF2750D-B4B3-474C-8B62-8B638DC31F7E}" destId="{80259B02-529C-422B-91BE-D70198BA9F6C}" srcOrd="0" destOrd="0" presId="urn:microsoft.com/office/officeart/2005/8/layout/list1"/>
-    <dgm:cxn modelId="{3F41141F-3FE3-4E69-BA1B-B1022C76134F}" type="presOf" srcId="{0791135C-9DAB-47F6-BE9C-A3E56A2DDA50}" destId="{5282638F-EFF2-4770-BB1A-21455422E45D}" srcOrd="0" destOrd="1" presId="urn:microsoft.com/office/officeart/2005/8/layout/list1"/>
-    <dgm:cxn modelId="{FE866214-6E53-4F61-A3B3-3359C0859B89}" srcId="{60CDF8D0-D4FC-4467-A51E-79C5A58B0B2C}" destId="{7546B606-AE19-4DA1-836A-6DC3B1656F3B}" srcOrd="1" destOrd="0" parTransId="{2B344FFA-B952-4470-BB79-994EACF91B19}" sibTransId="{B629EC96-B0EC-4783-9EA2-7ACAEF35DFEF}"/>
-    <dgm:cxn modelId="{2BA65DEC-E719-4ED3-8135-48349D42DD04}" srcId="{3F442EA2-39BA-4C9A-AD59-755D4917D532}" destId="{60CDF8D0-D4FC-4467-A51E-79C5A58B0B2C}" srcOrd="2" destOrd="0" parTransId="{E12A269F-AB82-486A-9077-80F2BBBE48C2}" sibTransId="{3F7FD59D-A716-4310-A89A-AB6F740D9FFF}"/>
     <dgm:cxn modelId="{E4084DFF-29F3-410F-A8D3-8196CAAA5DB9}" srcId="{3F442EA2-39BA-4C9A-AD59-755D4917D532}" destId="{811C00EC-AF2A-41BC-B4D9-02AB7BF66167}" srcOrd="3" destOrd="0" parTransId="{1BFE45BE-61AB-4FD4-83D0-99B56BDD0245}" sibTransId="{246B1081-1195-470B-AC85-81C4BB95A57C}"/>
     <dgm:cxn modelId="{FC3C0DB7-9FD1-4688-8024-16D6F63718C0}" type="presOf" srcId="{99E0600D-9954-43F4-8926-13B8777FAAA1}" destId="{5282638F-EFF2-4770-BB1A-21455422E45D}" srcOrd="0" destOrd="0" presId="urn:microsoft.com/office/officeart/2005/8/layout/list1"/>
-    <dgm:cxn modelId="{D777451D-9818-431F-B600-33C7C8A40A98}" type="presOf" srcId="{3929B1E1-4BC4-4C73-ABE8-27CEF96A3652}" destId="{21EEBBE2-729F-4D85-8CAE-C2B30FF126D2}" srcOrd="1" destOrd="0" presId="urn:microsoft.com/office/officeart/2005/8/layout/list1"/>
-    <dgm:cxn modelId="{88737A90-08F9-41C4-84D7-F5D26E840A5F}" srcId="{811C00EC-AF2A-41BC-B4D9-02AB7BF66167}" destId="{4ECFD363-85F6-4806-9CE7-A1A1FCEFBEC8}" srcOrd="1" destOrd="0" parTransId="{1EA1C62E-7087-486E-8BB4-15B04AB1553D}" sibTransId="{963EB80F-78DD-485D-93DF-672EF4A6C93E}"/>
-    <dgm:cxn modelId="{50B238DE-3A9C-48F6-8EA6-E05A25BDB667}" type="presOf" srcId="{811C00EC-AF2A-41BC-B4D9-02AB7BF66167}" destId="{017C7AB9-C6C8-4BAC-ADBB-9FD707BE0F60}" srcOrd="1" destOrd="0" presId="urn:microsoft.com/office/officeart/2005/8/layout/list1"/>
-    <dgm:cxn modelId="{F7E95423-786D-404D-8158-68B1C89303BF}" type="presOf" srcId="{4DF9FE7B-F642-4898-A360-D4E3814E1A3D}" destId="{7E290D25-335D-4339-A8E8-B036E46B5EB5}" srcOrd="0" destOrd="0" presId="urn:microsoft.com/office/officeart/2005/8/layout/list1"/>
+    <dgm:cxn modelId="{A058DDA2-48CA-4E5B-B389-F71A59C262B0}" srcId="{4DF9FE7B-F642-4898-A360-D4E3814E1A3D}" destId="{EFF2750D-B4B3-474C-8B62-8B638DC31F7E}" srcOrd="0" destOrd="0" parTransId="{AEBC78E6-CDDC-4C8F-A157-3C51E907FACD}" sibTransId="{75C067D7-FCD2-4969-8F27-4BBDA88E75ED}"/>
     <dgm:cxn modelId="{7C96F733-1FEB-4464-AFE2-A6FFE050E7F5}" type="presParOf" srcId="{E6A445EE-D086-4B01-B491-D67950A5A065}" destId="{6D3A9625-D3EB-4CA1-AB05-34452283708A}" srcOrd="0" destOrd="0" presId="urn:microsoft.com/office/officeart/2005/8/layout/list1"/>
     <dgm:cxn modelId="{52625C28-CB81-4E22-A0FD-8E29373E6B1B}" type="presParOf" srcId="{6D3A9625-D3EB-4CA1-AB05-34452283708A}" destId="{7E290D25-335D-4339-A8E8-B036E46B5EB5}" srcOrd="0" destOrd="0" presId="urn:microsoft.com/office/officeart/2005/8/layout/list1"/>
     <dgm:cxn modelId="{B0C612E2-3EE1-400E-AE2C-6D7A4CC4C27B}" type="presParOf" srcId="{6D3A9625-D3EB-4CA1-AB05-34452283708A}" destId="{674922F1-7266-4681-AD4F-1C618A5FFF23}" srcOrd="1" destOrd="0" presId="urn:microsoft.com/office/officeart/2005/8/layout/list1"/>
@@ -13290,7 +13290,7 @@
             <a:pPr algn="r" rtl="0"/>
             <a:fld id="{E435D5CA-217C-4614-9A3C-EEC5D594B056}" type="datetime1">
               <a:rPr lang="it-IT" smtClean="0"/>
-              <a:t>24/02/2017</a:t>
+              <a:t>27/02/2017</a:t>
             </a:fld>
             <a:endParaRPr lang="it-IT" dirty="0"/>
           </a:p>
@@ -13460,7 +13460,7 @@
             <a:fld id="{733F77F8-8E21-427A-8345-023BF3B42495}" type="datetime1">
               <a:rPr lang="it-IT" smtClean="0"/>
               <a:pPr/>
-              <a:t>24/02/2017</a:t>
+              <a:t>27/02/2017</a:t>
             </a:fld>
             <a:endParaRPr lang="it-IT" dirty="0"/>
           </a:p>
@@ -14311,7 +14311,7 @@
             <a:fld id="{954F1948-006C-4AF2-9BB8-5590DE340B4E}" type="datetime1">
               <a:rPr lang="it-IT" smtClean="0"/>
               <a:pPr/>
-              <a:t>24/02/2017</a:t>
+              <a:t>27/02/2017</a:t>
             </a:fld>
             <a:endParaRPr lang="it-IT" dirty="0"/>
           </a:p>
@@ -14927,7 +14927,7 @@
             <a:fld id="{52F27A4B-BCBB-40DF-973A-4AE100165E4F}" type="datetime1">
               <a:rPr lang="it-IT" smtClean="0"/>
               <a:pPr/>
-              <a:t>24/02/2017</a:t>
+              <a:t>27/02/2017</a:t>
             </a:fld>
             <a:endParaRPr lang="it-IT" dirty="0"/>
           </a:p>
@@ -15144,7 +15144,7 @@
             <a:fld id="{C5CBB97D-C66D-4A88-B7A2-EC7A53906B2B}" type="datetime1">
               <a:rPr lang="it-IT" smtClean="0"/>
               <a:pPr/>
-              <a:t>24/02/2017</a:t>
+              <a:t>27/02/2017</a:t>
             </a:fld>
             <a:endParaRPr lang="it-IT" dirty="0"/>
           </a:p>
@@ -15351,7 +15351,7 @@
             <a:fld id="{173EC95F-BA1B-4C18-9366-021280E8FCDD}" type="datetime1">
               <a:rPr lang="it-IT" smtClean="0"/>
               <a:pPr/>
-              <a:t>24/02/2017</a:t>
+              <a:t>27/02/2017</a:t>
             </a:fld>
             <a:endParaRPr lang="it-IT" dirty="0"/>
           </a:p>
@@ -15624,7 +15624,7 @@
             <a:fld id="{13B66685-9917-4FA9-97FA-F7CBD01B573E}" type="datetime1">
               <a:rPr lang="it-IT" smtClean="0"/>
               <a:pPr/>
-              <a:t>24/02/2017</a:t>
+              <a:t>27/02/2017</a:t>
             </a:fld>
             <a:endParaRPr lang="it-IT" dirty="0"/>
           </a:p>
@@ -16141,7 +16141,7 @@
             <a:fld id="{C3AD8BBD-71CC-409E-BFB2-246F17C5C82E}" type="datetime1">
               <a:rPr lang="it-IT" smtClean="0"/>
               <a:pPr/>
-              <a:t>24/02/2017</a:t>
+              <a:t>27/02/2017</a:t>
             </a:fld>
             <a:endParaRPr lang="it-IT" dirty="0"/>
           </a:p>
@@ -16610,7 +16610,7 @@
             <a:fld id="{4DC9B8B0-4BE3-42F0-A6AA-86DCD761CF6F}" type="datetime1">
               <a:rPr lang="it-IT" smtClean="0"/>
               <a:pPr/>
-              <a:t>24/02/2017</a:t>
+              <a:t>27/02/2017</a:t>
             </a:fld>
             <a:endParaRPr lang="it-IT" dirty="0"/>
           </a:p>
@@ -16749,7 +16749,7 @@
             <a:fld id="{96968A3D-76C6-4711-9926-51A6FD430964}" type="datetime1">
               <a:rPr lang="it-IT" smtClean="0"/>
               <a:pPr/>
-              <a:t>24/02/2017</a:t>
+              <a:t>27/02/2017</a:t>
             </a:fld>
             <a:endParaRPr lang="it-IT" dirty="0"/>
           </a:p>
@@ -16864,7 +16864,7 @@
             <a:fld id="{711C083B-9FB4-4496-A1AA-CFC98E67E418}" type="datetime1">
               <a:rPr lang="it-IT" smtClean="0"/>
               <a:pPr/>
-              <a:t>24/02/2017</a:t>
+              <a:t>27/02/2017</a:t>
             </a:fld>
             <a:endParaRPr lang="it-IT" dirty="0"/>
           </a:p>
@@ -17166,7 +17166,7 @@
             <a:fld id="{9A4DDAF3-125A-477E-8366-A2A105615D0C}" type="datetime1">
               <a:rPr lang="it-IT" smtClean="0"/>
               <a:pPr/>
-              <a:t>24/02/2017</a:t>
+              <a:t>27/02/2017</a:t>
             </a:fld>
             <a:endParaRPr lang="it-IT" dirty="0"/>
           </a:p>
@@ -17499,7 +17499,7 @@
             <a:fld id="{FAAED65B-ABDB-4384-BED8-4E778B05E186}" type="datetime1">
               <a:rPr lang="it-IT" smtClean="0"/>
               <a:pPr/>
-              <a:t>24/02/2017</a:t>
+              <a:t>27/02/2017</a:t>
             </a:fld>
             <a:endParaRPr lang="it-IT" dirty="0"/>
           </a:p>
@@ -17845,7 +17845,7 @@
             <a:fld id="{9A476C03-45BF-421B-88D9-2B5ED35BE8EE}" type="datetime1">
               <a:rPr lang="it-IT" smtClean="0"/>
               <a:pPr/>
-              <a:t>24/02/2017</a:t>
+              <a:t>27/02/2017</a:t>
             </a:fld>
             <a:endParaRPr lang="it-IT" dirty="0"/>
           </a:p>
@@ -25749,7 +25749,15 @@
           <a:p>
             <a:r>
               <a:rPr lang="it-IT" dirty="0"/>
-              <a:t>Tuttavia, includendo fra le etichette anche i tagli errati, la precisione cambia. Le pipeline 1 e 3 hanno ottenuto una precisione del 21%, con moltissimi falsi positivi, le pipeline 2 e 4 invece hanno ottenuto una precisione dell’86%, con la pipeline 2 ad avere il ranking più accurato nel 100% dei casi, mentre la 4 ha talvolta messo la lettera giusta in seconda posizione. </a:t>
+              <a:t>Tuttavia, includendo fra le etichette anche i tagli errati, la precisione cambia. Le pipeline 1 e 3 hanno ottenuto una precisione </a:t>
+            </a:r>
+            <a:r>
+              <a:rPr lang="it-IT"/>
+              <a:t>del 25%, </a:t>
+            </a:r>
+            <a:r>
+              <a:rPr lang="it-IT" dirty="0"/>
+              <a:t>con moltissimi falsi positivi, le pipeline 2 e 4 invece hanno ottenuto una precisione dell’80%, con la pipeline 2 ad avere il ranking più accurato nel 100% dei casi, mentre la 4 ha talvolta messo la lettera giusta in seconda posizione. </a:t>
             </a:r>
           </a:p>
           <a:p>
@@ -25912,7 +25920,7 @@
           <a:graphicData uri="http://schemas.openxmlformats.org/presentationml/2006/ole">
             <mc:AlternateContent xmlns:mc="http://schemas.openxmlformats.org/markup-compatibility/2006">
               <mc:Choice xmlns:v="urn:schemas-microsoft-com:vml" Requires="v">
-                <p:oleObj spid="_x0000_s1049" name="Image" r:id="rId3" imgW="10234800" imgH="3263400" progId="Photoshop.Image.16">
+                <p:oleObj spid="_x0000_s1051" name="Image" r:id="rId3" imgW="10234800" imgH="3263400" progId="Photoshop.Image.16">
                   <p:embed/>
                 </p:oleObj>
               </mc:Choice>
@@ -26626,7 +26634,7 @@
           <a:graphicData uri="http://schemas.openxmlformats.org/presentationml/2006/ole">
             <mc:AlternateContent xmlns:mc="http://schemas.openxmlformats.org/markup-compatibility/2006">
               <mc:Choice xmlns:v="urn:schemas-microsoft-com:vml" Requires="v">
-                <p:oleObj spid="_x0000_s1050" name="Image" r:id="rId9" imgW="3161880" imgH="469800" progId="Photoshop.Image.16">
+                <p:oleObj spid="_x0000_s1052" name="Image" r:id="rId9" imgW="3161880" imgH="469800" progId="Photoshop.Image.16">
                   <p:embed/>
                 </p:oleObj>
               </mc:Choice>
@@ -29390,6 +29398,15 @@
 </file>
 
 <file path=customXml/item1.xml><?xml version="1.0" encoding="utf-8"?>
+<?mso-contentType ?>
+<FormTemplates xmlns="http://schemas.microsoft.com/sharepoint/v3/contenttype/forms">
+  <Display>DocumentLibraryForm</Display>
+  <Edit>AssetEditForm</Edit>
+  <New>DocumentLibraryForm</New>
+</FormTemplates>
+</file>
+
+<file path=customXml/item2.xml><?xml version="1.0" encoding="utf-8"?>
 <ct:contentTypeSchema xmlns:ct="http://schemas.microsoft.com/office/2006/metadata/contentType" xmlns:ma="http://schemas.microsoft.com/office/2006/metadata/properties/metaAttributes" ct:_="" ma:_="" ma:contentTypeName="TemplateFile" ma:contentTypeID="0x0101006EDDDB5EE6D98C44930B742096920B300400F5B6D36B3EF94B4E9A635CDF2A18F5B8" ma:contentTypeVersion="72" ma:contentTypeDescription="Create a new document." ma:contentTypeScope="" ma:versionID="a23e56308344d904b51738559c3d67c9">
   <xsd:schema xmlns:xsd="http://www.w3.org/2001/XMLSchema" xmlns:xs="http://www.w3.org/2001/XMLSchema" xmlns:p="http://schemas.microsoft.com/office/2006/metadata/properties" xmlns:ns2="4873beb7-5857-4685-be1f-d57550cc96cc" targetNamespace="http://schemas.microsoft.com/office/2006/metadata/properties" ma:root="true" ma:fieldsID="cd0908cc4600e77bf5da051303e00c8d" ns2:_="">
     <xsd:import namespace="4873beb7-5857-4685-be1f-d57550cc96cc"/>
@@ -30429,15 +30446,6 @@
 </ct:contentTypeSchema>
 </file>
 
-<file path=customXml/item2.xml><?xml version="1.0" encoding="utf-8"?>
-<?mso-contentType ?>
-<FormTemplates xmlns="http://schemas.microsoft.com/sharepoint/v3/contenttype/forms">
-  <Display>DocumentLibraryForm</Display>
-  <Edit>AssetEditForm</Edit>
-  <New>DocumentLibraryForm</New>
-</FormTemplates>
-</file>
-
 <file path=customXml/item3.xml><?xml version="1.0" encoding="utf-8"?>
 <p:properties xmlns:p="http://schemas.microsoft.com/office/2006/metadata/properties" xmlns:xsi="http://www.w3.org/2001/XMLSchema-instance" xmlns:pc="http://schemas.microsoft.com/office/infopath/2007/PartnerControls">
   <documentManagement>
@@ -30565,6 +30573,14 @@
 </file>
 
 <file path=customXml/itemProps1.xml><?xml version="1.0" encoding="utf-8"?>
+<ds:datastoreItem xmlns:ds="http://schemas.openxmlformats.org/officeDocument/2006/customXml" ds:itemID="{8D003AC8-209A-4321-A17C-1B7A20643390}">
+  <ds:schemaRefs>
+    <ds:schemaRef ds:uri="http://schemas.microsoft.com/sharepoint/v3/contenttype/forms"/>
+  </ds:schemaRefs>
+</ds:datastoreItem>
+</file>
+
+<file path=customXml/itemProps2.xml><?xml version="1.0" encoding="utf-8"?>
 <ds:datastoreItem xmlns:ds="http://schemas.openxmlformats.org/officeDocument/2006/customXml" ds:itemID="{83ED4759-CFDD-43F0-817C-11D9197192BA}">
   <ds:schemaRefs>
     <ds:schemaRef ds:uri="http://schemas.microsoft.com/office/2006/metadata/contentType"/>
@@ -30578,14 +30594,6 @@
     <ds:schemaRef ds:uri="http://purl.org/dc/elements/1.1/"/>
     <ds:schemaRef ds:uri="http://purl.org/dc/terms/"/>
     <ds:schemaRef ds:uri="http://schemas.microsoft.com/internal/obd"/>
-  </ds:schemaRefs>
-</ds:datastoreItem>
-</file>
-
-<file path=customXml/itemProps2.xml><?xml version="1.0" encoding="utf-8"?>
-<ds:datastoreItem xmlns:ds="http://schemas.openxmlformats.org/officeDocument/2006/customXml" ds:itemID="{8D003AC8-209A-4321-A17C-1B7A20643390}">
-  <ds:schemaRefs>
-    <ds:schemaRef ds:uri="http://schemas.microsoft.com/sharepoint/v3/contenttype/forms"/>
   </ds:schemaRefs>
 </ds:datastoreItem>
 </file>

</xml_diff>